<commit_message>
titlePrincipals exploration slides added
</commit_message>
<xml_diff>
--- a/Presentation/ScrumLords_Capstone.pptx
+++ b/Presentation/ScrumLords_Capstone.pptx
@@ -15,13 +15,18 @@
     <p:sldId id="276" r:id="rId9"/>
     <p:sldId id="267" r:id="rId10"/>
     <p:sldId id="268" r:id="rId11"/>
-    <p:sldId id="269" r:id="rId12"/>
-    <p:sldId id="270" r:id="rId13"/>
-    <p:sldId id="271" r:id="rId14"/>
-    <p:sldId id="272" r:id="rId15"/>
-    <p:sldId id="278" r:id="rId16"/>
-    <p:sldId id="277" r:id="rId17"/>
-    <p:sldId id="274" r:id="rId18"/>
+    <p:sldId id="279" r:id="rId12"/>
+    <p:sldId id="280" r:id="rId13"/>
+    <p:sldId id="281" r:id="rId14"/>
+    <p:sldId id="282" r:id="rId15"/>
+    <p:sldId id="283" r:id="rId16"/>
+    <p:sldId id="269" r:id="rId17"/>
+    <p:sldId id="270" r:id="rId18"/>
+    <p:sldId id="271" r:id="rId19"/>
+    <p:sldId id="272" r:id="rId20"/>
+    <p:sldId id="278" r:id="rId21"/>
+    <p:sldId id="277" r:id="rId22"/>
+    <p:sldId id="274" r:id="rId23"/>
   </p:sldIdLst>
   <p:sldSz cx="12192000" cy="6858000"/>
   <p:notesSz cx="6858000" cy="9144000"/>
@@ -279,7 +284,7 @@
           <a:p>
             <a:fld id="{38A050F6-C4A4-4D93-BB5B-76D71472723B}" type="datetimeFigureOut">
               <a:rPr lang="en-US" smtClean="0"/>
-              <a:t>8/9/2018</a:t>
+              <a:t>8/10/2018</a:t>
             </a:fld>
             <a:endParaRPr lang="en-US"/>
           </a:p>
@@ -477,7 +482,7 @@
           <a:p>
             <a:fld id="{38A050F6-C4A4-4D93-BB5B-76D71472723B}" type="datetimeFigureOut">
               <a:rPr lang="en-US" smtClean="0"/>
-              <a:t>8/9/2018</a:t>
+              <a:t>8/10/2018</a:t>
             </a:fld>
             <a:endParaRPr lang="en-US"/>
           </a:p>
@@ -685,7 +690,7 @@
           <a:p>
             <a:fld id="{38A050F6-C4A4-4D93-BB5B-76D71472723B}" type="datetimeFigureOut">
               <a:rPr lang="en-US" smtClean="0"/>
-              <a:t>8/9/2018</a:t>
+              <a:t>8/10/2018</a:t>
             </a:fld>
             <a:endParaRPr lang="en-US"/>
           </a:p>
@@ -883,7 +888,7 @@
           <a:p>
             <a:fld id="{38A050F6-C4A4-4D93-BB5B-76D71472723B}" type="datetimeFigureOut">
               <a:rPr lang="en-US" smtClean="0"/>
-              <a:t>8/9/2018</a:t>
+              <a:t>8/10/2018</a:t>
             </a:fld>
             <a:endParaRPr lang="en-US"/>
           </a:p>
@@ -1158,7 +1163,7 @@
           <a:p>
             <a:fld id="{38A050F6-C4A4-4D93-BB5B-76D71472723B}" type="datetimeFigureOut">
               <a:rPr lang="en-US" smtClean="0"/>
-              <a:t>8/9/2018</a:t>
+              <a:t>8/10/2018</a:t>
             </a:fld>
             <a:endParaRPr lang="en-US"/>
           </a:p>
@@ -1423,7 +1428,7 @@
           <a:p>
             <a:fld id="{38A050F6-C4A4-4D93-BB5B-76D71472723B}" type="datetimeFigureOut">
               <a:rPr lang="en-US" smtClean="0"/>
-              <a:t>8/9/2018</a:t>
+              <a:t>8/10/2018</a:t>
             </a:fld>
             <a:endParaRPr lang="en-US"/>
           </a:p>
@@ -1835,7 +1840,7 @@
           <a:p>
             <a:fld id="{38A050F6-C4A4-4D93-BB5B-76D71472723B}" type="datetimeFigureOut">
               <a:rPr lang="en-US" smtClean="0"/>
-              <a:t>8/9/2018</a:t>
+              <a:t>8/10/2018</a:t>
             </a:fld>
             <a:endParaRPr lang="en-US"/>
           </a:p>
@@ -1976,7 +1981,7 @@
           <a:p>
             <a:fld id="{38A050F6-C4A4-4D93-BB5B-76D71472723B}" type="datetimeFigureOut">
               <a:rPr lang="en-US" smtClean="0"/>
-              <a:t>8/9/2018</a:t>
+              <a:t>8/10/2018</a:t>
             </a:fld>
             <a:endParaRPr lang="en-US"/>
           </a:p>
@@ -2089,7 +2094,7 @@
           <a:p>
             <a:fld id="{38A050F6-C4A4-4D93-BB5B-76D71472723B}" type="datetimeFigureOut">
               <a:rPr lang="en-US" smtClean="0"/>
-              <a:t>8/9/2018</a:t>
+              <a:t>8/10/2018</a:t>
             </a:fld>
             <a:endParaRPr lang="en-US"/>
           </a:p>
@@ -2400,7 +2405,7 @@
           <a:p>
             <a:fld id="{38A050F6-C4A4-4D93-BB5B-76D71472723B}" type="datetimeFigureOut">
               <a:rPr lang="en-US" smtClean="0"/>
-              <a:t>8/9/2018</a:t>
+              <a:t>8/10/2018</a:t>
             </a:fld>
             <a:endParaRPr lang="en-US"/>
           </a:p>
@@ -2688,7 +2693,7 @@
           <a:p>
             <a:fld id="{38A050F6-C4A4-4D93-BB5B-76D71472723B}" type="datetimeFigureOut">
               <a:rPr lang="en-US" smtClean="0"/>
-              <a:t>8/9/2018</a:t>
+              <a:t>8/10/2018</a:t>
             </a:fld>
             <a:endParaRPr lang="en-US"/>
           </a:p>
@@ -2929,7 +2934,7 @@
           <a:p>
             <a:fld id="{38A050F6-C4A4-4D93-BB5B-76D71472723B}" type="datetimeFigureOut">
               <a:rPr lang="en-US" smtClean="0"/>
-              <a:t>8/9/2018</a:t>
+              <a:t>8/10/2018</a:t>
             </a:fld>
             <a:endParaRPr lang="en-US"/>
           </a:p>
@@ -3497,6 +3502,14 @@
 <file path=ppt/slides/slide11.xml><?xml version="1.0" encoding="utf-8"?>
 <p:sld xmlns:a="http://schemas.openxmlformats.org/drawingml/2006/main" xmlns:r="http://schemas.openxmlformats.org/officeDocument/2006/relationships" xmlns:p="http://schemas.openxmlformats.org/presentationml/2006/main">
   <p:cSld>
+    <p:bg>
+      <p:bgPr>
+        <a:solidFill>
+          <a:srgbClr val="FFFFFF"/>
+        </a:solidFill>
+        <a:effectLst/>
+      </p:bgPr>
+    </p:bg>
     <p:spTree>
       <p:nvGrpSpPr>
         <p:cNvPr id="1" name=""/>
@@ -3513,44 +3526,212 @@
       </p:grpSpPr>
       <p:sp>
         <p:nvSpPr>
-          <p:cNvPr id="2" name="TextBox 1">
-            <a:extLst>
-              <a:ext uri="{FF2B5EF4-FFF2-40B4-BE49-F238E27FC236}">
-                <a16:creationId xmlns:a16="http://schemas.microsoft.com/office/drawing/2014/main" id="{9A5B267B-DC99-48D5-AAE4-0080DA632EE8}"/>
-              </a:ext>
-            </a:extLst>
-          </p:cNvPr>
-          <p:cNvSpPr txBox="1"/>
-          <p:nvPr/>
-        </p:nvSpPr>
-        <p:spPr>
-          <a:xfrm>
-            <a:off x="2330824" y="699246"/>
-            <a:ext cx="8444753" cy="923330"/>
+          <p:cNvPr id="18" name="Rectangle 11">
+            <a:extLst>
+              <a:ext uri="{FF2B5EF4-FFF2-40B4-BE49-F238E27FC236}">
+                <a16:creationId xmlns:a16="http://schemas.microsoft.com/office/drawing/2014/main" id="{72257994-BD97-4691-8B89-198A6D2BABDC}"/>
+              </a:ext>
+              <a:ext uri="{C183D7F6-B498-43B3-948B-1728B52AA6E4}">
+                <adec:decorative xmlns="" xmlns:adec="http://schemas.microsoft.com/office/drawing/2017/decorative" val="1"/>
+              </a:ext>
+            </a:extLst>
+          </p:cNvPr>
+          <p:cNvSpPr>
+            <a:spLocks noGrp="1" noRot="1" noChangeAspect="1" noMove="1" noResize="1" noEditPoints="1" noAdjustHandles="1" noChangeArrowheads="1" noChangeShapeType="1" noTextEdit="1"/>
+          </p:cNvSpPr>
+          <p:nvPr>
+            <p:extLst>
+              <p:ext uri="{386F3935-93C4-4BCD-93E2-E3B085C9AB24}">
+                <p16:designElem xmlns:p16="http://schemas.microsoft.com/office/powerpoint/2015/main" val="1"/>
+              </p:ext>
+            </p:extLst>
+          </p:nvPr>
+        </p:nvSpPr>
+        <p:spPr>
+          <a:xfrm>
+            <a:off x="0" y="4918509"/>
+            <a:ext cx="12192000" cy="1939491"/>
           </a:xfrm>
           <a:prstGeom prst="rect">
             <a:avLst/>
           </a:prstGeom>
-          <a:noFill/>
-        </p:spPr>
-        <p:txBody>
-          <a:bodyPr wrap="square" rtlCol="0">
-            <a:spAutoFit/>
+          <a:solidFill>
+            <a:srgbClr val="404040"/>
+          </a:solidFill>
+          <a:ln>
+            <a:noFill/>
+          </a:ln>
+        </p:spPr>
+        <p:style>
+          <a:lnRef idx="2">
+            <a:schemeClr val="accent1">
+              <a:shade val="50000"/>
+            </a:schemeClr>
+          </a:lnRef>
+          <a:fillRef idx="1">
+            <a:schemeClr val="accent1"/>
+          </a:fillRef>
+          <a:effectRef idx="0">
+            <a:schemeClr val="accent1"/>
+          </a:effectRef>
+          <a:fontRef idx="minor">
+            <a:schemeClr val="lt1"/>
+          </a:fontRef>
+        </p:style>
+        <p:txBody>
+          <a:bodyPr rtlCol="0" anchor="ctr"/>
+          <a:lstStyle/>
+          <a:p>
+            <a:pPr algn="ctr"/>
+            <a:endParaRPr lang="en-US"/>
+          </a:p>
+        </p:txBody>
+      </p:sp>
+      <p:sp>
+        <p:nvSpPr>
+          <p:cNvPr id="4" name="Title 3">
+            <a:extLst>
+              <a:ext uri="{FF2B5EF4-FFF2-40B4-BE49-F238E27FC236}">
+                <a16:creationId xmlns:a16="http://schemas.microsoft.com/office/drawing/2014/main" id="{5B7E3840-057E-4505-8882-F0D695DD5FCB}"/>
+              </a:ext>
+            </a:extLst>
+          </p:cNvPr>
+          <p:cNvSpPr>
+            <a:spLocks noGrp="1"/>
+          </p:cNvSpPr>
+          <p:nvPr>
+            <p:ph type="title"/>
+          </p:nvPr>
+        </p:nvSpPr>
+        <p:spPr>
+          <a:xfrm>
+            <a:off x="1600200" y="4269282"/>
+            <a:ext cx="8991600" cy="1264762"/>
+          </a:xfrm>
+          <a:solidFill>
+            <a:srgbClr val="FFFFFF"/>
+          </a:solidFill>
+          <a:ln w="38100">
+            <a:solidFill>
+              <a:srgbClr val="404040"/>
+            </a:solidFill>
+            <a:miter lim="800000"/>
+          </a:ln>
+        </p:spPr>
+        <p:txBody>
+          <a:bodyPr vert="horz" lIns="91440" tIns="45720" rIns="91440" bIns="45720" rtlCol="0" anchor="ctr">
+            <a:normAutofit/>
           </a:bodyPr>
           <a:lstStyle/>
           <a:p>
             <a:pPr algn="ctr"/>
             <a:r>
-              <a:rPr lang="en-US" sz="5400" dirty="0"/>
-              <a:t>Modeling</a:t>
-            </a:r>
-          </a:p>
-        </p:txBody>
-      </p:sp>
+              <a:rPr lang="en-US" sz="4000" dirty="0" err="1">
+                <a:solidFill>
+                  <a:srgbClr val="404040"/>
+                </a:solidFill>
+              </a:rPr>
+              <a:t>titlePrincipals</a:t>
+            </a:r>
+            <a:r>
+              <a:rPr lang="en-US" sz="4000" dirty="0">
+                <a:solidFill>
+                  <a:srgbClr val="404040"/>
+                </a:solidFill>
+              </a:rPr>
+              <a:t> Exploration</a:t>
+            </a:r>
+            <a:br>
+              <a:rPr lang="en-US" sz="4000" dirty="0">
+                <a:solidFill>
+                  <a:srgbClr val="404040"/>
+                </a:solidFill>
+              </a:rPr>
+            </a:br>
+            <a:r>
+              <a:rPr lang="en-US" sz="2200" dirty="0">
+                <a:solidFill>
+                  <a:srgbClr val="404040"/>
+                </a:solidFill>
+              </a:rPr>
+              <a:t>Step 1:  </a:t>
+            </a:r>
+            <a:r>
+              <a:rPr lang="en-US" sz="2200" dirty="0"/>
+              <a:t>Inner Join to Produce Rating by Principal by Movie</a:t>
+            </a:r>
+            <a:endParaRPr lang="en-US" sz="2200" dirty="0">
+              <a:solidFill>
+                <a:srgbClr val="404040"/>
+              </a:solidFill>
+            </a:endParaRPr>
+          </a:p>
+        </p:txBody>
+      </p:sp>
+      <p:pic>
+        <p:nvPicPr>
+          <p:cNvPr id="7" name="Picture 6">
+            <a:extLst>
+              <a:ext uri="{FF2B5EF4-FFF2-40B4-BE49-F238E27FC236}">
+                <a16:creationId xmlns:a16="http://schemas.microsoft.com/office/drawing/2014/main" id="{01447507-0C28-4F4F-AC17-74AE1C5A9509}"/>
+              </a:ext>
+            </a:extLst>
+          </p:cNvPr>
+          <p:cNvPicPr>
+            <a:picLocks noChangeAspect="1"/>
+          </p:cNvPicPr>
+          <p:nvPr/>
+        </p:nvPicPr>
+        <p:blipFill>
+          <a:blip r:embed="rId2"/>
+          <a:stretch>
+            <a:fillRect/>
+          </a:stretch>
+        </p:blipFill>
+        <p:spPr>
+          <a:xfrm>
+            <a:off x="6487777" y="984354"/>
+            <a:ext cx="5316388" cy="2968273"/>
+          </a:xfrm>
+          <a:prstGeom prst="rect">
+            <a:avLst/>
+          </a:prstGeom>
+        </p:spPr>
+      </p:pic>
+      <p:pic>
+        <p:nvPicPr>
+          <p:cNvPr id="3" name="Picture 2">
+            <a:extLst>
+              <a:ext uri="{FF2B5EF4-FFF2-40B4-BE49-F238E27FC236}">
+                <a16:creationId xmlns:a16="http://schemas.microsoft.com/office/drawing/2014/main" id="{DD98BD97-E9D2-4EA0-AEED-4D2C398E09A8}"/>
+              </a:ext>
+            </a:extLst>
+          </p:cNvPr>
+          <p:cNvPicPr>
+            <a:picLocks noChangeAspect="1"/>
+          </p:cNvPicPr>
+          <p:nvPr/>
+        </p:nvPicPr>
+        <p:blipFill>
+          <a:blip r:embed="rId3"/>
+          <a:stretch>
+            <a:fillRect/>
+          </a:stretch>
+        </p:blipFill>
+        <p:spPr>
+          <a:xfrm>
+            <a:off x="333925" y="293683"/>
+            <a:ext cx="5854438" cy="3885218"/>
+          </a:xfrm>
+          <a:prstGeom prst="rect">
+            <a:avLst/>
+          </a:prstGeom>
+        </p:spPr>
+      </p:pic>
     </p:spTree>
     <p:extLst>
       <p:ext uri="{BB962C8B-B14F-4D97-AF65-F5344CB8AC3E}">
-        <p14:creationId xmlns:p14="http://schemas.microsoft.com/office/powerpoint/2010/main" val="379452362"/>
+        <p14:creationId xmlns:p14="http://schemas.microsoft.com/office/powerpoint/2010/main" val="1697751953"/>
       </p:ext>
     </p:extLst>
   </p:cSld>
@@ -3561,6 +3742,317 @@
 </file>
 
 <file path=ppt/slides/slide12.xml><?xml version="1.0" encoding="utf-8"?>
+<p:sld xmlns:a="http://schemas.openxmlformats.org/drawingml/2006/main" xmlns:r="http://schemas.openxmlformats.org/officeDocument/2006/relationships" xmlns:p="http://schemas.openxmlformats.org/presentationml/2006/main">
+  <p:cSld>
+    <p:bg>
+      <p:bgPr>
+        <a:solidFill>
+          <a:schemeClr val="bg1"/>
+        </a:solidFill>
+        <a:effectLst/>
+      </p:bgPr>
+    </p:bg>
+    <p:spTree>
+      <p:nvGrpSpPr>
+        <p:cNvPr id="1" name=""/>
+        <p:cNvGrpSpPr/>
+        <p:nvPr/>
+      </p:nvGrpSpPr>
+      <p:grpSpPr>
+        <a:xfrm>
+          <a:off x="0" y="0"/>
+          <a:ext cx="0" cy="0"/>
+          <a:chOff x="0" y="0"/>
+          <a:chExt cx="0" cy="0"/>
+        </a:xfrm>
+      </p:grpSpPr>
+      <p:sp>
+        <p:nvSpPr>
+          <p:cNvPr id="9" name="Rectangle 8">
+            <a:extLst>
+              <a:ext uri="{FF2B5EF4-FFF2-40B4-BE49-F238E27FC236}">
+                <a16:creationId xmlns:a16="http://schemas.microsoft.com/office/drawing/2014/main" id="{AB45A142-4255-493C-8284-5D566C121B10}"/>
+              </a:ext>
+              <a:ext uri="{C183D7F6-B498-43B3-948B-1728B52AA6E4}">
+                <adec:decorative xmlns="" xmlns:adec="http://schemas.microsoft.com/office/drawing/2017/decorative" val="1"/>
+              </a:ext>
+            </a:extLst>
+          </p:cNvPr>
+          <p:cNvSpPr>
+            <a:spLocks noGrp="1" noRot="1" noChangeAspect="1" noMove="1" noResize="1" noEditPoints="1" noAdjustHandles="1" noChangeArrowheads="1" noChangeShapeType="1" noTextEdit="1"/>
+          </p:cNvSpPr>
+          <p:nvPr>
+            <p:extLst>
+              <p:ext uri="{386F3935-93C4-4BCD-93E2-E3B085C9AB24}">
+                <p16:designElem xmlns:p16="http://schemas.microsoft.com/office/powerpoint/2015/main" val="1"/>
+              </p:ext>
+            </p:extLst>
+          </p:nvPr>
+        </p:nvSpPr>
+        <p:spPr bwMode="ltGray">
+          <a:xfrm>
+            <a:off x="336884" y="321177"/>
+            <a:ext cx="4332307" cy="6179552"/>
+          </a:xfrm>
+          <a:prstGeom prst="rect">
+            <a:avLst/>
+          </a:prstGeom>
+          <a:solidFill>
+            <a:srgbClr val="404040">
+              <a:alpha val="89804"/>
+            </a:srgbClr>
+          </a:solidFill>
+          <a:ln w="127000" cap="sq" cmpd="thinThick">
+            <a:solidFill>
+              <a:srgbClr val="595959">
+                <a:alpha val="80000"/>
+              </a:srgbClr>
+            </a:solidFill>
+          </a:ln>
+        </p:spPr>
+        <p:style>
+          <a:lnRef idx="2">
+            <a:schemeClr val="accent1">
+              <a:shade val="50000"/>
+            </a:schemeClr>
+          </a:lnRef>
+          <a:fillRef idx="1">
+            <a:schemeClr val="accent1"/>
+          </a:fillRef>
+          <a:effectRef idx="0">
+            <a:schemeClr val="accent1"/>
+          </a:effectRef>
+          <a:fontRef idx="minor">
+            <a:schemeClr val="lt1"/>
+          </a:fontRef>
+        </p:style>
+        <p:txBody>
+          <a:bodyPr rtlCol="0" anchor="ctr"/>
+          <a:lstStyle/>
+          <a:p>
+            <a:pPr algn="ctr"/>
+            <a:endParaRPr lang="en-US"/>
+          </a:p>
+        </p:txBody>
+      </p:sp>
+      <p:sp>
+        <p:nvSpPr>
+          <p:cNvPr id="4" name="Title 3">
+            <a:extLst>
+              <a:ext uri="{FF2B5EF4-FFF2-40B4-BE49-F238E27FC236}">
+                <a16:creationId xmlns:a16="http://schemas.microsoft.com/office/drawing/2014/main" id="{5B7E3840-057E-4505-8882-F0D695DD5FCB}"/>
+              </a:ext>
+            </a:extLst>
+          </p:cNvPr>
+          <p:cNvSpPr>
+            <a:spLocks noGrp="1"/>
+          </p:cNvSpPr>
+          <p:nvPr>
+            <p:ph type="title"/>
+          </p:nvPr>
+        </p:nvSpPr>
+        <p:spPr>
+          <a:xfrm>
+            <a:off x="674237" y="914400"/>
+            <a:ext cx="3657600" cy="2887579"/>
+          </a:xfrm>
+        </p:spPr>
+        <p:txBody>
+          <a:bodyPr vert="horz" lIns="91440" tIns="45720" rIns="91440" bIns="45720" rtlCol="0" anchor="b">
+            <a:normAutofit fontScale="90000"/>
+          </a:bodyPr>
+          <a:lstStyle/>
+          <a:p>
+            <a:pPr algn="ctr"/>
+            <a:r>
+              <a:rPr lang="en-US" sz="3700" kern="1200" dirty="0">
+                <a:solidFill>
+                  <a:srgbClr val="FFFFFF"/>
+                </a:solidFill>
+                <a:effectLst/>
+                <a:latin typeface="+mj-lt"/>
+                <a:ea typeface="+mj-ea"/>
+                <a:cs typeface="+mj-cs"/>
+              </a:rPr>
+              <a:t>Step 2: </a:t>
+            </a:r>
+            <a:br>
+              <a:rPr lang="en-US" sz="3700" kern="1200" dirty="0">
+                <a:solidFill>
+                  <a:srgbClr val="FFFFFF"/>
+                </a:solidFill>
+                <a:effectLst/>
+                <a:latin typeface="+mj-lt"/>
+                <a:ea typeface="+mj-ea"/>
+                <a:cs typeface="+mj-cs"/>
+              </a:rPr>
+            </a:br>
+            <a:r>
+              <a:rPr lang="en-US" sz="3700" kern="1200" dirty="0">
+                <a:solidFill>
+                  <a:srgbClr val="FFFFFF"/>
+                </a:solidFill>
+                <a:effectLst/>
+                <a:latin typeface="+mj-lt"/>
+                <a:ea typeface="+mj-ea"/>
+                <a:cs typeface="+mj-cs"/>
+              </a:rPr>
+              <a:t>Aggregate Average </a:t>
+            </a:r>
+            <a:r>
+              <a:rPr lang="en-US" sz="3700" kern="1200" dirty="0">
+                <a:solidFill>
+                  <a:srgbClr val="FFFFFF"/>
+                </a:solidFill>
+                <a:latin typeface="+mj-lt"/>
+                <a:ea typeface="+mj-ea"/>
+                <a:cs typeface="+mj-cs"/>
+              </a:rPr>
+              <a:t>R</a:t>
+            </a:r>
+            <a:r>
+              <a:rPr lang="en-US" sz="3700" kern="1200" dirty="0">
+                <a:solidFill>
+                  <a:srgbClr val="FFFFFF"/>
+                </a:solidFill>
+                <a:effectLst/>
+                <a:latin typeface="+mj-lt"/>
+                <a:ea typeface="+mj-ea"/>
+                <a:cs typeface="+mj-cs"/>
+              </a:rPr>
+              <a:t>atings by Name by </a:t>
+            </a:r>
+            <a:r>
+              <a:rPr lang="en-US" sz="3700" kern="1200" dirty="0" err="1">
+                <a:solidFill>
+                  <a:srgbClr val="FFFFFF"/>
+                </a:solidFill>
+                <a:effectLst/>
+                <a:latin typeface="+mj-lt"/>
+                <a:ea typeface="+mj-ea"/>
+                <a:cs typeface="+mj-cs"/>
+              </a:rPr>
+              <a:t>title.Principal</a:t>
+            </a:r>
+            <a:r>
+              <a:rPr lang="en-US" sz="3700" kern="1200" dirty="0">
+                <a:solidFill>
+                  <a:srgbClr val="FFFFFF"/>
+                </a:solidFill>
+                <a:effectLst/>
+                <a:latin typeface="+mj-lt"/>
+                <a:ea typeface="+mj-ea"/>
+                <a:cs typeface="+mj-cs"/>
+              </a:rPr>
+              <a:t> Category</a:t>
+            </a:r>
+            <a:endParaRPr lang="en-US" sz="3700" kern="1200" dirty="0">
+              <a:solidFill>
+                <a:srgbClr val="FFFFFF"/>
+              </a:solidFill>
+              <a:latin typeface="+mj-lt"/>
+              <a:ea typeface="+mj-ea"/>
+              <a:cs typeface="+mj-cs"/>
+            </a:endParaRPr>
+          </a:p>
+        </p:txBody>
+      </p:sp>
+      <p:cxnSp>
+        <p:nvCxnSpPr>
+          <p:cNvPr id="11" name="Straight Connector 10">
+            <a:extLst>
+              <a:ext uri="{FF2B5EF4-FFF2-40B4-BE49-F238E27FC236}">
+                <a16:creationId xmlns:a16="http://schemas.microsoft.com/office/drawing/2014/main" id="{38FB9660-F42F-4313-BBC4-47C007FE484C}"/>
+              </a:ext>
+              <a:ext uri="{C183D7F6-B498-43B3-948B-1728B52AA6E4}">
+                <adec:decorative xmlns="" xmlns:adec="http://schemas.microsoft.com/office/drawing/2017/decorative" val="1"/>
+              </a:ext>
+            </a:extLst>
+          </p:cNvPr>
+          <p:cNvCxnSpPr>
+            <a:cxnSpLocks noGrp="1" noRot="1" noChangeAspect="1" noMove="1" noResize="1" noEditPoints="1" noAdjustHandles="1" noChangeArrowheads="1" noChangeShapeType="1"/>
+          </p:cNvCxnSpPr>
+          <p:nvPr>
+            <p:extLst>
+              <p:ext uri="{386F3935-93C4-4BCD-93E2-E3B085C9AB24}">
+                <p16:designElem xmlns:p16="http://schemas.microsoft.com/office/powerpoint/2015/main" val="1"/>
+              </p:ext>
+            </p:extLst>
+          </p:nvPr>
+        </p:nvCxnSpPr>
+        <p:spPr>
+          <a:xfrm>
+            <a:off x="1191126" y="3910267"/>
+            <a:ext cx="2586790" cy="0"/>
+          </a:xfrm>
+          <a:prstGeom prst="line">
+            <a:avLst/>
+          </a:prstGeom>
+          <a:ln w="22225">
+            <a:solidFill>
+              <a:srgbClr val="D9D9D9"/>
+            </a:solidFill>
+          </a:ln>
+        </p:spPr>
+        <p:style>
+          <a:lnRef idx="1">
+            <a:schemeClr val="accent1"/>
+          </a:lnRef>
+          <a:fillRef idx="0">
+            <a:schemeClr val="accent1"/>
+          </a:fillRef>
+          <a:effectRef idx="0">
+            <a:schemeClr val="accent1"/>
+          </a:effectRef>
+          <a:fontRef idx="minor">
+            <a:schemeClr val="tx1"/>
+          </a:fontRef>
+        </p:style>
+      </p:cxnSp>
+      <p:pic>
+        <p:nvPicPr>
+          <p:cNvPr id="3" name="Picture 2">
+            <a:extLst>
+              <a:ext uri="{FF2B5EF4-FFF2-40B4-BE49-F238E27FC236}">
+                <a16:creationId xmlns:a16="http://schemas.microsoft.com/office/drawing/2014/main" id="{950AE9D0-ADB3-43A2-8726-494687435AD2}"/>
+              </a:ext>
+            </a:extLst>
+          </p:cNvPr>
+          <p:cNvPicPr>
+            <a:picLocks noChangeAspect="1"/>
+          </p:cNvPicPr>
+          <p:nvPr/>
+        </p:nvPicPr>
+        <p:blipFill>
+          <a:blip r:embed="rId2"/>
+          <a:stretch>
+            <a:fillRect/>
+          </a:stretch>
+        </p:blipFill>
+        <p:spPr>
+          <a:xfrm>
+            <a:off x="5331542" y="492573"/>
+            <a:ext cx="6198104" cy="5880796"/>
+          </a:xfrm>
+          <a:prstGeom prst="rect">
+            <a:avLst/>
+          </a:prstGeom>
+        </p:spPr>
+      </p:pic>
+    </p:spTree>
+    <p:extLst>
+      <p:ext uri="{BB962C8B-B14F-4D97-AF65-F5344CB8AC3E}">
+        <p14:creationId xmlns:p14="http://schemas.microsoft.com/office/powerpoint/2010/main" val="3429663398"/>
+      </p:ext>
+    </p:extLst>
+  </p:cSld>
+  <p:clrMapOvr>
+    <a:masterClrMapping/>
+  </p:clrMapOvr>
+</p:sld>
+</file>
+
+<file path=ppt/slides/slide13.xml><?xml version="1.0" encoding="utf-8"?>
 <p:sld xmlns:a="http://schemas.openxmlformats.org/drawingml/2006/main" xmlns:r="http://schemas.openxmlformats.org/officeDocument/2006/relationships" xmlns:p="http://schemas.openxmlformats.org/presentationml/2006/main">
   <p:cSld>
     <p:spTree>
@@ -3579,6 +4071,734 @@
       </p:grpSpPr>
       <p:sp>
         <p:nvSpPr>
+          <p:cNvPr id="4" name="Title 3">
+            <a:extLst>
+              <a:ext uri="{FF2B5EF4-FFF2-40B4-BE49-F238E27FC236}">
+                <a16:creationId xmlns:a16="http://schemas.microsoft.com/office/drawing/2014/main" id="{5B7E3840-057E-4505-8882-F0D695DD5FCB}"/>
+              </a:ext>
+            </a:extLst>
+          </p:cNvPr>
+          <p:cNvSpPr>
+            <a:spLocks noGrp="1"/>
+          </p:cNvSpPr>
+          <p:nvPr>
+            <p:ph type="title"/>
+          </p:nvPr>
+        </p:nvSpPr>
+        <p:spPr>
+          <a:xfrm>
+            <a:off x="360784" y="137647"/>
+            <a:ext cx="11501249" cy="1325563"/>
+          </a:xfrm>
+        </p:spPr>
+        <p:txBody>
+          <a:bodyPr>
+            <a:normAutofit/>
+          </a:bodyPr>
+          <a:lstStyle/>
+          <a:p>
+            <a:pPr algn="ctr"/>
+            <a:r>
+              <a:rPr lang="en-US" sz="3300" dirty="0">
+                <a:latin typeface="Calibri Light (Headings)"/>
+              </a:rPr>
+              <a:t>Step 3:  Aggregate Each </a:t>
+            </a:r>
+            <a:r>
+              <a:rPr lang="en-US" sz="3300" dirty="0" err="1">
+                <a:latin typeface="Calibri Light (Headings)"/>
+              </a:rPr>
+              <a:t>titlePrincipal</a:t>
+            </a:r>
+            <a:r>
+              <a:rPr lang="en-US" sz="3300" dirty="0">
+                <a:latin typeface="Calibri Light (Headings)"/>
+              </a:rPr>
+              <a:t> Role Average Rating by Movie</a:t>
+            </a:r>
+          </a:p>
+        </p:txBody>
+      </p:sp>
+      <p:pic>
+        <p:nvPicPr>
+          <p:cNvPr id="3" name="Picture 2">
+            <a:extLst>
+              <a:ext uri="{FF2B5EF4-FFF2-40B4-BE49-F238E27FC236}">
+                <a16:creationId xmlns:a16="http://schemas.microsoft.com/office/drawing/2014/main" id="{EFFED29F-BCDF-404E-B57E-5733D1EF8786}"/>
+              </a:ext>
+            </a:extLst>
+          </p:cNvPr>
+          <p:cNvPicPr>
+            <a:picLocks noChangeAspect="1"/>
+          </p:cNvPicPr>
+          <p:nvPr/>
+        </p:nvPicPr>
+        <p:blipFill>
+          <a:blip r:embed="rId2"/>
+          <a:stretch>
+            <a:fillRect/>
+          </a:stretch>
+        </p:blipFill>
+        <p:spPr>
+          <a:xfrm>
+            <a:off x="5765121" y="4940870"/>
+            <a:ext cx="2504762" cy="1676574"/>
+          </a:xfrm>
+          <a:prstGeom prst="rect">
+            <a:avLst/>
+          </a:prstGeom>
+        </p:spPr>
+      </p:pic>
+      <p:pic>
+        <p:nvPicPr>
+          <p:cNvPr id="5" name="Picture 4">
+            <a:extLst>
+              <a:ext uri="{FF2B5EF4-FFF2-40B4-BE49-F238E27FC236}">
+                <a16:creationId xmlns:a16="http://schemas.microsoft.com/office/drawing/2014/main" id="{045F3756-B062-47A9-9ED7-F651E0855E44}"/>
+              </a:ext>
+            </a:extLst>
+          </p:cNvPr>
+          <p:cNvPicPr>
+            <a:picLocks noChangeAspect="1"/>
+          </p:cNvPicPr>
+          <p:nvPr/>
+        </p:nvPicPr>
+        <p:blipFill>
+          <a:blip r:embed="rId3"/>
+          <a:stretch>
+            <a:fillRect/>
+          </a:stretch>
+        </p:blipFill>
+        <p:spPr>
+          <a:xfrm>
+            <a:off x="8856894" y="5084111"/>
+            <a:ext cx="2952381" cy="1485714"/>
+          </a:xfrm>
+          <a:prstGeom prst="rect">
+            <a:avLst/>
+          </a:prstGeom>
+        </p:spPr>
+      </p:pic>
+      <p:pic>
+        <p:nvPicPr>
+          <p:cNvPr id="6" name="Picture 5">
+            <a:extLst>
+              <a:ext uri="{FF2B5EF4-FFF2-40B4-BE49-F238E27FC236}">
+                <a16:creationId xmlns:a16="http://schemas.microsoft.com/office/drawing/2014/main" id="{21205EAD-5D40-4174-AF82-0788C9F08028}"/>
+              </a:ext>
+            </a:extLst>
+          </p:cNvPr>
+          <p:cNvPicPr>
+            <a:picLocks noChangeAspect="1"/>
+          </p:cNvPicPr>
+          <p:nvPr/>
+        </p:nvPicPr>
+        <p:blipFill>
+          <a:blip r:embed="rId4"/>
+          <a:stretch>
+            <a:fillRect/>
+          </a:stretch>
+        </p:blipFill>
+        <p:spPr>
+          <a:xfrm>
+            <a:off x="8923175" y="3246516"/>
+            <a:ext cx="2619048" cy="1485714"/>
+          </a:xfrm>
+          <a:prstGeom prst="rect">
+            <a:avLst/>
+          </a:prstGeom>
+        </p:spPr>
+      </p:pic>
+      <p:pic>
+        <p:nvPicPr>
+          <p:cNvPr id="7" name="Picture 6">
+            <a:extLst>
+              <a:ext uri="{FF2B5EF4-FFF2-40B4-BE49-F238E27FC236}">
+                <a16:creationId xmlns:a16="http://schemas.microsoft.com/office/drawing/2014/main" id="{A6776662-DC70-45AB-B0BB-5085D4745D8F}"/>
+              </a:ext>
+            </a:extLst>
+          </p:cNvPr>
+          <p:cNvPicPr>
+            <a:picLocks noChangeAspect="1"/>
+          </p:cNvPicPr>
+          <p:nvPr/>
+        </p:nvPicPr>
+        <p:blipFill>
+          <a:blip r:embed="rId5"/>
+          <a:stretch>
+            <a:fillRect/>
+          </a:stretch>
+        </p:blipFill>
+        <p:spPr>
+          <a:xfrm>
+            <a:off x="5765120" y="3246516"/>
+            <a:ext cx="2504762" cy="1552381"/>
+          </a:xfrm>
+          <a:prstGeom prst="rect">
+            <a:avLst/>
+          </a:prstGeom>
+        </p:spPr>
+      </p:pic>
+      <p:pic>
+        <p:nvPicPr>
+          <p:cNvPr id="8" name="Picture 7">
+            <a:extLst>
+              <a:ext uri="{FF2B5EF4-FFF2-40B4-BE49-F238E27FC236}">
+                <a16:creationId xmlns:a16="http://schemas.microsoft.com/office/drawing/2014/main" id="{67CD8306-7F9A-4526-934E-0B6505132788}"/>
+              </a:ext>
+            </a:extLst>
+          </p:cNvPr>
+          <p:cNvPicPr>
+            <a:picLocks noChangeAspect="1"/>
+          </p:cNvPicPr>
+          <p:nvPr/>
+        </p:nvPicPr>
+        <p:blipFill>
+          <a:blip r:embed="rId6"/>
+          <a:stretch>
+            <a:fillRect/>
+          </a:stretch>
+        </p:blipFill>
+        <p:spPr>
+          <a:xfrm>
+            <a:off x="8856894" y="1472734"/>
+            <a:ext cx="2409524" cy="1533333"/>
+          </a:xfrm>
+          <a:prstGeom prst="rect">
+            <a:avLst/>
+          </a:prstGeom>
+        </p:spPr>
+      </p:pic>
+      <p:pic>
+        <p:nvPicPr>
+          <p:cNvPr id="9" name="Picture 8">
+            <a:extLst>
+              <a:ext uri="{FF2B5EF4-FFF2-40B4-BE49-F238E27FC236}">
+                <a16:creationId xmlns:a16="http://schemas.microsoft.com/office/drawing/2014/main" id="{7253371C-AB28-4982-9C38-EDC62DB99B08}"/>
+              </a:ext>
+            </a:extLst>
+          </p:cNvPr>
+          <p:cNvPicPr>
+            <a:picLocks noChangeAspect="1"/>
+          </p:cNvPicPr>
+          <p:nvPr/>
+        </p:nvPicPr>
+        <p:blipFill>
+          <a:blip r:embed="rId7"/>
+          <a:stretch>
+            <a:fillRect/>
+          </a:stretch>
+        </p:blipFill>
+        <p:spPr>
+          <a:xfrm>
+            <a:off x="5717501" y="1463210"/>
+            <a:ext cx="2552381" cy="1542857"/>
+          </a:xfrm>
+          <a:prstGeom prst="rect">
+            <a:avLst/>
+          </a:prstGeom>
+        </p:spPr>
+      </p:pic>
+      <p:pic>
+        <p:nvPicPr>
+          <p:cNvPr id="11" name="Picture 10">
+            <a:extLst>
+              <a:ext uri="{FF2B5EF4-FFF2-40B4-BE49-F238E27FC236}">
+                <a16:creationId xmlns:a16="http://schemas.microsoft.com/office/drawing/2014/main" id="{4C7E1CD2-E24A-44BF-AC3F-6C4A584B3E82}"/>
+              </a:ext>
+            </a:extLst>
+          </p:cNvPr>
+          <p:cNvPicPr>
+            <a:picLocks noChangeAspect="1"/>
+          </p:cNvPicPr>
+          <p:nvPr/>
+        </p:nvPicPr>
+        <p:blipFill>
+          <a:blip r:embed="rId8"/>
+          <a:stretch>
+            <a:fillRect/>
+          </a:stretch>
+        </p:blipFill>
+        <p:spPr>
+          <a:xfrm>
+            <a:off x="1458839" y="1496921"/>
+            <a:ext cx="2851903" cy="5072904"/>
+          </a:xfrm>
+          <a:prstGeom prst="rect">
+            <a:avLst/>
+          </a:prstGeom>
+        </p:spPr>
+      </p:pic>
+    </p:spTree>
+    <p:extLst>
+      <p:ext uri="{BB962C8B-B14F-4D97-AF65-F5344CB8AC3E}">
+        <p14:creationId xmlns:p14="http://schemas.microsoft.com/office/powerpoint/2010/main" val="70073816"/>
+      </p:ext>
+    </p:extLst>
+  </p:cSld>
+  <p:clrMapOvr>
+    <a:masterClrMapping/>
+  </p:clrMapOvr>
+</p:sld>
+</file>
+
+<file path=ppt/slides/slide14.xml><?xml version="1.0" encoding="utf-8"?>
+<p:sld xmlns:a="http://schemas.openxmlformats.org/drawingml/2006/main" xmlns:r="http://schemas.openxmlformats.org/officeDocument/2006/relationships" xmlns:p="http://schemas.openxmlformats.org/presentationml/2006/main">
+  <p:cSld>
+    <p:spTree>
+      <p:nvGrpSpPr>
+        <p:cNvPr id="1" name=""/>
+        <p:cNvGrpSpPr/>
+        <p:nvPr/>
+      </p:nvGrpSpPr>
+      <p:grpSpPr>
+        <a:xfrm>
+          <a:off x="0" y="0"/>
+          <a:ext cx="0" cy="0"/>
+          <a:chOff x="0" y="0"/>
+          <a:chExt cx="0" cy="0"/>
+        </a:xfrm>
+      </p:grpSpPr>
+      <p:sp>
+        <p:nvSpPr>
+          <p:cNvPr id="4" name="Title 3">
+            <a:extLst>
+              <a:ext uri="{FF2B5EF4-FFF2-40B4-BE49-F238E27FC236}">
+                <a16:creationId xmlns:a16="http://schemas.microsoft.com/office/drawing/2014/main" id="{5B7E3840-057E-4505-8882-F0D695DD5FCB}"/>
+              </a:ext>
+            </a:extLst>
+          </p:cNvPr>
+          <p:cNvSpPr>
+            <a:spLocks noGrp="1"/>
+          </p:cNvSpPr>
+          <p:nvPr>
+            <p:ph type="title"/>
+          </p:nvPr>
+        </p:nvSpPr>
+        <p:spPr>
+          <a:xfrm>
+            <a:off x="360784" y="137647"/>
+            <a:ext cx="11501249" cy="1325563"/>
+          </a:xfrm>
+        </p:spPr>
+        <p:txBody>
+          <a:bodyPr>
+            <a:normAutofit/>
+          </a:bodyPr>
+          <a:lstStyle/>
+          <a:p>
+            <a:pPr algn="ctr"/>
+            <a:r>
+              <a:rPr lang="en-US" sz="3300" dirty="0">
+                <a:latin typeface="Calibri Light (Headings)"/>
+              </a:rPr>
+              <a:t>Step 4:  Left Outer Join Each </a:t>
+            </a:r>
+            <a:r>
+              <a:rPr lang="en-US" sz="3300" dirty="0" err="1">
+                <a:latin typeface="Calibri Light (Headings)"/>
+              </a:rPr>
+              <a:t>titlePrincipal</a:t>
+            </a:r>
+            <a:r>
+              <a:rPr lang="en-US" sz="3300" dirty="0">
+                <a:latin typeface="Calibri Light (Headings)"/>
+              </a:rPr>
+              <a:t> Category Average Rating to Movie Average Rating</a:t>
+            </a:r>
+          </a:p>
+        </p:txBody>
+      </p:sp>
+      <p:pic>
+        <p:nvPicPr>
+          <p:cNvPr id="5" name="Picture 4">
+            <a:extLst>
+              <a:ext uri="{FF2B5EF4-FFF2-40B4-BE49-F238E27FC236}">
+                <a16:creationId xmlns:a16="http://schemas.microsoft.com/office/drawing/2014/main" id="{C80877AC-DE35-47B6-937A-50F96D3AE036}"/>
+              </a:ext>
+            </a:extLst>
+          </p:cNvPr>
+          <p:cNvPicPr>
+            <a:picLocks noChangeAspect="1"/>
+          </p:cNvPicPr>
+          <p:nvPr/>
+        </p:nvPicPr>
+        <p:blipFill>
+          <a:blip r:embed="rId2"/>
+          <a:stretch>
+            <a:fillRect/>
+          </a:stretch>
+        </p:blipFill>
+        <p:spPr>
+          <a:xfrm>
+            <a:off x="4102917" y="1799112"/>
+            <a:ext cx="3463650" cy="1804200"/>
+          </a:xfrm>
+          <a:prstGeom prst="rect">
+            <a:avLst/>
+          </a:prstGeom>
+        </p:spPr>
+      </p:pic>
+      <p:pic>
+        <p:nvPicPr>
+          <p:cNvPr id="6" name="Picture 5">
+            <a:extLst>
+              <a:ext uri="{FF2B5EF4-FFF2-40B4-BE49-F238E27FC236}">
+                <a16:creationId xmlns:a16="http://schemas.microsoft.com/office/drawing/2014/main" id="{A80DD1F6-3792-4513-96A5-50F8C5F7D733}"/>
+              </a:ext>
+            </a:extLst>
+          </p:cNvPr>
+          <p:cNvPicPr>
+            <a:picLocks noChangeAspect="1"/>
+          </p:cNvPicPr>
+          <p:nvPr/>
+        </p:nvPicPr>
+        <p:blipFill>
+          <a:blip r:embed="rId3"/>
+          <a:stretch>
+            <a:fillRect/>
+          </a:stretch>
+        </p:blipFill>
+        <p:spPr>
+          <a:xfrm>
+            <a:off x="1451018" y="4085735"/>
+            <a:ext cx="9495238" cy="1485714"/>
+          </a:xfrm>
+          <a:prstGeom prst="rect">
+            <a:avLst/>
+          </a:prstGeom>
+        </p:spPr>
+      </p:pic>
+    </p:spTree>
+    <p:extLst>
+      <p:ext uri="{BB962C8B-B14F-4D97-AF65-F5344CB8AC3E}">
+        <p14:creationId xmlns:p14="http://schemas.microsoft.com/office/powerpoint/2010/main" val="410438769"/>
+      </p:ext>
+    </p:extLst>
+  </p:cSld>
+  <p:clrMapOvr>
+    <a:masterClrMapping/>
+  </p:clrMapOvr>
+</p:sld>
+</file>
+
+<file path=ppt/slides/slide15.xml><?xml version="1.0" encoding="utf-8"?>
+<p:sld xmlns:a="http://schemas.openxmlformats.org/drawingml/2006/main" xmlns:r="http://schemas.openxmlformats.org/officeDocument/2006/relationships" xmlns:p="http://schemas.openxmlformats.org/presentationml/2006/main">
+  <p:cSld>
+    <p:bg>
+      <p:bgPr>
+        <a:solidFill>
+          <a:schemeClr val="bg1"/>
+        </a:solidFill>
+        <a:effectLst/>
+      </p:bgPr>
+    </p:bg>
+    <p:spTree>
+      <p:nvGrpSpPr>
+        <p:cNvPr id="1" name=""/>
+        <p:cNvGrpSpPr/>
+        <p:nvPr/>
+      </p:nvGrpSpPr>
+      <p:grpSpPr>
+        <a:xfrm>
+          <a:off x="0" y="0"/>
+          <a:ext cx="0" cy="0"/>
+          <a:chOff x="0" y="0"/>
+          <a:chExt cx="0" cy="0"/>
+        </a:xfrm>
+      </p:grpSpPr>
+      <p:sp>
+        <p:nvSpPr>
+          <p:cNvPr id="10" name="Rectangle 9">
+            <a:extLst>
+              <a:ext uri="{FF2B5EF4-FFF2-40B4-BE49-F238E27FC236}">
+                <a16:creationId xmlns:a16="http://schemas.microsoft.com/office/drawing/2014/main" id="{AB45A142-4255-493C-8284-5D566C121B10}"/>
+              </a:ext>
+              <a:ext uri="{C183D7F6-B498-43B3-948B-1728B52AA6E4}">
+                <adec:decorative xmlns="" xmlns:adec="http://schemas.microsoft.com/office/drawing/2017/decorative" val="1"/>
+              </a:ext>
+            </a:extLst>
+          </p:cNvPr>
+          <p:cNvSpPr>
+            <a:spLocks noGrp="1" noRot="1" noChangeAspect="1" noMove="1" noResize="1" noEditPoints="1" noAdjustHandles="1" noChangeArrowheads="1" noChangeShapeType="1" noTextEdit="1"/>
+          </p:cNvSpPr>
+          <p:nvPr>
+            <p:extLst>
+              <p:ext uri="{386F3935-93C4-4BCD-93E2-E3B085C9AB24}">
+                <p16:designElem xmlns:p16="http://schemas.microsoft.com/office/powerpoint/2015/main" val="1"/>
+              </p:ext>
+            </p:extLst>
+          </p:nvPr>
+        </p:nvSpPr>
+        <p:spPr bwMode="ltGray">
+          <a:xfrm>
+            <a:off x="336884" y="321177"/>
+            <a:ext cx="4332307" cy="6179552"/>
+          </a:xfrm>
+          <a:prstGeom prst="rect">
+            <a:avLst/>
+          </a:prstGeom>
+          <a:solidFill>
+            <a:srgbClr val="404040">
+              <a:alpha val="89804"/>
+            </a:srgbClr>
+          </a:solidFill>
+          <a:ln w="127000" cap="sq" cmpd="thinThick">
+            <a:solidFill>
+              <a:srgbClr val="595959">
+                <a:alpha val="80000"/>
+              </a:srgbClr>
+            </a:solidFill>
+          </a:ln>
+        </p:spPr>
+        <p:style>
+          <a:lnRef idx="2">
+            <a:schemeClr val="accent1">
+              <a:shade val="50000"/>
+            </a:schemeClr>
+          </a:lnRef>
+          <a:fillRef idx="1">
+            <a:schemeClr val="accent1"/>
+          </a:fillRef>
+          <a:effectRef idx="0">
+            <a:schemeClr val="accent1"/>
+          </a:effectRef>
+          <a:fontRef idx="minor">
+            <a:schemeClr val="lt1"/>
+          </a:fontRef>
+        </p:style>
+        <p:txBody>
+          <a:bodyPr rtlCol="0" anchor="ctr"/>
+          <a:lstStyle/>
+          <a:p>
+            <a:pPr algn="ctr"/>
+            <a:endParaRPr lang="en-US"/>
+          </a:p>
+        </p:txBody>
+      </p:sp>
+      <p:sp>
+        <p:nvSpPr>
+          <p:cNvPr id="4" name="Title 3">
+            <a:extLst>
+              <a:ext uri="{FF2B5EF4-FFF2-40B4-BE49-F238E27FC236}">
+                <a16:creationId xmlns:a16="http://schemas.microsoft.com/office/drawing/2014/main" id="{5B7E3840-057E-4505-8882-F0D695DD5FCB}"/>
+              </a:ext>
+            </a:extLst>
+          </p:cNvPr>
+          <p:cNvSpPr>
+            <a:spLocks noGrp="1"/>
+          </p:cNvSpPr>
+          <p:nvPr>
+            <p:ph type="title"/>
+          </p:nvPr>
+        </p:nvSpPr>
+        <p:spPr>
+          <a:xfrm>
+            <a:off x="674237" y="914400"/>
+            <a:ext cx="3657600" cy="2887579"/>
+          </a:xfrm>
+        </p:spPr>
+        <p:txBody>
+          <a:bodyPr vert="horz" lIns="91440" tIns="45720" rIns="91440" bIns="45720" rtlCol="0" anchor="b">
+            <a:normAutofit/>
+          </a:bodyPr>
+          <a:lstStyle/>
+          <a:p>
+            <a:pPr algn="ctr"/>
+            <a:r>
+              <a:rPr lang="en-US" kern="1200">
+                <a:solidFill>
+                  <a:srgbClr val="FFFFFF"/>
+                </a:solidFill>
+                <a:latin typeface="+mj-lt"/>
+                <a:ea typeface="+mj-ea"/>
+                <a:cs typeface="+mj-cs"/>
+              </a:rPr>
+              <a:t> Correlation to averageRating &amp; non Null Count</a:t>
+            </a:r>
+          </a:p>
+        </p:txBody>
+      </p:sp>
+      <p:cxnSp>
+        <p:nvCxnSpPr>
+          <p:cNvPr id="12" name="Straight Connector 11">
+            <a:extLst>
+              <a:ext uri="{FF2B5EF4-FFF2-40B4-BE49-F238E27FC236}">
+                <a16:creationId xmlns:a16="http://schemas.microsoft.com/office/drawing/2014/main" id="{38FB9660-F42F-4313-BBC4-47C007FE484C}"/>
+              </a:ext>
+              <a:ext uri="{C183D7F6-B498-43B3-948B-1728B52AA6E4}">
+                <adec:decorative xmlns="" xmlns:adec="http://schemas.microsoft.com/office/drawing/2017/decorative" val="1"/>
+              </a:ext>
+            </a:extLst>
+          </p:cNvPr>
+          <p:cNvCxnSpPr>
+            <a:cxnSpLocks noGrp="1" noRot="1" noChangeAspect="1" noMove="1" noResize="1" noEditPoints="1" noAdjustHandles="1" noChangeArrowheads="1" noChangeShapeType="1"/>
+          </p:cNvCxnSpPr>
+          <p:nvPr>
+            <p:extLst>
+              <p:ext uri="{386F3935-93C4-4BCD-93E2-E3B085C9AB24}">
+                <p16:designElem xmlns:p16="http://schemas.microsoft.com/office/powerpoint/2015/main" val="1"/>
+              </p:ext>
+            </p:extLst>
+          </p:nvPr>
+        </p:nvCxnSpPr>
+        <p:spPr>
+          <a:xfrm>
+            <a:off x="1191126" y="3910267"/>
+            <a:ext cx="2586790" cy="0"/>
+          </a:xfrm>
+          <a:prstGeom prst="line">
+            <a:avLst/>
+          </a:prstGeom>
+          <a:ln w="22225">
+            <a:solidFill>
+              <a:srgbClr val="D9D9D9"/>
+            </a:solidFill>
+          </a:ln>
+        </p:spPr>
+        <p:style>
+          <a:lnRef idx="1">
+            <a:schemeClr val="accent1"/>
+          </a:lnRef>
+          <a:fillRef idx="0">
+            <a:schemeClr val="accent1"/>
+          </a:fillRef>
+          <a:effectRef idx="0">
+            <a:schemeClr val="accent1"/>
+          </a:effectRef>
+          <a:fontRef idx="minor">
+            <a:schemeClr val="tx1"/>
+          </a:fontRef>
+        </p:style>
+      </p:cxnSp>
+      <p:pic>
+        <p:nvPicPr>
+          <p:cNvPr id="5" name="Picture 4">
+            <a:extLst>
+              <a:ext uri="{FF2B5EF4-FFF2-40B4-BE49-F238E27FC236}">
+                <a16:creationId xmlns:a16="http://schemas.microsoft.com/office/drawing/2014/main" id="{411C0E6B-9339-4B72-B14D-2F36CA09BEC1}"/>
+              </a:ext>
+            </a:extLst>
+          </p:cNvPr>
+          <p:cNvPicPr>
+            <a:picLocks noChangeAspect="1"/>
+          </p:cNvPicPr>
+          <p:nvPr/>
+        </p:nvPicPr>
+        <p:blipFill>
+          <a:blip r:embed="rId2"/>
+          <a:stretch>
+            <a:fillRect/>
+          </a:stretch>
+        </p:blipFill>
+        <p:spPr>
+          <a:xfrm>
+            <a:off x="5153822" y="1396985"/>
+            <a:ext cx="6553545" cy="4071971"/>
+          </a:xfrm>
+          <a:prstGeom prst="rect">
+            <a:avLst/>
+          </a:prstGeom>
+        </p:spPr>
+      </p:pic>
+    </p:spTree>
+    <p:extLst>
+      <p:ext uri="{BB962C8B-B14F-4D97-AF65-F5344CB8AC3E}">
+        <p14:creationId xmlns:p14="http://schemas.microsoft.com/office/powerpoint/2010/main" val="4024361519"/>
+      </p:ext>
+    </p:extLst>
+  </p:cSld>
+  <p:clrMapOvr>
+    <a:masterClrMapping/>
+  </p:clrMapOvr>
+</p:sld>
+</file>
+
+<file path=ppt/slides/slide16.xml><?xml version="1.0" encoding="utf-8"?>
+<p:sld xmlns:a="http://schemas.openxmlformats.org/drawingml/2006/main" xmlns:r="http://schemas.openxmlformats.org/officeDocument/2006/relationships" xmlns:p="http://schemas.openxmlformats.org/presentationml/2006/main">
+  <p:cSld>
+    <p:spTree>
+      <p:nvGrpSpPr>
+        <p:cNvPr id="1" name=""/>
+        <p:cNvGrpSpPr/>
+        <p:nvPr/>
+      </p:nvGrpSpPr>
+      <p:grpSpPr>
+        <a:xfrm>
+          <a:off x="0" y="0"/>
+          <a:ext cx="0" cy="0"/>
+          <a:chOff x="0" y="0"/>
+          <a:chExt cx="0" cy="0"/>
+        </a:xfrm>
+      </p:grpSpPr>
+      <p:sp>
+        <p:nvSpPr>
+          <p:cNvPr id="2" name="TextBox 1">
+            <a:extLst>
+              <a:ext uri="{FF2B5EF4-FFF2-40B4-BE49-F238E27FC236}">
+                <a16:creationId xmlns:a16="http://schemas.microsoft.com/office/drawing/2014/main" id="{9A5B267B-DC99-48D5-AAE4-0080DA632EE8}"/>
+              </a:ext>
+            </a:extLst>
+          </p:cNvPr>
+          <p:cNvSpPr txBox="1"/>
+          <p:nvPr/>
+        </p:nvSpPr>
+        <p:spPr>
+          <a:xfrm>
+            <a:off x="2330824" y="699246"/>
+            <a:ext cx="8444753" cy="923330"/>
+          </a:xfrm>
+          <a:prstGeom prst="rect">
+            <a:avLst/>
+          </a:prstGeom>
+          <a:noFill/>
+        </p:spPr>
+        <p:txBody>
+          <a:bodyPr wrap="square" rtlCol="0">
+            <a:spAutoFit/>
+          </a:bodyPr>
+          <a:lstStyle/>
+          <a:p>
+            <a:pPr algn="ctr"/>
+            <a:r>
+              <a:rPr lang="en-US" sz="5400" dirty="0"/>
+              <a:t>Modeling</a:t>
+            </a:r>
+          </a:p>
+        </p:txBody>
+      </p:sp>
+    </p:spTree>
+    <p:extLst>
+      <p:ext uri="{BB962C8B-B14F-4D97-AF65-F5344CB8AC3E}">
+        <p14:creationId xmlns:p14="http://schemas.microsoft.com/office/powerpoint/2010/main" val="379452362"/>
+      </p:ext>
+    </p:extLst>
+  </p:cSld>
+  <p:clrMapOvr>
+    <a:masterClrMapping/>
+  </p:clrMapOvr>
+</p:sld>
+</file>
+
+<file path=ppt/slides/slide17.xml><?xml version="1.0" encoding="utf-8"?>
+<p:sld xmlns:a="http://schemas.openxmlformats.org/drawingml/2006/main" xmlns:r="http://schemas.openxmlformats.org/officeDocument/2006/relationships" xmlns:p="http://schemas.openxmlformats.org/presentationml/2006/main">
+  <p:cSld>
+    <p:spTree>
+      <p:nvGrpSpPr>
+        <p:cNvPr id="1" name=""/>
+        <p:cNvGrpSpPr/>
+        <p:nvPr/>
+      </p:nvGrpSpPr>
+      <p:grpSpPr>
+        <a:xfrm>
+          <a:off x="0" y="0"/>
+          <a:ext cx="0" cy="0"/>
+          <a:chOff x="0" y="0"/>
+          <a:chExt cx="0" cy="0"/>
+        </a:xfrm>
+      </p:grpSpPr>
+      <p:sp>
+        <p:nvSpPr>
           <p:cNvPr id="2" name="TextBox 1">
             <a:extLst>
               <a:ext uri="{FF2B5EF4-FFF2-40B4-BE49-F238E27FC236}">
@@ -3626,7 +4846,7 @@
 </p:sld>
 </file>
 
-<file path=ppt/slides/slide13.xml><?xml version="1.0" encoding="utf-8"?>
+<file path=ppt/slides/slide18.xml><?xml version="1.0" encoding="utf-8"?>
 <p:sld xmlns:a="http://schemas.openxmlformats.org/drawingml/2006/main" xmlns:r="http://schemas.openxmlformats.org/officeDocument/2006/relationships" xmlns:p="http://schemas.openxmlformats.org/presentationml/2006/main">
   <p:cSld>
     <p:bg>
@@ -3714,7 +4934,7 @@
                 <a16:creationId xmlns:a16="http://schemas.microsoft.com/office/drawing/2014/main" id="{E0D60ECE-8986-45DC-B7FE-EC7699B466B8}"/>
               </a:ext>
               <a:ext uri="{C183D7F6-B498-43B3-948B-1728B52AA6E4}">
-                <adec:decorative xmlns:adec="http://schemas.microsoft.com/office/drawing/2017/decorative" xmlns="" val="1"/>
+                <adec:decorative xmlns="" xmlns:adec="http://schemas.microsoft.com/office/drawing/2017/decorative" val="1"/>
               </a:ext>
             </a:extLst>
           </p:cNvPr>
@@ -3883,7 +5103,7 @@
                 <a16:creationId xmlns:a16="http://schemas.microsoft.com/office/drawing/2014/main" id="{96964194-5878-40D2-8EC0-DDC58387FA56}"/>
               </a:ext>
               <a:ext uri="{C183D7F6-B498-43B3-948B-1728B52AA6E4}">
-                <adec:decorative xmlns:adec="http://schemas.microsoft.com/office/drawing/2017/decorative" xmlns="" val="1"/>
+                <adec:decorative xmlns="" xmlns:adec="http://schemas.microsoft.com/office/drawing/2017/decorative" val="1"/>
               </a:ext>
             </a:extLst>
           </p:cNvPr>
@@ -4202,7 +5422,7 @@
 </p:sld>
 </file>
 
-<file path=ppt/slides/slide14.xml><?xml version="1.0" encoding="utf-8"?>
+<file path=ppt/slides/slide19.xml><?xml version="1.0" encoding="utf-8"?>
 <p:sld xmlns:a="http://schemas.openxmlformats.org/drawingml/2006/main" xmlns:r="http://schemas.openxmlformats.org/officeDocument/2006/relationships" xmlns:p="http://schemas.openxmlformats.org/presentationml/2006/main">
   <p:cSld>
     <p:spTree>
@@ -4268,73 +5488,7 @@
 </p:sld>
 </file>
 
-<file path=ppt/slides/slide15.xml><?xml version="1.0" encoding="utf-8"?>
-<p:sld xmlns:a="http://schemas.openxmlformats.org/drawingml/2006/main" xmlns:r="http://schemas.openxmlformats.org/officeDocument/2006/relationships" xmlns:p="http://schemas.openxmlformats.org/presentationml/2006/main">
-  <p:cSld>
-    <p:spTree>
-      <p:nvGrpSpPr>
-        <p:cNvPr id="1" name=""/>
-        <p:cNvGrpSpPr/>
-        <p:nvPr/>
-      </p:nvGrpSpPr>
-      <p:grpSpPr>
-        <a:xfrm>
-          <a:off x="0" y="0"/>
-          <a:ext cx="0" cy="0"/>
-          <a:chOff x="0" y="0"/>
-          <a:chExt cx="0" cy="0"/>
-        </a:xfrm>
-      </p:grpSpPr>
-      <p:pic>
-        <p:nvPicPr>
-          <p:cNvPr id="3" name="Picture 2">
-            <a:extLst>
-              <a:ext uri="{FF2B5EF4-FFF2-40B4-BE49-F238E27FC236}">
-                <a16:creationId xmlns:a16="http://schemas.microsoft.com/office/drawing/2014/main" id="{271AABA0-8A35-4427-987D-CF2F01C5BB99}"/>
-              </a:ext>
-            </a:extLst>
-          </p:cNvPr>
-          <p:cNvPicPr>
-            <a:picLocks noChangeAspect="1"/>
-          </p:cNvPicPr>
-          <p:nvPr/>
-        </p:nvPicPr>
-        <p:blipFill>
-          <a:blip r:embed="rId2">
-            <a:extLst>
-              <a:ext uri="{28A0092B-C50C-407E-A947-70E740481C1C}">
-                <a14:useLocalDpi xmlns:a14="http://schemas.microsoft.com/office/drawing/2010/main" val="0"/>
-              </a:ext>
-            </a:extLst>
-          </a:blip>
-          <a:stretch>
-            <a:fillRect/>
-          </a:stretch>
-        </p:blipFill>
-        <p:spPr>
-          <a:xfrm>
-            <a:off x="125640" y="431117"/>
-            <a:ext cx="11940720" cy="5995766"/>
-          </a:xfrm>
-          <a:prstGeom prst="rect">
-            <a:avLst/>
-          </a:prstGeom>
-        </p:spPr>
-      </p:pic>
-    </p:spTree>
-    <p:extLst>
-      <p:ext uri="{BB962C8B-B14F-4D97-AF65-F5344CB8AC3E}">
-        <p14:creationId xmlns:p14="http://schemas.microsoft.com/office/powerpoint/2010/main" val="3084361659"/>
-      </p:ext>
-    </p:extLst>
-  </p:cSld>
-  <p:clrMapOvr>
-    <a:masterClrMapping/>
-  </p:clrMapOvr>
-</p:sld>
-</file>
-
-<file path=ppt/slides/slide16.xml><?xml version="1.0" encoding="utf-8"?>
+<file path=ppt/slides/slide2.xml><?xml version="1.0" encoding="utf-8"?>
 <p:sld xmlns:a="http://schemas.openxmlformats.org/drawingml/2006/main" xmlns:r="http://schemas.openxmlformats.org/officeDocument/2006/relationships" xmlns:p="http://schemas.openxmlformats.org/presentationml/2006/main">
   <p:cSld>
     <p:bg>
@@ -4361,13 +5515,13 @@
       </p:grpSpPr>
       <p:sp>
         <p:nvSpPr>
-          <p:cNvPr id="8" name="Rectangle 7">
-            <a:extLst>
-              <a:ext uri="{FF2B5EF4-FFF2-40B4-BE49-F238E27FC236}">
-                <a16:creationId xmlns:a16="http://schemas.microsoft.com/office/drawing/2014/main" id="{57845966-6EFC-468A-9CC7-BAB4B95854E7}"/>
+          <p:cNvPr id="11" name="Rectangle 10">
+            <a:extLst>
+              <a:ext uri="{FF2B5EF4-FFF2-40B4-BE49-F238E27FC236}">
+                <a16:creationId xmlns:a16="http://schemas.microsoft.com/office/drawing/2014/main" id="{4038CB10-1F5C-4D54-9DF7-12586DE5B007}"/>
               </a:ext>
               <a:ext uri="{C183D7F6-B498-43B3-948B-1728B52AA6E4}">
-                <adec:decorative xmlns:adec="http://schemas.microsoft.com/office/drawing/2017/decorative" xmlns="" val="1"/>
+                <adec:decorative xmlns="" xmlns:adec="http://schemas.microsoft.com/office/drawing/2017/decorative" val="1"/>
               </a:ext>
             </a:extLst>
           </p:cNvPr>
@@ -4384,14 +5538,14 @@
         </p:nvSpPr>
         <p:spPr>
           <a:xfrm>
-            <a:off x="1354372" y="0"/>
-            <a:ext cx="9483256" cy="6858000"/>
+            <a:off x="327546" y="4572000"/>
+            <a:ext cx="7058307" cy="1964266"/>
           </a:xfrm>
           <a:prstGeom prst="rect">
             <a:avLst/>
           </a:prstGeom>
           <a:solidFill>
-            <a:srgbClr val="6E4F4B"/>
+            <a:srgbClr val="BB8577"/>
           </a:solidFill>
           <a:ln>
             <a:noFill/>
@@ -4417,26 +5571,142 @@
           <a:bodyPr rtlCol="0" anchor="ctr"/>
           <a:lstStyle/>
           <a:p>
-            <a:pPr algn="ctr"/>
-            <a:endParaRPr lang="en-US"/>
+            <a:pPr marL="0" marR="0" lvl="0" indent="0" algn="ctr" defTabSz="914400" rtl="0" eaLnBrk="1" fontAlgn="auto" latinLnBrk="0" hangingPunct="1">
+              <a:lnSpc>
+                <a:spcPct val="100000"/>
+              </a:lnSpc>
+              <a:spcBef>
+                <a:spcPts val="0"/>
+              </a:spcBef>
+              <a:spcAft>
+                <a:spcPts val="0"/>
+              </a:spcAft>
+              <a:buClrTx/>
+              <a:buSzTx/>
+              <a:buFontTx/>
+              <a:buNone/>
+              <a:tabLst/>
+              <a:defRPr/>
+            </a:pPr>
+            <a:endParaRPr kumimoji="0" lang="en-US" sz="1800" b="0" i="0" u="none" strike="noStrike" kern="1200" cap="none" spc="0" normalizeH="0" baseline="0" noProof="0">
+              <a:ln>
+                <a:noFill/>
+              </a:ln>
+              <a:solidFill>
+                <a:prstClr val="white"/>
+              </a:solidFill>
+              <a:effectLst/>
+              <a:uLnTx/>
+              <a:uFillTx/>
+              <a:latin typeface="Calibri" panose="020F0502020204030204"/>
+              <a:ea typeface="+mn-ea"/>
+              <a:cs typeface="+mn-cs"/>
+            </a:endParaRPr>
+          </a:p>
+        </p:txBody>
+      </p:sp>
+      <p:sp>
+        <p:nvSpPr>
+          <p:cNvPr id="2" name="TextBox 1">
+            <a:extLst>
+              <a:ext uri="{FF2B5EF4-FFF2-40B4-BE49-F238E27FC236}">
+                <a16:creationId xmlns:a16="http://schemas.microsoft.com/office/drawing/2014/main" id="{9A5B267B-DC99-48D5-AAE4-0080DA632EE8}"/>
+              </a:ext>
+            </a:extLst>
+          </p:cNvPr>
+          <p:cNvSpPr txBox="1"/>
+          <p:nvPr/>
+        </p:nvSpPr>
+        <p:spPr>
+          <a:xfrm>
+            <a:off x="524256" y="4767072"/>
+            <a:ext cx="6594189" cy="1625210"/>
+          </a:xfrm>
+          <a:prstGeom prst="rect">
+            <a:avLst/>
+          </a:prstGeom>
+        </p:spPr>
+        <p:txBody>
+          <a:bodyPr vert="horz" lIns="91440" tIns="45720" rIns="91440" bIns="45720" rtlCol="0" anchor="ctr">
+            <a:normAutofit/>
+          </a:bodyPr>
+          <a:lstStyle/>
+          <a:p>
+            <a:pPr algn="r">
+              <a:lnSpc>
+                <a:spcPct val="90000"/>
+              </a:lnSpc>
+              <a:spcBef>
+                <a:spcPct val="0"/>
+              </a:spcBef>
+              <a:spcAft>
+                <a:spcPts val="600"/>
+              </a:spcAft>
+            </a:pPr>
+            <a:r>
+              <a:rPr lang="en-US" sz="4400">
+                <a:solidFill>
+                  <a:srgbClr val="FFFFFF"/>
+                </a:solidFill>
+                <a:latin typeface="+mj-lt"/>
+                <a:ea typeface="+mj-ea"/>
+                <a:cs typeface="+mj-cs"/>
+              </a:rPr>
+              <a:t>Narrative</a:t>
+            </a:r>
           </a:p>
         </p:txBody>
       </p:sp>
       <p:pic>
         <p:nvPicPr>
-          <p:cNvPr id="10" name="Picture 9">
-            <a:extLst>
-              <a:ext uri="{FF2B5EF4-FFF2-40B4-BE49-F238E27FC236}">
-                <a16:creationId xmlns:a16="http://schemas.microsoft.com/office/drawing/2014/main" id="{75554383-98AF-4A47-BB65-705FAAA4BE6A}"/>
+          <p:cNvPr id="6" name="Picture 5">
+            <a:extLst>
+              <a:ext uri="{FF2B5EF4-FFF2-40B4-BE49-F238E27FC236}">
+                <a16:creationId xmlns:a16="http://schemas.microsoft.com/office/drawing/2014/main" id="{48D482F4-FAC7-4F34-B519-1AFCACD84A50}"/>
+              </a:ext>
+            </a:extLst>
+          </p:cNvPr>
+          <p:cNvPicPr>
+            <a:picLocks noChangeAspect="1"/>
+          </p:cNvPicPr>
+          <p:nvPr/>
+        </p:nvPicPr>
+        <p:blipFill rotWithShape="1">
+          <a:blip r:embed="rId2">
+            <a:extLst>
+              <a:ext uri="{28A0092B-C50C-407E-A947-70E740481C1C}">
+                <a14:useLocalDpi xmlns:a14="http://schemas.microsoft.com/office/drawing/2010/main" val="0"/>
+              </a:ext>
+            </a:extLst>
+          </a:blip>
+          <a:srcRect l="12990" r="-1" b="-1"/>
+          <a:stretch/>
+        </p:blipFill>
+        <p:spPr>
+          <a:xfrm>
+            <a:off x="327547" y="321733"/>
+            <a:ext cx="7058306" cy="4107392"/>
+          </a:xfrm>
+          <a:prstGeom prst="rect">
+            <a:avLst/>
+          </a:prstGeom>
+        </p:spPr>
+      </p:pic>
+      <p:sp>
+        <p:nvSpPr>
+          <p:cNvPr id="13" name="Rectangle 12">
+            <a:extLst>
+              <a:ext uri="{FF2B5EF4-FFF2-40B4-BE49-F238E27FC236}">
+                <a16:creationId xmlns:a16="http://schemas.microsoft.com/office/drawing/2014/main" id="{73ED6512-6858-4552-B699-9A97FE9A4EA2}"/>
               </a:ext>
               <a:ext uri="{C183D7F6-B498-43B3-948B-1728B52AA6E4}">
-                <adec:decorative xmlns:adec="http://schemas.microsoft.com/office/drawing/2017/decorative" xmlns="" val="1"/>
-              </a:ext>
-            </a:extLst>
-          </p:cNvPr>
-          <p:cNvPicPr>
-            <a:picLocks noGrp="1" noRot="1" noChangeAspect="1" noMove="1" noResize="1" noEditPoints="1" noAdjustHandles="1" noChangeArrowheads="1" noChangeShapeType="1" noCrop="1"/>
-          </p:cNvPicPr>
+                <adec:decorative xmlns="" xmlns:adec="http://schemas.microsoft.com/office/drawing/2017/decorative" val="1"/>
+              </a:ext>
+            </a:extLst>
+          </p:cNvPr>
+          <p:cNvSpPr>
+            <a:spLocks noGrp="1" noRot="1" noChangeAspect="1" noMove="1" noResize="1" noEditPoints="1" noAdjustHandles="1" noChangeArrowheads="1" noChangeShapeType="1" noTextEdit="1"/>
+          </p:cNvSpPr>
           <p:nvPr>
             <p:extLst>
               <p:ext uri="{386F3935-93C4-4BCD-93E2-E3B085C9AB24}">
@@ -4444,6 +5714,216 @@
               </p:ext>
             </p:extLst>
           </p:nvPr>
+        </p:nvSpPr>
+        <p:spPr>
+          <a:xfrm>
+            <a:off x="7534655" y="321732"/>
+            <a:ext cx="4335613" cy="6214534"/>
+          </a:xfrm>
+          <a:prstGeom prst="rect">
+            <a:avLst/>
+          </a:prstGeom>
+          <a:solidFill>
+            <a:srgbClr val="404040"/>
+          </a:solidFill>
+          <a:ln>
+            <a:noFill/>
+          </a:ln>
+        </p:spPr>
+        <p:style>
+          <a:lnRef idx="2">
+            <a:schemeClr val="accent1">
+              <a:shade val="50000"/>
+            </a:schemeClr>
+          </a:lnRef>
+          <a:fillRef idx="1">
+            <a:schemeClr val="accent1"/>
+          </a:fillRef>
+          <a:effectRef idx="0">
+            <a:schemeClr val="accent1"/>
+          </a:effectRef>
+          <a:fontRef idx="minor">
+            <a:schemeClr val="lt1"/>
+          </a:fontRef>
+        </p:style>
+        <p:txBody>
+          <a:bodyPr rtlCol="0" anchor="ctr"/>
+          <a:lstStyle/>
+          <a:p>
+            <a:pPr marL="0" marR="0" lvl="0" indent="0" algn="ctr" defTabSz="914400" rtl="0" eaLnBrk="1" fontAlgn="auto" latinLnBrk="0" hangingPunct="1">
+              <a:lnSpc>
+                <a:spcPct val="100000"/>
+              </a:lnSpc>
+              <a:spcBef>
+                <a:spcPts val="0"/>
+              </a:spcBef>
+              <a:spcAft>
+                <a:spcPts val="0"/>
+              </a:spcAft>
+              <a:buClrTx/>
+              <a:buSzTx/>
+              <a:buFontTx/>
+              <a:buNone/>
+              <a:tabLst/>
+              <a:defRPr/>
+            </a:pPr>
+            <a:endParaRPr kumimoji="0" lang="en-US" sz="1800" b="0" i="0" u="none" strike="noStrike" kern="1200" cap="none" spc="0" normalizeH="0" baseline="0" noProof="0">
+              <a:ln>
+                <a:noFill/>
+              </a:ln>
+              <a:solidFill>
+                <a:prstClr val="white"/>
+              </a:solidFill>
+              <a:effectLst/>
+              <a:uLnTx/>
+              <a:uFillTx/>
+              <a:latin typeface="Calibri" panose="020F0502020204030204"/>
+              <a:ea typeface="+mn-ea"/>
+              <a:cs typeface="+mn-cs"/>
+            </a:endParaRPr>
+          </a:p>
+        </p:txBody>
+      </p:sp>
+      <p:sp>
+        <p:nvSpPr>
+          <p:cNvPr id="3" name="TextBox 2">
+            <a:extLst>
+              <a:ext uri="{FF2B5EF4-FFF2-40B4-BE49-F238E27FC236}">
+                <a16:creationId xmlns:a16="http://schemas.microsoft.com/office/drawing/2014/main" id="{B73F6C98-15CD-4670-AE38-F58E18427A3C}"/>
+              </a:ext>
+            </a:extLst>
+          </p:cNvPr>
+          <p:cNvSpPr txBox="1"/>
+          <p:nvPr/>
+        </p:nvSpPr>
+        <p:spPr>
+          <a:xfrm>
+            <a:off x="8029319" y="917725"/>
+            <a:ext cx="3424739" cy="4852362"/>
+          </a:xfrm>
+          <a:prstGeom prst="rect">
+            <a:avLst/>
+          </a:prstGeom>
+        </p:spPr>
+        <p:txBody>
+          <a:bodyPr vert="horz" lIns="91440" tIns="45720" rIns="91440" bIns="45720" rtlCol="0" anchor="ctr">
+            <a:normAutofit/>
+          </a:bodyPr>
+          <a:lstStyle/>
+          <a:p>
+            <a:pPr>
+              <a:lnSpc>
+                <a:spcPct val="90000"/>
+              </a:lnSpc>
+              <a:spcAft>
+                <a:spcPts val="600"/>
+              </a:spcAft>
+            </a:pPr>
+            <a:r>
+              <a:rPr lang="en-US" sz="2000" dirty="0">
+                <a:solidFill>
+                  <a:srgbClr val="FFFFFF"/>
+                </a:solidFill>
+              </a:rPr>
+              <a:t>After winning the lottery we want to start a movie business to produce movies. </a:t>
+            </a:r>
+          </a:p>
+          <a:p>
+            <a:pPr>
+              <a:lnSpc>
+                <a:spcPct val="90000"/>
+              </a:lnSpc>
+              <a:spcAft>
+                <a:spcPts val="600"/>
+              </a:spcAft>
+            </a:pPr>
+            <a:endParaRPr lang="en-US" sz="2000" dirty="0">
+              <a:solidFill>
+                <a:srgbClr val="FFFFFF"/>
+              </a:solidFill>
+            </a:endParaRPr>
+          </a:p>
+          <a:p>
+            <a:pPr>
+              <a:lnSpc>
+                <a:spcPct val="90000"/>
+              </a:lnSpc>
+              <a:spcAft>
+                <a:spcPts val="600"/>
+              </a:spcAft>
+            </a:pPr>
+            <a:r>
+              <a:rPr lang="en-US" sz="2000" dirty="0">
+                <a:solidFill>
+                  <a:srgbClr val="FFFFFF"/>
+                </a:solidFill>
+              </a:rPr>
+              <a:t>GOAL:</a:t>
+            </a:r>
+          </a:p>
+          <a:p>
+            <a:pPr>
+              <a:lnSpc>
+                <a:spcPct val="90000"/>
+              </a:lnSpc>
+              <a:spcAft>
+                <a:spcPts val="600"/>
+              </a:spcAft>
+            </a:pPr>
+            <a:r>
+              <a:rPr lang="en-US" sz="2000" dirty="0">
+                <a:solidFill>
+                  <a:srgbClr val="FFFFFF"/>
+                </a:solidFill>
+              </a:rPr>
+              <a:t>Produce the highest possible average rated movies.</a:t>
+            </a:r>
+          </a:p>
+        </p:txBody>
+      </p:sp>
+    </p:spTree>
+    <p:extLst>
+      <p:ext uri="{BB962C8B-B14F-4D97-AF65-F5344CB8AC3E}">
+        <p14:creationId xmlns:p14="http://schemas.microsoft.com/office/powerpoint/2010/main" val="858000049"/>
+      </p:ext>
+    </p:extLst>
+  </p:cSld>
+  <p:clrMapOvr>
+    <a:masterClrMapping/>
+  </p:clrMapOvr>
+</p:sld>
+</file>
+
+<file path=ppt/slides/slide20.xml><?xml version="1.0" encoding="utf-8"?>
+<p:sld xmlns:a="http://schemas.openxmlformats.org/drawingml/2006/main" xmlns:r="http://schemas.openxmlformats.org/officeDocument/2006/relationships" xmlns:p="http://schemas.openxmlformats.org/presentationml/2006/main">
+  <p:cSld>
+    <p:spTree>
+      <p:nvGrpSpPr>
+        <p:cNvPr id="1" name=""/>
+        <p:cNvGrpSpPr/>
+        <p:nvPr/>
+      </p:nvGrpSpPr>
+      <p:grpSpPr>
+        <a:xfrm>
+          <a:off x="0" y="0"/>
+          <a:ext cx="0" cy="0"/>
+          <a:chOff x="0" y="0"/>
+          <a:chExt cx="0" cy="0"/>
+        </a:xfrm>
+      </p:grpSpPr>
+      <p:pic>
+        <p:nvPicPr>
+          <p:cNvPr id="3" name="Picture 2">
+            <a:extLst>
+              <a:ext uri="{FF2B5EF4-FFF2-40B4-BE49-F238E27FC236}">
+                <a16:creationId xmlns:a16="http://schemas.microsoft.com/office/drawing/2014/main" id="{271AABA0-8A35-4427-987D-CF2F01C5BB99}"/>
+              </a:ext>
+            </a:extLst>
+          </p:cNvPr>
+          <p:cNvPicPr>
+            <a:picLocks noChangeAspect="1"/>
+          </p:cNvPicPr>
+          <p:nvPr/>
         </p:nvPicPr>
         <p:blipFill>
           <a:blip r:embed="rId2">
@@ -4459,14 +5939,160 @@
         </p:blipFill>
         <p:spPr>
           <a:xfrm>
-            <a:off x="0" y="0"/>
-            <a:ext cx="12192000" cy="6858000"/>
+            <a:off x="125640" y="431117"/>
+            <a:ext cx="11940720" cy="5995766"/>
           </a:xfrm>
           <a:prstGeom prst="rect">
             <a:avLst/>
           </a:prstGeom>
         </p:spPr>
       </p:pic>
+    </p:spTree>
+    <p:extLst>
+      <p:ext uri="{BB962C8B-B14F-4D97-AF65-F5344CB8AC3E}">
+        <p14:creationId xmlns:p14="http://schemas.microsoft.com/office/powerpoint/2010/main" val="3084361659"/>
+      </p:ext>
+    </p:extLst>
+  </p:cSld>
+  <p:clrMapOvr>
+    <a:masterClrMapping/>
+  </p:clrMapOvr>
+</p:sld>
+</file>
+
+<file path=ppt/slides/slide21.xml><?xml version="1.0" encoding="utf-8"?>
+<p:sld xmlns:a="http://schemas.openxmlformats.org/drawingml/2006/main" xmlns:r="http://schemas.openxmlformats.org/officeDocument/2006/relationships" xmlns:p="http://schemas.openxmlformats.org/presentationml/2006/main">
+  <p:cSld>
+    <p:bg>
+      <p:bgPr>
+        <a:solidFill>
+          <a:schemeClr val="bg1"/>
+        </a:solidFill>
+        <a:effectLst/>
+      </p:bgPr>
+    </p:bg>
+    <p:spTree>
+      <p:nvGrpSpPr>
+        <p:cNvPr id="1" name=""/>
+        <p:cNvGrpSpPr/>
+        <p:nvPr/>
+      </p:nvGrpSpPr>
+      <p:grpSpPr>
+        <a:xfrm>
+          <a:off x="0" y="0"/>
+          <a:ext cx="0" cy="0"/>
+          <a:chOff x="0" y="0"/>
+          <a:chExt cx="0" cy="0"/>
+        </a:xfrm>
+      </p:grpSpPr>
+      <p:sp>
+        <p:nvSpPr>
+          <p:cNvPr id="8" name="Rectangle 7">
+            <a:extLst>
+              <a:ext uri="{FF2B5EF4-FFF2-40B4-BE49-F238E27FC236}">
+                <a16:creationId xmlns:a16="http://schemas.microsoft.com/office/drawing/2014/main" id="{57845966-6EFC-468A-9CC7-BAB4B95854E7}"/>
+              </a:ext>
+              <a:ext uri="{C183D7F6-B498-43B3-948B-1728B52AA6E4}">
+                <adec:decorative xmlns="" xmlns:adec="http://schemas.microsoft.com/office/drawing/2017/decorative" val="1"/>
+              </a:ext>
+            </a:extLst>
+          </p:cNvPr>
+          <p:cNvSpPr>
+            <a:spLocks noGrp="1" noRot="1" noChangeAspect="1" noMove="1" noResize="1" noEditPoints="1" noAdjustHandles="1" noChangeArrowheads="1" noChangeShapeType="1" noTextEdit="1"/>
+          </p:cNvSpPr>
+          <p:nvPr>
+            <p:extLst>
+              <p:ext uri="{386F3935-93C4-4BCD-93E2-E3B085C9AB24}">
+                <p16:designElem xmlns:p16="http://schemas.microsoft.com/office/powerpoint/2015/main" val="1"/>
+              </p:ext>
+            </p:extLst>
+          </p:nvPr>
+        </p:nvSpPr>
+        <p:spPr>
+          <a:xfrm>
+            <a:off x="1354372" y="0"/>
+            <a:ext cx="9483256" cy="6858000"/>
+          </a:xfrm>
+          <a:prstGeom prst="rect">
+            <a:avLst/>
+          </a:prstGeom>
+          <a:solidFill>
+            <a:srgbClr val="6E4F4B"/>
+          </a:solidFill>
+          <a:ln>
+            <a:noFill/>
+          </a:ln>
+        </p:spPr>
+        <p:style>
+          <a:lnRef idx="2">
+            <a:schemeClr val="accent1">
+              <a:shade val="50000"/>
+            </a:schemeClr>
+          </a:lnRef>
+          <a:fillRef idx="1">
+            <a:schemeClr val="accent1"/>
+          </a:fillRef>
+          <a:effectRef idx="0">
+            <a:schemeClr val="accent1"/>
+          </a:effectRef>
+          <a:fontRef idx="minor">
+            <a:schemeClr val="lt1"/>
+          </a:fontRef>
+        </p:style>
+        <p:txBody>
+          <a:bodyPr rtlCol="0" anchor="ctr"/>
+          <a:lstStyle/>
+          <a:p>
+            <a:pPr algn="ctr"/>
+            <a:endParaRPr lang="en-US"/>
+          </a:p>
+        </p:txBody>
+      </p:sp>
+      <p:pic>
+        <p:nvPicPr>
+          <p:cNvPr id="10" name="Picture 9">
+            <a:extLst>
+              <a:ext uri="{FF2B5EF4-FFF2-40B4-BE49-F238E27FC236}">
+                <a16:creationId xmlns:a16="http://schemas.microsoft.com/office/drawing/2014/main" id="{75554383-98AF-4A47-BB65-705FAAA4BE6A}"/>
+              </a:ext>
+              <a:ext uri="{C183D7F6-B498-43B3-948B-1728B52AA6E4}">
+                <adec:decorative xmlns="" xmlns:adec="http://schemas.microsoft.com/office/drawing/2017/decorative" val="1"/>
+              </a:ext>
+            </a:extLst>
+          </p:cNvPr>
+          <p:cNvPicPr>
+            <a:picLocks noGrp="1" noRot="1" noChangeAspect="1" noMove="1" noResize="1" noEditPoints="1" noAdjustHandles="1" noChangeArrowheads="1" noChangeShapeType="1" noCrop="1"/>
+          </p:cNvPicPr>
+          <p:nvPr>
+            <p:extLst>
+              <p:ext uri="{386F3935-93C4-4BCD-93E2-E3B085C9AB24}">
+                <p16:designElem xmlns:p16="http://schemas.microsoft.com/office/powerpoint/2015/main" val="1"/>
+              </p:ext>
+            </p:extLst>
+          </p:nvPr>
+        </p:nvPicPr>
+        <p:blipFill>
+          <a:blip r:embed="rId2">
+            <a:extLst>
+              <a:ext uri="{28A0092B-C50C-407E-A947-70E740481C1C}">
+                <a14:useLocalDpi xmlns:a14="http://schemas.microsoft.com/office/drawing/2010/main" val="0"/>
+              </a:ext>
+            </a:extLst>
+          </a:blip>
+          <a:stretch>
+            <a:fillRect/>
+          </a:stretch>
+        </p:blipFill>
+        <p:spPr>
+          <a:xfrm>
+            <a:off x="0" y="0"/>
+            <a:ext cx="12192000" cy="6858000"/>
+          </a:xfrm>
+          <a:prstGeom prst="rect">
+            <a:avLst/>
+          </a:prstGeom>
+        </p:spPr>
+      </p:pic>
       <p:sp>
         <p:nvSpPr>
           <p:cNvPr id="12" name="Freeform: Shape 11">
@@ -4475,7 +6101,7 @@
                 <a16:creationId xmlns:a16="http://schemas.microsoft.com/office/drawing/2014/main" id="{ADAD1991-FFD1-4E94-ABAB-7560D33008E4}"/>
               </a:ext>
               <a:ext uri="{C183D7F6-B498-43B3-948B-1728B52AA6E4}">
-                <adec:decorative xmlns:adec="http://schemas.microsoft.com/office/drawing/2017/decorative" xmlns="" val="1"/>
+                <adec:decorative xmlns="" xmlns:adec="http://schemas.microsoft.com/office/drawing/2017/decorative" val="1"/>
               </a:ext>
             </a:extLst>
           </p:cNvPr>
@@ -4706,7 +6332,7 @@
 </p:sld>
 </file>
 
-<file path=ppt/slides/slide17.xml><?xml version="1.0" encoding="utf-8"?>
+<file path=ppt/slides/slide22.xml><?xml version="1.0" encoding="utf-8"?>
 <p:sld xmlns:a="http://schemas.openxmlformats.org/drawingml/2006/main" xmlns:r="http://schemas.openxmlformats.org/officeDocument/2006/relationships" xmlns:p="http://schemas.openxmlformats.org/presentationml/2006/main">
   <p:cSld>
     <p:spTree>
@@ -4889,412 +6515,6 @@
     <p:extLst>
       <p:ext uri="{BB962C8B-B14F-4D97-AF65-F5344CB8AC3E}">
         <p14:creationId xmlns:p14="http://schemas.microsoft.com/office/powerpoint/2010/main" val="2731885758"/>
-      </p:ext>
-    </p:extLst>
-  </p:cSld>
-  <p:clrMapOvr>
-    <a:masterClrMapping/>
-  </p:clrMapOvr>
-</p:sld>
-</file>
-
-<file path=ppt/slides/slide2.xml><?xml version="1.0" encoding="utf-8"?>
-<p:sld xmlns:a="http://schemas.openxmlformats.org/drawingml/2006/main" xmlns:r="http://schemas.openxmlformats.org/officeDocument/2006/relationships" xmlns:p="http://schemas.openxmlformats.org/presentationml/2006/main">
-  <p:cSld>
-    <p:bg>
-      <p:bgPr>
-        <a:solidFill>
-          <a:schemeClr val="bg1"/>
-        </a:solidFill>
-        <a:effectLst/>
-      </p:bgPr>
-    </p:bg>
-    <p:spTree>
-      <p:nvGrpSpPr>
-        <p:cNvPr id="1" name=""/>
-        <p:cNvGrpSpPr/>
-        <p:nvPr/>
-      </p:nvGrpSpPr>
-      <p:grpSpPr>
-        <a:xfrm>
-          <a:off x="0" y="0"/>
-          <a:ext cx="0" cy="0"/>
-          <a:chOff x="0" y="0"/>
-          <a:chExt cx="0" cy="0"/>
-        </a:xfrm>
-      </p:grpSpPr>
-      <p:sp>
-        <p:nvSpPr>
-          <p:cNvPr id="11" name="Rectangle 10">
-            <a:extLst>
-              <a:ext uri="{FF2B5EF4-FFF2-40B4-BE49-F238E27FC236}">
-                <a16:creationId xmlns:a16="http://schemas.microsoft.com/office/drawing/2014/main" id="{4038CB10-1F5C-4D54-9DF7-12586DE5B007}"/>
-              </a:ext>
-              <a:ext uri="{C183D7F6-B498-43B3-948B-1728B52AA6E4}">
-                <adec:decorative xmlns:adec="http://schemas.microsoft.com/office/drawing/2017/decorative" xmlns="" val="1"/>
-              </a:ext>
-            </a:extLst>
-          </p:cNvPr>
-          <p:cNvSpPr>
-            <a:spLocks noGrp="1" noRot="1" noChangeAspect="1" noMove="1" noResize="1" noEditPoints="1" noAdjustHandles="1" noChangeArrowheads="1" noChangeShapeType="1" noTextEdit="1"/>
-          </p:cNvSpPr>
-          <p:nvPr>
-            <p:extLst>
-              <p:ext uri="{386F3935-93C4-4BCD-93E2-E3B085C9AB24}">
-                <p16:designElem xmlns:p16="http://schemas.microsoft.com/office/powerpoint/2015/main" val="1"/>
-              </p:ext>
-            </p:extLst>
-          </p:nvPr>
-        </p:nvSpPr>
-        <p:spPr>
-          <a:xfrm>
-            <a:off x="327546" y="4572000"/>
-            <a:ext cx="7058307" cy="1964266"/>
-          </a:xfrm>
-          <a:prstGeom prst="rect">
-            <a:avLst/>
-          </a:prstGeom>
-          <a:solidFill>
-            <a:srgbClr val="BB8577"/>
-          </a:solidFill>
-          <a:ln>
-            <a:noFill/>
-          </a:ln>
-        </p:spPr>
-        <p:style>
-          <a:lnRef idx="2">
-            <a:schemeClr val="accent1">
-              <a:shade val="50000"/>
-            </a:schemeClr>
-          </a:lnRef>
-          <a:fillRef idx="1">
-            <a:schemeClr val="accent1"/>
-          </a:fillRef>
-          <a:effectRef idx="0">
-            <a:schemeClr val="accent1"/>
-          </a:effectRef>
-          <a:fontRef idx="minor">
-            <a:schemeClr val="lt1"/>
-          </a:fontRef>
-        </p:style>
-        <p:txBody>
-          <a:bodyPr rtlCol="0" anchor="ctr"/>
-          <a:lstStyle/>
-          <a:p>
-            <a:pPr marL="0" marR="0" lvl="0" indent="0" algn="ctr" defTabSz="914400" rtl="0" eaLnBrk="1" fontAlgn="auto" latinLnBrk="0" hangingPunct="1">
-              <a:lnSpc>
-                <a:spcPct val="100000"/>
-              </a:lnSpc>
-              <a:spcBef>
-                <a:spcPts val="0"/>
-              </a:spcBef>
-              <a:spcAft>
-                <a:spcPts val="0"/>
-              </a:spcAft>
-              <a:buClrTx/>
-              <a:buSzTx/>
-              <a:buFontTx/>
-              <a:buNone/>
-              <a:tabLst/>
-              <a:defRPr/>
-            </a:pPr>
-            <a:endParaRPr kumimoji="0" lang="en-US" sz="1800" b="0" i="0" u="none" strike="noStrike" kern="1200" cap="none" spc="0" normalizeH="0" baseline="0" noProof="0">
-              <a:ln>
-                <a:noFill/>
-              </a:ln>
-              <a:solidFill>
-                <a:prstClr val="white"/>
-              </a:solidFill>
-              <a:effectLst/>
-              <a:uLnTx/>
-              <a:uFillTx/>
-              <a:latin typeface="Calibri" panose="020F0502020204030204"/>
-              <a:ea typeface="+mn-ea"/>
-              <a:cs typeface="+mn-cs"/>
-            </a:endParaRPr>
-          </a:p>
-        </p:txBody>
-      </p:sp>
-      <p:sp>
-        <p:nvSpPr>
-          <p:cNvPr id="2" name="TextBox 1">
-            <a:extLst>
-              <a:ext uri="{FF2B5EF4-FFF2-40B4-BE49-F238E27FC236}">
-                <a16:creationId xmlns:a16="http://schemas.microsoft.com/office/drawing/2014/main" id="{9A5B267B-DC99-48D5-AAE4-0080DA632EE8}"/>
-              </a:ext>
-            </a:extLst>
-          </p:cNvPr>
-          <p:cNvSpPr txBox="1"/>
-          <p:nvPr/>
-        </p:nvSpPr>
-        <p:spPr>
-          <a:xfrm>
-            <a:off x="524256" y="4767072"/>
-            <a:ext cx="6594189" cy="1625210"/>
-          </a:xfrm>
-          <a:prstGeom prst="rect">
-            <a:avLst/>
-          </a:prstGeom>
-        </p:spPr>
-        <p:txBody>
-          <a:bodyPr vert="horz" lIns="91440" tIns="45720" rIns="91440" bIns="45720" rtlCol="0" anchor="ctr">
-            <a:normAutofit/>
-          </a:bodyPr>
-          <a:lstStyle/>
-          <a:p>
-            <a:pPr algn="r">
-              <a:lnSpc>
-                <a:spcPct val="90000"/>
-              </a:lnSpc>
-              <a:spcBef>
-                <a:spcPct val="0"/>
-              </a:spcBef>
-              <a:spcAft>
-                <a:spcPts val="600"/>
-              </a:spcAft>
-            </a:pPr>
-            <a:r>
-              <a:rPr lang="en-US" sz="4400">
-                <a:solidFill>
-                  <a:srgbClr val="FFFFFF"/>
-                </a:solidFill>
-                <a:latin typeface="+mj-lt"/>
-                <a:ea typeface="+mj-ea"/>
-                <a:cs typeface="+mj-cs"/>
-              </a:rPr>
-              <a:t>Narrative</a:t>
-            </a:r>
-          </a:p>
-        </p:txBody>
-      </p:sp>
-      <p:pic>
-        <p:nvPicPr>
-          <p:cNvPr id="6" name="Picture 5">
-            <a:extLst>
-              <a:ext uri="{FF2B5EF4-FFF2-40B4-BE49-F238E27FC236}">
-                <a16:creationId xmlns:a16="http://schemas.microsoft.com/office/drawing/2014/main" id="{48D482F4-FAC7-4F34-B519-1AFCACD84A50}"/>
-              </a:ext>
-            </a:extLst>
-          </p:cNvPr>
-          <p:cNvPicPr>
-            <a:picLocks noChangeAspect="1"/>
-          </p:cNvPicPr>
-          <p:nvPr/>
-        </p:nvPicPr>
-        <p:blipFill rotWithShape="1">
-          <a:blip r:embed="rId2">
-            <a:extLst>
-              <a:ext uri="{28A0092B-C50C-407E-A947-70E740481C1C}">
-                <a14:useLocalDpi xmlns:a14="http://schemas.microsoft.com/office/drawing/2010/main" val="0"/>
-              </a:ext>
-            </a:extLst>
-          </a:blip>
-          <a:srcRect l="12990" r="-1" b="-1"/>
-          <a:stretch/>
-        </p:blipFill>
-        <p:spPr>
-          <a:xfrm>
-            <a:off x="327547" y="321733"/>
-            <a:ext cx="7058306" cy="4107392"/>
-          </a:xfrm>
-          <a:prstGeom prst="rect">
-            <a:avLst/>
-          </a:prstGeom>
-        </p:spPr>
-      </p:pic>
-      <p:sp>
-        <p:nvSpPr>
-          <p:cNvPr id="13" name="Rectangle 12">
-            <a:extLst>
-              <a:ext uri="{FF2B5EF4-FFF2-40B4-BE49-F238E27FC236}">
-                <a16:creationId xmlns:a16="http://schemas.microsoft.com/office/drawing/2014/main" id="{73ED6512-6858-4552-B699-9A97FE9A4EA2}"/>
-              </a:ext>
-              <a:ext uri="{C183D7F6-B498-43B3-948B-1728B52AA6E4}">
-                <adec:decorative xmlns:adec="http://schemas.microsoft.com/office/drawing/2017/decorative" xmlns="" val="1"/>
-              </a:ext>
-            </a:extLst>
-          </p:cNvPr>
-          <p:cNvSpPr>
-            <a:spLocks noGrp="1" noRot="1" noChangeAspect="1" noMove="1" noResize="1" noEditPoints="1" noAdjustHandles="1" noChangeArrowheads="1" noChangeShapeType="1" noTextEdit="1"/>
-          </p:cNvSpPr>
-          <p:nvPr>
-            <p:extLst>
-              <p:ext uri="{386F3935-93C4-4BCD-93E2-E3B085C9AB24}">
-                <p16:designElem xmlns:p16="http://schemas.microsoft.com/office/powerpoint/2015/main" val="1"/>
-              </p:ext>
-            </p:extLst>
-          </p:nvPr>
-        </p:nvSpPr>
-        <p:spPr>
-          <a:xfrm>
-            <a:off x="7534655" y="321732"/>
-            <a:ext cx="4335613" cy="6214534"/>
-          </a:xfrm>
-          <a:prstGeom prst="rect">
-            <a:avLst/>
-          </a:prstGeom>
-          <a:solidFill>
-            <a:srgbClr val="404040"/>
-          </a:solidFill>
-          <a:ln>
-            <a:noFill/>
-          </a:ln>
-        </p:spPr>
-        <p:style>
-          <a:lnRef idx="2">
-            <a:schemeClr val="accent1">
-              <a:shade val="50000"/>
-            </a:schemeClr>
-          </a:lnRef>
-          <a:fillRef idx="1">
-            <a:schemeClr val="accent1"/>
-          </a:fillRef>
-          <a:effectRef idx="0">
-            <a:schemeClr val="accent1"/>
-          </a:effectRef>
-          <a:fontRef idx="minor">
-            <a:schemeClr val="lt1"/>
-          </a:fontRef>
-        </p:style>
-        <p:txBody>
-          <a:bodyPr rtlCol="0" anchor="ctr"/>
-          <a:lstStyle/>
-          <a:p>
-            <a:pPr marL="0" marR="0" lvl="0" indent="0" algn="ctr" defTabSz="914400" rtl="0" eaLnBrk="1" fontAlgn="auto" latinLnBrk="0" hangingPunct="1">
-              <a:lnSpc>
-                <a:spcPct val="100000"/>
-              </a:lnSpc>
-              <a:spcBef>
-                <a:spcPts val="0"/>
-              </a:spcBef>
-              <a:spcAft>
-                <a:spcPts val="0"/>
-              </a:spcAft>
-              <a:buClrTx/>
-              <a:buSzTx/>
-              <a:buFontTx/>
-              <a:buNone/>
-              <a:tabLst/>
-              <a:defRPr/>
-            </a:pPr>
-            <a:endParaRPr kumimoji="0" lang="en-US" sz="1800" b="0" i="0" u="none" strike="noStrike" kern="1200" cap="none" spc="0" normalizeH="0" baseline="0" noProof="0">
-              <a:ln>
-                <a:noFill/>
-              </a:ln>
-              <a:solidFill>
-                <a:prstClr val="white"/>
-              </a:solidFill>
-              <a:effectLst/>
-              <a:uLnTx/>
-              <a:uFillTx/>
-              <a:latin typeface="Calibri" panose="020F0502020204030204"/>
-              <a:ea typeface="+mn-ea"/>
-              <a:cs typeface="+mn-cs"/>
-            </a:endParaRPr>
-          </a:p>
-        </p:txBody>
-      </p:sp>
-      <p:sp>
-        <p:nvSpPr>
-          <p:cNvPr id="3" name="TextBox 2">
-            <a:extLst>
-              <a:ext uri="{FF2B5EF4-FFF2-40B4-BE49-F238E27FC236}">
-                <a16:creationId xmlns:a16="http://schemas.microsoft.com/office/drawing/2014/main" id="{B73F6C98-15CD-4670-AE38-F58E18427A3C}"/>
-              </a:ext>
-            </a:extLst>
-          </p:cNvPr>
-          <p:cNvSpPr txBox="1"/>
-          <p:nvPr/>
-        </p:nvSpPr>
-        <p:spPr>
-          <a:xfrm>
-            <a:off x="8029319" y="917725"/>
-            <a:ext cx="3424739" cy="4852362"/>
-          </a:xfrm>
-          <a:prstGeom prst="rect">
-            <a:avLst/>
-          </a:prstGeom>
-        </p:spPr>
-        <p:txBody>
-          <a:bodyPr vert="horz" lIns="91440" tIns="45720" rIns="91440" bIns="45720" rtlCol="0" anchor="ctr">
-            <a:normAutofit/>
-          </a:bodyPr>
-          <a:lstStyle/>
-          <a:p>
-            <a:pPr>
-              <a:lnSpc>
-                <a:spcPct val="90000"/>
-              </a:lnSpc>
-              <a:spcAft>
-                <a:spcPts val="600"/>
-              </a:spcAft>
-            </a:pPr>
-            <a:r>
-              <a:rPr lang="en-US" sz="2000" dirty="0">
-                <a:solidFill>
-                  <a:srgbClr val="FFFFFF"/>
-                </a:solidFill>
-              </a:rPr>
-              <a:t>After winning the lottery we want to start a movie business to produce movies. </a:t>
-            </a:r>
-          </a:p>
-          <a:p>
-            <a:pPr>
-              <a:lnSpc>
-                <a:spcPct val="90000"/>
-              </a:lnSpc>
-              <a:spcAft>
-                <a:spcPts val="600"/>
-              </a:spcAft>
-            </a:pPr>
-            <a:endParaRPr lang="en-US" sz="2000" dirty="0">
-              <a:solidFill>
-                <a:srgbClr val="FFFFFF"/>
-              </a:solidFill>
-            </a:endParaRPr>
-          </a:p>
-          <a:p>
-            <a:pPr>
-              <a:lnSpc>
-                <a:spcPct val="90000"/>
-              </a:lnSpc>
-              <a:spcAft>
-                <a:spcPts val="600"/>
-              </a:spcAft>
-            </a:pPr>
-            <a:r>
-              <a:rPr lang="en-US" sz="2000" dirty="0">
-                <a:solidFill>
-                  <a:srgbClr val="FFFFFF"/>
-                </a:solidFill>
-              </a:rPr>
-              <a:t>GOAL:</a:t>
-            </a:r>
-          </a:p>
-          <a:p>
-            <a:pPr>
-              <a:lnSpc>
-                <a:spcPct val="90000"/>
-              </a:lnSpc>
-              <a:spcAft>
-                <a:spcPts val="600"/>
-              </a:spcAft>
-            </a:pPr>
-            <a:r>
-              <a:rPr lang="en-US" sz="2000" dirty="0">
-                <a:solidFill>
-                  <a:srgbClr val="FFFFFF"/>
-                </a:solidFill>
-              </a:rPr>
-              <a:t>Produce the highest possible average rated movies.</a:t>
-            </a:r>
-          </a:p>
-        </p:txBody>
-      </p:sp>
-    </p:spTree>
-    <p:extLst>
-      <p:ext uri="{BB962C8B-B14F-4D97-AF65-F5344CB8AC3E}">
-        <p14:creationId xmlns:p14="http://schemas.microsoft.com/office/powerpoint/2010/main" val="858000049"/>
       </p:ext>
     </p:extLst>
   </p:cSld>
@@ -5337,7 +6557,7 @@
                 <a16:creationId xmlns:a16="http://schemas.microsoft.com/office/drawing/2014/main" id="{B547373F-AF2E-4907-B442-9F902B387FD0}"/>
               </a:ext>
               <a:ext uri="{C183D7F6-B498-43B3-948B-1728B52AA6E4}">
-                <adec:decorative xmlns:adec="http://schemas.microsoft.com/office/drawing/2017/decorative" xmlns="" val="1"/>
+                <adec:decorative xmlns="" xmlns:adec="http://schemas.microsoft.com/office/drawing/2017/decorative" val="1"/>
               </a:ext>
             </a:extLst>
           </p:cNvPr>
@@ -5781,7 +7001,7 @@
                 <a16:creationId xmlns:a16="http://schemas.microsoft.com/office/drawing/2014/main" id="{CF62D2A7-8207-488C-9F46-316BA81A16C8}"/>
               </a:ext>
               <a:ext uri="{C183D7F6-B498-43B3-948B-1728B52AA6E4}">
-                <adec:decorative xmlns:adec="http://schemas.microsoft.com/office/drawing/2017/decorative" xmlns="" val="1"/>
+                <adec:decorative xmlns="" xmlns:adec="http://schemas.microsoft.com/office/drawing/2017/decorative" val="1"/>
               </a:ext>
             </a:extLst>
           </p:cNvPr>
@@ -5948,7 +7168,7 @@
                 <a16:creationId xmlns:a16="http://schemas.microsoft.com/office/drawing/2014/main" id="{52AC6D7F-F068-4E11-BB06-F601D89BB980}"/>
               </a:ext>
               <a:ext uri="{C183D7F6-B498-43B3-948B-1728B52AA6E4}">
-                <adec:decorative xmlns:adec="http://schemas.microsoft.com/office/drawing/2017/decorative" xmlns="" val="1"/>
+                <adec:decorative xmlns="" xmlns:adec="http://schemas.microsoft.com/office/drawing/2017/decorative" val="1"/>
               </a:ext>
             </a:extLst>
           </p:cNvPr>
@@ -6242,7 +7462,7 @@
                 <a16:creationId xmlns:a16="http://schemas.microsoft.com/office/drawing/2014/main" id="{E0D60ECE-8986-45DC-B7FE-EC7699B466B8}"/>
               </a:ext>
               <a:ext uri="{C183D7F6-B498-43B3-948B-1728B52AA6E4}">
-                <adec:decorative xmlns:adec="http://schemas.microsoft.com/office/drawing/2017/decorative" xmlns="" val="1"/>
+                <adec:decorative xmlns="" xmlns:adec="http://schemas.microsoft.com/office/drawing/2017/decorative" val="1"/>
               </a:ext>
             </a:extLst>
           </p:cNvPr>
@@ -6411,7 +7631,7 @@
                 <a16:creationId xmlns:a16="http://schemas.microsoft.com/office/drawing/2014/main" id="{96964194-5878-40D2-8EC0-DDC58387FA56}"/>
               </a:ext>
               <a:ext uri="{C183D7F6-B498-43B3-948B-1728B52AA6E4}">
-                <adec:decorative xmlns:adec="http://schemas.microsoft.com/office/drawing/2017/decorative" xmlns="" val="1"/>
+                <adec:decorative xmlns="" xmlns:adec="http://schemas.microsoft.com/office/drawing/2017/decorative" val="1"/>
               </a:ext>
             </a:extLst>
           </p:cNvPr>
@@ -6860,7 +8080,7 @@
                 <a16:creationId xmlns:a16="http://schemas.microsoft.com/office/drawing/2014/main" id="{57845966-6EFC-468A-9CC7-BAB4B95854E7}"/>
               </a:ext>
               <a:ext uri="{C183D7F6-B498-43B3-948B-1728B52AA6E4}">
-                <adec:decorative xmlns:adec="http://schemas.microsoft.com/office/drawing/2017/decorative" xmlns="" val="1"/>
+                <adec:decorative xmlns="" xmlns:adec="http://schemas.microsoft.com/office/drawing/2017/decorative" val="1"/>
               </a:ext>
             </a:extLst>
           </p:cNvPr>
@@ -6923,7 +8143,7 @@
                 <a16:creationId xmlns:a16="http://schemas.microsoft.com/office/drawing/2014/main" id="{75554383-98AF-4A47-BB65-705FAAA4BE6A}"/>
               </a:ext>
               <a:ext uri="{C183D7F6-B498-43B3-948B-1728B52AA6E4}">
-                <adec:decorative xmlns:adec="http://schemas.microsoft.com/office/drawing/2017/decorative" xmlns="" val="1"/>
+                <adec:decorative xmlns="" xmlns:adec="http://schemas.microsoft.com/office/drawing/2017/decorative" val="1"/>
               </a:ext>
             </a:extLst>
           </p:cNvPr>
@@ -6968,7 +8188,7 @@
                 <a16:creationId xmlns:a16="http://schemas.microsoft.com/office/drawing/2014/main" id="{ADAD1991-FFD1-4E94-ABAB-7560D33008E4}"/>
               </a:ext>
               <a:ext uri="{C183D7F6-B498-43B3-948B-1728B52AA6E4}">
-                <adec:decorative xmlns:adec="http://schemas.microsoft.com/office/drawing/2017/decorative" xmlns="" val="1"/>
+                <adec:decorative xmlns="" xmlns:adec="http://schemas.microsoft.com/office/drawing/2017/decorative" val="1"/>
               </a:ext>
             </a:extLst>
           </p:cNvPr>
@@ -7332,7 +8552,7 @@
                 <a16:creationId xmlns:a16="http://schemas.microsoft.com/office/drawing/2014/main" id="{5F9CFCE6-877F-4858-B8BD-2C52CA8AFBC4}"/>
               </a:ext>
               <a:ext uri="{C183D7F6-B498-43B3-948B-1728B52AA6E4}">
-                <adec:decorative xmlns:adec="http://schemas.microsoft.com/office/drawing/2017/decorative" xmlns="" val="1"/>
+                <adec:decorative xmlns="" xmlns:adec="http://schemas.microsoft.com/office/drawing/2017/decorative" val="1"/>
               </a:ext>
             </a:extLst>
           </p:cNvPr>
@@ -7395,7 +8615,7 @@
                 <a16:creationId xmlns:a16="http://schemas.microsoft.com/office/drawing/2014/main" id="{8213F8A0-12AE-4514-8372-0DD766EC28EE}"/>
               </a:ext>
               <a:ext uri="{C183D7F6-B498-43B3-948B-1728B52AA6E4}">
-                <adec:decorative xmlns:adec="http://schemas.microsoft.com/office/drawing/2017/decorative" xmlns="" val="1"/>
+                <adec:decorative xmlns="" xmlns:adec="http://schemas.microsoft.com/office/drawing/2017/decorative" val="1"/>
               </a:ext>
             </a:extLst>
           </p:cNvPr>
@@ -7494,7 +8714,7 @@
                 <a16:creationId xmlns:a16="http://schemas.microsoft.com/office/drawing/2014/main" id="{9EFF17D4-9A8C-4CE5-B096-D8CCD4400437}"/>
               </a:ext>
               <a:ext uri="{C183D7F6-B498-43B3-948B-1728B52AA6E4}">
-                <adec:decorative xmlns:adec="http://schemas.microsoft.com/office/drawing/2017/decorative" xmlns="" val="1"/>
+                <adec:decorative xmlns="" xmlns:adec="http://schemas.microsoft.com/office/drawing/2017/decorative" val="1"/>
               </a:ext>
             </a:extLst>
           </p:cNvPr>
@@ -7671,7 +8891,7 @@
                 <a16:creationId xmlns:a16="http://schemas.microsoft.com/office/drawing/2014/main" id="{DB146403-F3D6-484B-B2ED-97F9565D0370}"/>
               </a:ext>
               <a:ext uri="{C183D7F6-B498-43B3-948B-1728B52AA6E4}">
-                <adec:decorative xmlns:adec="http://schemas.microsoft.com/office/drawing/2017/decorative" xmlns="" val="1"/>
+                <adec:decorative xmlns="" xmlns:adec="http://schemas.microsoft.com/office/drawing/2017/decorative" val="1"/>
               </a:ext>
             </a:extLst>
           </p:cNvPr>
@@ -7723,7 +8943,7 @@
                 <a16:creationId xmlns:a16="http://schemas.microsoft.com/office/drawing/2014/main" id="{823AC064-BC96-4F32-8AE1-B2FD38754823}"/>
               </a:ext>
               <a:ext uri="{C183D7F6-B498-43B3-948B-1728B52AA6E4}">
-                <adec:decorative xmlns:adec="http://schemas.microsoft.com/office/drawing/2017/decorative" xmlns="" val="1"/>
+                <adec:decorative xmlns="" xmlns:adec="http://schemas.microsoft.com/office/drawing/2017/decorative" val="1"/>
               </a:ext>
             </a:extLst>
           </p:cNvPr>
@@ -7912,7 +9132,7 @@
                 <a16:creationId xmlns:a16="http://schemas.microsoft.com/office/drawing/2014/main" id="{7E7C77BC-7138-40B1-A15B-20F57A494629}"/>
               </a:ext>
               <a:ext uri="{C183D7F6-B498-43B3-948B-1728B52AA6E4}">
-                <adec:decorative xmlns:adec="http://schemas.microsoft.com/office/drawing/2017/decorative" xmlns="" val="1"/>
+                <adec:decorative xmlns="" xmlns:adec="http://schemas.microsoft.com/office/drawing/2017/decorative" val="1"/>
               </a:ext>
             </a:extLst>
           </p:cNvPr>

</xml_diff>

<commit_message>
Updated Notes on Slides
</commit_message>
<xml_diff>
--- a/Presentation/ScrumLords_Capstone.pptx
+++ b/Presentation/ScrumLords_Capstone.pptx
@@ -5,7 +5,7 @@
     <p:sldMasterId id="2147483648" r:id="rId1"/>
   </p:sldMasterIdLst>
   <p:notesMasterIdLst>
-    <p:notesMasterId r:id="rId30"/>
+    <p:notesMasterId r:id="rId29"/>
   </p:notesMasterIdLst>
   <p:sldIdLst>
     <p:sldId id="256" r:id="rId2"/>
@@ -19,8 +19,8 @@
     <p:sldId id="267" r:id="rId10"/>
     <p:sldId id="296" r:id="rId11"/>
     <p:sldId id="289" r:id="rId12"/>
-    <p:sldId id="294" r:id="rId13"/>
-    <p:sldId id="295" r:id="rId14"/>
+    <p:sldId id="295" r:id="rId13"/>
+    <p:sldId id="294" r:id="rId14"/>
     <p:sldId id="279" r:id="rId15"/>
     <p:sldId id="280" r:id="rId16"/>
     <p:sldId id="282" r:id="rId17"/>
@@ -32,10 +32,9 @@
     <p:sldId id="288" r:id="rId23"/>
     <p:sldId id="290" r:id="rId24"/>
     <p:sldId id="271" r:id="rId25"/>
-    <p:sldId id="287" r:id="rId26"/>
-    <p:sldId id="278" r:id="rId27"/>
-    <p:sldId id="286" r:id="rId28"/>
-    <p:sldId id="274" r:id="rId29"/>
+    <p:sldId id="278" r:id="rId26"/>
+    <p:sldId id="286" r:id="rId27"/>
+    <p:sldId id="274" r:id="rId28"/>
   </p:sldIdLst>
   <p:sldSz cx="12192000" cy="6858000"/>
   <p:notesSz cx="6858000" cy="9144000"/>
@@ -963,16 +962,7 @@
           <a:p>
             <a:r>
               <a:rPr lang="en-US" dirty="0"/>
-              <a:t>The variance score of 1 denotes perfect. Mean squared error as close to zero is desired. </a:t>
-            </a:r>
-          </a:p>
-          <a:p>
-            <a:endParaRPr lang="en-US" dirty="0"/>
-          </a:p>
-          <a:p>
-            <a:r>
-              <a:rPr lang="en-US" dirty="0"/>
-              <a:t>Both model performed poorly and below expectations.</a:t>
+              <a:t>Visual Output of model results. Should ideally follow the black line in a linear trend. </a:t>
             </a:r>
           </a:p>
         </p:txBody>
@@ -1003,7 +993,7 @@
     </p:spTree>
     <p:extLst>
       <p:ext uri="{BB962C8B-B14F-4D97-AF65-F5344CB8AC3E}">
-        <p14:creationId xmlns:p14="http://schemas.microsoft.com/office/powerpoint/2010/main" val="499677454"/>
+        <p14:creationId xmlns:p14="http://schemas.microsoft.com/office/powerpoint/2010/main" val="3994657888"/>
       </p:ext>
     </p:extLst>
   </p:cSld>
@@ -1085,7 +1075,16 @@
           <a:p>
             <a:r>
               <a:rPr lang="en-US" dirty="0"/>
-              <a:t>Visual Output of model results. Should ideally follow the black line in a linear trend. </a:t>
+              <a:t>The variance score of 1 denotes perfect. Mean squared error as close to zero is desired. </a:t>
+            </a:r>
+          </a:p>
+          <a:p>
+            <a:endParaRPr lang="en-US" dirty="0"/>
+          </a:p>
+          <a:p>
+            <a:r>
+              <a:rPr lang="en-US" dirty="0"/>
+              <a:t>Both model performed poorly and below expectations.</a:t>
             </a:r>
           </a:p>
         </p:txBody>
@@ -1116,7 +1115,7 @@
     </p:spTree>
     <p:extLst>
       <p:ext uri="{BB962C8B-B14F-4D97-AF65-F5344CB8AC3E}">
-        <p14:creationId xmlns:p14="http://schemas.microsoft.com/office/powerpoint/2010/main" val="3994657888"/>
+        <p14:creationId xmlns:p14="http://schemas.microsoft.com/office/powerpoint/2010/main" val="499677454"/>
       </p:ext>
     </p:extLst>
   </p:cSld>
@@ -2604,93 +2603,6 @@
 </p:notes>
 </file>
 
-<file path=ppt/notesSlides/notesSlide25.xml><?xml version="1.0" encoding="utf-8"?>
-<p:notes xmlns:a="http://schemas.openxmlformats.org/drawingml/2006/main" xmlns:r="http://schemas.openxmlformats.org/officeDocument/2006/relationships" xmlns:p="http://schemas.openxmlformats.org/presentationml/2006/main">
-  <p:cSld>
-    <p:spTree>
-      <p:nvGrpSpPr>
-        <p:cNvPr id="1" name=""/>
-        <p:cNvGrpSpPr/>
-        <p:nvPr/>
-      </p:nvGrpSpPr>
-      <p:grpSpPr>
-        <a:xfrm>
-          <a:off x="0" y="0"/>
-          <a:ext cx="0" cy="0"/>
-          <a:chOff x="0" y="0"/>
-          <a:chExt cx="0" cy="0"/>
-        </a:xfrm>
-      </p:grpSpPr>
-      <p:sp>
-        <p:nvSpPr>
-          <p:cNvPr id="2" name="Slide Image Placeholder 1"/>
-          <p:cNvSpPr>
-            <a:spLocks noGrp="1" noRot="1" noChangeAspect="1"/>
-          </p:cNvSpPr>
-          <p:nvPr>
-            <p:ph type="sldImg"/>
-          </p:nvPr>
-        </p:nvSpPr>
-        <p:spPr/>
-      </p:sp>
-      <p:sp>
-        <p:nvSpPr>
-          <p:cNvPr id="3" name="Notes Placeholder 2"/>
-          <p:cNvSpPr>
-            <a:spLocks noGrp="1"/>
-          </p:cNvSpPr>
-          <p:nvPr>
-            <p:ph type="body" idx="1"/>
-          </p:nvPr>
-        </p:nvSpPr>
-        <p:spPr/>
-        <p:txBody>
-          <a:bodyPr/>
-          <a:lstStyle/>
-          <a:p>
-            <a:r>
-              <a:rPr lang="en-US" dirty="0"/>
-              <a:t>Ashish</a:t>
-            </a:r>
-          </a:p>
-        </p:txBody>
-      </p:sp>
-      <p:sp>
-        <p:nvSpPr>
-          <p:cNvPr id="4" name="Slide Number Placeholder 3"/>
-          <p:cNvSpPr>
-            <a:spLocks noGrp="1"/>
-          </p:cNvSpPr>
-          <p:nvPr>
-            <p:ph type="sldNum" sz="quarter" idx="10"/>
-          </p:nvPr>
-        </p:nvSpPr>
-        <p:spPr/>
-        <p:txBody>
-          <a:bodyPr/>
-          <a:lstStyle/>
-          <a:p>
-            <a:fld id="{674B3118-0A71-43F8-A6F9-A05C3FA5027E}" type="slidenum">
-              <a:rPr lang="en-US" smtClean="0"/>
-              <a:t>25</a:t>
-            </a:fld>
-            <a:endParaRPr lang="en-US"/>
-          </a:p>
-        </p:txBody>
-      </p:sp>
-    </p:spTree>
-    <p:extLst>
-      <p:ext uri="{BB962C8B-B14F-4D97-AF65-F5344CB8AC3E}">
-        <p14:creationId xmlns:p14="http://schemas.microsoft.com/office/powerpoint/2010/main" val="3596090878"/>
-      </p:ext>
-    </p:extLst>
-  </p:cSld>
-  <p:clrMapOvr>
-    <a:masterClrMapping/>
-  </p:clrMapOvr>
-</p:notes>
-</file>
-
 <file path=ppt/notesSlides/notesSlide3.xml><?xml version="1.0" encoding="utf-8"?>
 <p:notes xmlns:a="http://schemas.openxmlformats.org/drawingml/2006/main" xmlns:r="http://schemas.openxmlformats.org/officeDocument/2006/relationships" xmlns:p="http://schemas.openxmlformats.org/presentationml/2006/main">
   <p:cSld>
@@ -3659,6 +3571,12 @@
             <a:r>
               <a:rPr lang="en-US" dirty="0"/>
               <a:t> for the black line (normalized distribution). </a:t>
+            </a:r>
+          </a:p>
+          <a:p>
+            <a:r>
+              <a:rPr lang="en-US" dirty="0"/>
+              <a:t>Right plot linearizes the Blue line of the left plot.</a:t>
             </a:r>
           </a:p>
           <a:p>
@@ -6941,7 +6859,7 @@
                 <a16:creationId xmlns:a16="http://schemas.microsoft.com/office/drawing/2014/main" id="{482BD70C-C4A0-46C4-9518-A731098B419A}"/>
               </a:ext>
               <a:ext uri="{C183D7F6-B498-43B3-948B-1728B52AA6E4}">
-                <adec:decorative xmlns:adec="http://schemas.microsoft.com/office/drawing/2017/decorative" xmlns="" val="1"/>
+                <adec:decorative xmlns="" xmlns:adec="http://schemas.microsoft.com/office/drawing/2017/decorative" val="1"/>
               </a:ext>
             </a:extLst>
           </p:cNvPr>
@@ -7174,7 +7092,7 @@
                 <a16:creationId xmlns:a16="http://schemas.microsoft.com/office/drawing/2014/main" id="{39B74A45-BDDD-4892-B8C0-B290C0944FCB}"/>
               </a:ext>
               <a:ext uri="{C183D7F6-B498-43B3-948B-1728B52AA6E4}">
-                <adec:decorative xmlns:adec="http://schemas.microsoft.com/office/drawing/2017/decorative" xmlns="" val="1"/>
+                <adec:decorative xmlns="" xmlns:adec="http://schemas.microsoft.com/office/drawing/2017/decorative" val="1"/>
               </a:ext>
             </a:extLst>
           </p:cNvPr>
@@ -7369,7 +7287,7 @@
                 <a16:creationId xmlns:a16="http://schemas.microsoft.com/office/drawing/2014/main" id="{C516C73E-9465-4C9E-9B86-9E58FB326B6B}"/>
               </a:ext>
               <a:ext uri="{C183D7F6-B498-43B3-948B-1728B52AA6E4}">
-                <adec:decorative xmlns:adec="http://schemas.microsoft.com/office/drawing/2017/decorative" xmlns="" val="1"/>
+                <adec:decorative xmlns="" xmlns:adec="http://schemas.microsoft.com/office/drawing/2017/decorative" val="1"/>
               </a:ext>
             </a:extLst>
           </p:cNvPr>
@@ -7637,7 +7555,7 @@
                 <a16:creationId xmlns:a16="http://schemas.microsoft.com/office/drawing/2014/main" id="{6753252F-4873-4F63-801D-CC719279A7D5}"/>
               </a:ext>
               <a:ext uri="{C183D7F6-B498-43B3-948B-1728B52AA6E4}">
-                <adec:decorative xmlns="" xmlns:adec="http://schemas.microsoft.com/office/drawing/2017/decorative" val="1"/>
+                <adec:decorative xmlns:adec="http://schemas.microsoft.com/office/drawing/2017/decorative" xmlns="" val="1"/>
               </a:ext>
             </a:extLst>
           </p:cNvPr>
@@ -7700,7 +7618,7 @@
                 <a16:creationId xmlns:a16="http://schemas.microsoft.com/office/drawing/2014/main" id="{047C8CCB-F95D-4249-92DD-651249D3535A}"/>
               </a:ext>
               <a:ext uri="{C183D7F6-B498-43B3-948B-1728B52AA6E4}">
-                <adec:decorative xmlns="" xmlns:adec="http://schemas.microsoft.com/office/drawing/2017/decorative" val="1"/>
+                <adec:decorative xmlns:adec="http://schemas.microsoft.com/office/drawing/2017/decorative" xmlns="" val="1"/>
               </a:ext>
             </a:extLst>
           </p:cNvPr>
@@ -8097,7 +8015,7 @@
                 <a16:creationId xmlns:a16="http://schemas.microsoft.com/office/drawing/2014/main" id="{081FF5F3-D973-4367-9851-C04740586B84}"/>
               </a:ext>
               <a:ext uri="{C183D7F6-B498-43B3-948B-1728B52AA6E4}">
-                <adec:decorative xmlns="" xmlns:adec="http://schemas.microsoft.com/office/drawing/2017/decorative" val="1"/>
+                <adec:decorative xmlns:adec="http://schemas.microsoft.com/office/drawing/2017/decorative" xmlns="" val="1"/>
               </a:ext>
             </a:extLst>
           </p:cNvPr>
@@ -8273,10 +8191,10 @@
       </p:grpSpPr>
       <p:sp>
         <p:nvSpPr>
-          <p:cNvPr id="44" name="Rectangle 12">
-            <a:extLst>
-              <a:ext uri="{FF2B5EF4-FFF2-40B4-BE49-F238E27FC236}">
-                <a16:creationId xmlns:a16="http://schemas.microsoft.com/office/drawing/2014/main" id="{B1ED02B1-1BC5-458F-9994-627281CFE7C4}"/>
+          <p:cNvPr id="21" name="Rectangle 14">
+            <a:extLst>
+              <a:ext uri="{FF2B5EF4-FFF2-40B4-BE49-F238E27FC236}">
+                <a16:creationId xmlns:a16="http://schemas.microsoft.com/office/drawing/2014/main" id="{5F9CFCE6-877F-4858-B8BD-2C52CA8AFBC4}"/>
               </a:ext>
               <a:ext uri="{C183D7F6-B498-43B3-948B-1728B52AA6E4}">
                 <adec:decorative xmlns:adec="http://schemas.microsoft.com/office/drawing/2017/decorative" xmlns="" val="1"/>
@@ -8296,16 +8214,14 @@
         </p:nvSpPr>
         <p:spPr>
           <a:xfrm>
-            <a:off x="0" y="4923691"/>
-            <a:ext cx="12192000" cy="1934309"/>
+            <a:off x="0" y="0"/>
+            <a:ext cx="12192000" cy="6858000"/>
           </a:xfrm>
           <a:prstGeom prst="rect">
             <a:avLst/>
           </a:prstGeom>
           <a:solidFill>
-            <a:schemeClr val="accent2">
-              <a:lumMod val="75000"/>
-            </a:schemeClr>
+            <a:srgbClr val="4E4E4E"/>
           </a:solidFill>
           <a:ln>
             <a:noFill/>
@@ -8338,64 +8254,64 @@
       </p:sp>
       <p:sp>
         <p:nvSpPr>
-          <p:cNvPr id="8" name="TextBox 7">
-            <a:extLst>
-              <a:ext uri="{FF2B5EF4-FFF2-40B4-BE49-F238E27FC236}">
-                <a16:creationId xmlns:a16="http://schemas.microsoft.com/office/drawing/2014/main" id="{4B1E0101-6957-4329-A8AD-D1F84D446BD3}"/>
-              </a:ext>
-            </a:extLst>
-          </p:cNvPr>
-          <p:cNvSpPr txBox="1"/>
-          <p:nvPr/>
+          <p:cNvPr id="22" name="Rectangle 16">
+            <a:extLst>
+              <a:ext uri="{FF2B5EF4-FFF2-40B4-BE49-F238E27FC236}">
+                <a16:creationId xmlns:a16="http://schemas.microsoft.com/office/drawing/2014/main" id="{8213F8A0-12AE-4514-8372-0DD766EC28EE}"/>
+              </a:ext>
+              <a:ext uri="{C183D7F6-B498-43B3-948B-1728B52AA6E4}">
+                <adec:decorative xmlns:adec="http://schemas.microsoft.com/office/drawing/2017/decorative" xmlns="" val="1"/>
+              </a:ext>
+            </a:extLst>
+          </p:cNvPr>
+          <p:cNvSpPr>
+            <a:spLocks noGrp="1" noRot="1" noChangeAspect="1" noMove="1" noResize="1" noEditPoints="1" noAdjustHandles="1" noChangeArrowheads="1" noChangeShapeType="1" noTextEdit="1"/>
+          </p:cNvSpPr>
+          <p:nvPr>
+            <p:extLst>
+              <p:ext uri="{386F3935-93C4-4BCD-93E2-E3B085C9AB24}">
+                <p16:designElem xmlns:p16="http://schemas.microsoft.com/office/powerpoint/2015/main" val="1"/>
+              </p:ext>
+            </p:extLst>
+          </p:nvPr>
         </p:nvSpPr>
         <p:spPr>
           <a:xfrm>
-            <a:off x="2231136" y="4388020"/>
-            <a:ext cx="7729728" cy="1188720"/>
+            <a:off x="6256866" y="480060"/>
+            <a:ext cx="5458122" cy="5897880"/>
           </a:xfrm>
           <a:prstGeom prst="rect">
             <a:avLst/>
           </a:prstGeom>
           <a:solidFill>
-            <a:schemeClr val="bg1"/>
+            <a:srgbClr val="FFFFFF"/>
           </a:solidFill>
-          <a:ln w="31750">
-            <a:solidFill>
-              <a:schemeClr val="tx1">
-                <a:lumMod val="75000"/>
-                <a:lumOff val="25000"/>
-              </a:schemeClr>
-            </a:solidFill>
+          <a:ln>
+            <a:noFill/>
           </a:ln>
         </p:spPr>
-        <p:txBody>
-          <a:bodyPr vert="horz" lIns="91440" tIns="45720" rIns="91440" bIns="45720" rtlCol="0" anchor="ctr">
-            <a:normAutofit/>
-          </a:bodyPr>
-          <a:lstStyle/>
-          <a:p>
-            <a:pPr algn="ctr">
-              <a:lnSpc>
-                <a:spcPct val="90000"/>
-              </a:lnSpc>
-              <a:spcBef>
-                <a:spcPct val="0"/>
-              </a:spcBef>
-              <a:spcAft>
-                <a:spcPts val="600"/>
-              </a:spcAft>
-            </a:pPr>
-            <a:r>
-              <a:rPr lang="en-US" sz="3200" kern="1200" dirty="0">
-                <a:solidFill>
-                  <a:schemeClr val="tx1"/>
-                </a:solidFill>
-                <a:latin typeface="+mj-lt"/>
-                <a:ea typeface="+mj-ea"/>
-                <a:cs typeface="+mj-cs"/>
-              </a:rPr>
-              <a:t>Genre Model Comparison</a:t>
-            </a:r>
+        <p:style>
+          <a:lnRef idx="2">
+            <a:schemeClr val="accent1">
+              <a:shade val="50000"/>
+            </a:schemeClr>
+          </a:lnRef>
+          <a:fillRef idx="1">
+            <a:schemeClr val="accent1"/>
+          </a:fillRef>
+          <a:effectRef idx="0">
+            <a:schemeClr val="accent1"/>
+          </a:effectRef>
+          <a:fontRef idx="minor">
+            <a:schemeClr val="lt1"/>
+          </a:fontRef>
+        </p:style>
+        <p:txBody>
+          <a:bodyPr rtlCol="0" anchor="ctr"/>
+          <a:lstStyle/>
+          <a:p>
+            <a:pPr algn="ctr"/>
+            <a:endParaRPr lang="en-US"/>
           </a:p>
         </p:txBody>
       </p:sp>
@@ -8404,7 +8320,7 @@
           <p:cNvPr id="4" name="Picture 3">
             <a:extLst>
               <a:ext uri="{FF2B5EF4-FFF2-40B4-BE49-F238E27FC236}">
-                <a16:creationId xmlns:a16="http://schemas.microsoft.com/office/drawing/2014/main" id="{08A1BEA9-F296-4F4E-9089-281C3A058AEF}"/>
+                <a16:creationId xmlns:a16="http://schemas.microsoft.com/office/drawing/2014/main" id="{71933D94-9E80-4589-AA88-3E0AC79C6826}"/>
               </a:ext>
             </a:extLst>
           </p:cNvPr>
@@ -8427,18 +8343,189 @@
         </p:blipFill>
         <p:spPr>
           <a:xfrm>
-            <a:off x="814066" y="1729939"/>
-            <a:ext cx="10519207" cy="1559171"/>
+            <a:off x="6421035" y="1274491"/>
+            <a:ext cx="5129784" cy="4309017"/>
           </a:xfrm>
           <a:prstGeom prst="rect">
             <a:avLst/>
           </a:prstGeom>
         </p:spPr>
       </p:pic>
+      <p:sp>
+        <p:nvSpPr>
+          <p:cNvPr id="23" name="Rectangle 18">
+            <a:extLst>
+              <a:ext uri="{FF2B5EF4-FFF2-40B4-BE49-F238E27FC236}">
+                <a16:creationId xmlns:a16="http://schemas.microsoft.com/office/drawing/2014/main" id="{9EFF17D4-9A8C-4CE5-B096-D8CCD4400437}"/>
+              </a:ext>
+              <a:ext uri="{C183D7F6-B498-43B3-948B-1728B52AA6E4}">
+                <adec:decorative xmlns:adec="http://schemas.microsoft.com/office/drawing/2017/decorative" xmlns="" val="1"/>
+              </a:ext>
+            </a:extLst>
+          </p:cNvPr>
+          <p:cNvSpPr>
+            <a:spLocks noGrp="1" noRot="1" noChangeAspect="1" noMove="1" noResize="1" noEditPoints="1" noAdjustHandles="1" noChangeArrowheads="1" noChangeShapeType="1" noTextEdit="1"/>
+          </p:cNvSpPr>
+          <p:nvPr>
+            <p:extLst>
+              <p:ext uri="{386F3935-93C4-4BCD-93E2-E3B085C9AB24}">
+                <p16:designElem xmlns:p16="http://schemas.microsoft.com/office/powerpoint/2015/main" val="1"/>
+              </p:ext>
+            </p:extLst>
+          </p:nvPr>
+        </p:nvSpPr>
+        <p:spPr>
+          <a:xfrm>
+            <a:off x="477012" y="480060"/>
+            <a:ext cx="5458121" cy="5897880"/>
+          </a:xfrm>
+          <a:prstGeom prst="rect">
+            <a:avLst/>
+          </a:prstGeom>
+          <a:solidFill>
+            <a:srgbClr val="FFFFFF"/>
+          </a:solidFill>
+          <a:ln>
+            <a:noFill/>
+          </a:ln>
+        </p:spPr>
+        <p:style>
+          <a:lnRef idx="2">
+            <a:schemeClr val="accent1">
+              <a:shade val="50000"/>
+            </a:schemeClr>
+          </a:lnRef>
+          <a:fillRef idx="1">
+            <a:schemeClr val="accent1"/>
+          </a:fillRef>
+          <a:effectRef idx="0">
+            <a:schemeClr val="accent1"/>
+          </a:effectRef>
+          <a:fontRef idx="minor">
+            <a:schemeClr val="lt1"/>
+          </a:fontRef>
+        </p:style>
+        <p:txBody>
+          <a:bodyPr rtlCol="0" anchor="ctr"/>
+          <a:lstStyle/>
+          <a:p>
+            <a:pPr algn="ctr"/>
+            <a:endParaRPr lang="en-US"/>
+          </a:p>
+        </p:txBody>
+      </p:sp>
+      <p:pic>
+        <p:nvPicPr>
+          <p:cNvPr id="7" name="Picture 6">
+            <a:extLst>
+              <a:ext uri="{FF2B5EF4-FFF2-40B4-BE49-F238E27FC236}">
+                <a16:creationId xmlns:a16="http://schemas.microsoft.com/office/drawing/2014/main" id="{D077D200-B65F-4018-986E-355297A88A74}"/>
+              </a:ext>
+            </a:extLst>
+          </p:cNvPr>
+          <p:cNvPicPr>
+            <a:picLocks noChangeAspect="1"/>
+          </p:cNvPicPr>
+          <p:nvPr/>
+        </p:nvPicPr>
+        <p:blipFill>
+          <a:blip r:embed="rId4">
+            <a:extLst>
+              <a:ext uri="{28A0092B-C50C-407E-A947-70E740481C1C}">
+                <a14:useLocalDpi xmlns:a14="http://schemas.microsoft.com/office/drawing/2010/main" val="0"/>
+              </a:ext>
+            </a:extLst>
+          </a:blip>
+          <a:stretch>
+            <a:fillRect/>
+          </a:stretch>
+        </p:blipFill>
+        <p:spPr>
+          <a:xfrm>
+            <a:off x="641180" y="1274491"/>
+            <a:ext cx="5129784" cy="4309017"/>
+          </a:xfrm>
+          <a:prstGeom prst="rect">
+            <a:avLst/>
+          </a:prstGeom>
+        </p:spPr>
+      </p:pic>
+      <p:sp>
+        <p:nvSpPr>
+          <p:cNvPr id="16" name="TextBox 15">
+            <a:extLst>
+              <a:ext uri="{FF2B5EF4-FFF2-40B4-BE49-F238E27FC236}">
+                <a16:creationId xmlns:a16="http://schemas.microsoft.com/office/drawing/2014/main" id="{035F69F4-4DCB-4A05-AE9C-EF586C1537EF}"/>
+              </a:ext>
+            </a:extLst>
+          </p:cNvPr>
+          <p:cNvSpPr txBox="1"/>
+          <p:nvPr/>
+        </p:nvSpPr>
+        <p:spPr>
+          <a:xfrm>
+            <a:off x="477012" y="480059"/>
+            <a:ext cx="5458121" cy="523220"/>
+          </a:xfrm>
+          <a:prstGeom prst="rect">
+            <a:avLst/>
+          </a:prstGeom>
+          <a:noFill/>
+        </p:spPr>
+        <p:txBody>
+          <a:bodyPr vert="horz" wrap="square" rtlCol="0">
+            <a:spAutoFit/>
+          </a:bodyPr>
+          <a:lstStyle/>
+          <a:p>
+            <a:pPr algn="ctr"/>
+            <a:r>
+              <a:rPr lang="en-US" sz="2800" dirty="0"/>
+              <a:t>Decision Tree</a:t>
+            </a:r>
+          </a:p>
+        </p:txBody>
+      </p:sp>
+      <p:sp>
+        <p:nvSpPr>
+          <p:cNvPr id="18" name="TextBox 17">
+            <a:extLst>
+              <a:ext uri="{FF2B5EF4-FFF2-40B4-BE49-F238E27FC236}">
+                <a16:creationId xmlns:a16="http://schemas.microsoft.com/office/drawing/2014/main" id="{8B8F7086-B8C6-4CEC-832B-07F9E3CF815E}"/>
+              </a:ext>
+            </a:extLst>
+          </p:cNvPr>
+          <p:cNvSpPr txBox="1"/>
+          <p:nvPr/>
+        </p:nvSpPr>
+        <p:spPr>
+          <a:xfrm>
+            <a:off x="6256866" y="480059"/>
+            <a:ext cx="5458121" cy="523220"/>
+          </a:xfrm>
+          <a:prstGeom prst="rect">
+            <a:avLst/>
+          </a:prstGeom>
+          <a:noFill/>
+        </p:spPr>
+        <p:txBody>
+          <a:bodyPr vert="horz" wrap="square" rtlCol="0">
+            <a:spAutoFit/>
+          </a:bodyPr>
+          <a:lstStyle/>
+          <a:p>
+            <a:pPr algn="ctr"/>
+            <a:r>
+              <a:rPr lang="en-US" sz="2800" dirty="0"/>
+              <a:t>Random Forest</a:t>
+            </a:r>
+          </a:p>
+        </p:txBody>
+      </p:sp>
     </p:spTree>
     <p:extLst>
       <p:ext uri="{BB962C8B-B14F-4D97-AF65-F5344CB8AC3E}">
-        <p14:creationId xmlns:p14="http://schemas.microsoft.com/office/powerpoint/2010/main" val="2620087179"/>
+        <p14:creationId xmlns:p14="http://schemas.microsoft.com/office/powerpoint/2010/main" val="3160989603"/>
       </p:ext>
     </p:extLst>
   </p:cSld>
@@ -8475,10 +8562,10 @@
       </p:grpSpPr>
       <p:sp>
         <p:nvSpPr>
-          <p:cNvPr id="21" name="Rectangle 14">
-            <a:extLst>
-              <a:ext uri="{FF2B5EF4-FFF2-40B4-BE49-F238E27FC236}">
-                <a16:creationId xmlns:a16="http://schemas.microsoft.com/office/drawing/2014/main" id="{5F9CFCE6-877F-4858-B8BD-2C52CA8AFBC4}"/>
+          <p:cNvPr id="44" name="Rectangle 12">
+            <a:extLst>
+              <a:ext uri="{FF2B5EF4-FFF2-40B4-BE49-F238E27FC236}">
+                <a16:creationId xmlns:a16="http://schemas.microsoft.com/office/drawing/2014/main" id="{B1ED02B1-1BC5-458F-9994-627281CFE7C4}"/>
               </a:ext>
               <a:ext uri="{C183D7F6-B498-43B3-948B-1728B52AA6E4}">
                 <adec:decorative xmlns="" xmlns:adec="http://schemas.microsoft.com/office/drawing/2017/decorative" val="1"/>
@@ -8498,14 +8585,16 @@
         </p:nvSpPr>
         <p:spPr>
           <a:xfrm>
-            <a:off x="0" y="0"/>
-            <a:ext cx="12192000" cy="6858000"/>
+            <a:off x="0" y="4923691"/>
+            <a:ext cx="12192000" cy="1934309"/>
           </a:xfrm>
           <a:prstGeom prst="rect">
             <a:avLst/>
           </a:prstGeom>
           <a:solidFill>
-            <a:srgbClr val="4E4E4E"/>
+            <a:schemeClr val="accent2">
+              <a:lumMod val="75000"/>
+            </a:schemeClr>
           </a:solidFill>
           <a:ln>
             <a:noFill/>
@@ -8538,64 +8627,64 @@
       </p:sp>
       <p:sp>
         <p:nvSpPr>
-          <p:cNvPr id="22" name="Rectangle 16">
-            <a:extLst>
-              <a:ext uri="{FF2B5EF4-FFF2-40B4-BE49-F238E27FC236}">
-                <a16:creationId xmlns:a16="http://schemas.microsoft.com/office/drawing/2014/main" id="{8213F8A0-12AE-4514-8372-0DD766EC28EE}"/>
-              </a:ext>
-              <a:ext uri="{C183D7F6-B498-43B3-948B-1728B52AA6E4}">
-                <adec:decorative xmlns="" xmlns:adec="http://schemas.microsoft.com/office/drawing/2017/decorative" val="1"/>
-              </a:ext>
-            </a:extLst>
-          </p:cNvPr>
-          <p:cNvSpPr>
-            <a:spLocks noGrp="1" noRot="1" noChangeAspect="1" noMove="1" noResize="1" noEditPoints="1" noAdjustHandles="1" noChangeArrowheads="1" noChangeShapeType="1" noTextEdit="1"/>
-          </p:cNvSpPr>
-          <p:nvPr>
-            <p:extLst>
-              <p:ext uri="{386F3935-93C4-4BCD-93E2-E3B085C9AB24}">
-                <p16:designElem xmlns:p16="http://schemas.microsoft.com/office/powerpoint/2015/main" val="1"/>
-              </p:ext>
-            </p:extLst>
-          </p:nvPr>
+          <p:cNvPr id="8" name="TextBox 7">
+            <a:extLst>
+              <a:ext uri="{FF2B5EF4-FFF2-40B4-BE49-F238E27FC236}">
+                <a16:creationId xmlns:a16="http://schemas.microsoft.com/office/drawing/2014/main" id="{4B1E0101-6957-4329-A8AD-D1F84D446BD3}"/>
+              </a:ext>
+            </a:extLst>
+          </p:cNvPr>
+          <p:cNvSpPr txBox="1"/>
+          <p:nvPr/>
         </p:nvSpPr>
         <p:spPr>
           <a:xfrm>
-            <a:off x="6256866" y="480060"/>
-            <a:ext cx="5458122" cy="5897880"/>
+            <a:off x="2231136" y="4388020"/>
+            <a:ext cx="7729728" cy="1188720"/>
           </a:xfrm>
           <a:prstGeom prst="rect">
             <a:avLst/>
           </a:prstGeom>
           <a:solidFill>
-            <a:srgbClr val="FFFFFF"/>
+            <a:schemeClr val="bg1"/>
           </a:solidFill>
-          <a:ln>
-            <a:noFill/>
+          <a:ln w="31750">
+            <a:solidFill>
+              <a:schemeClr val="tx1">
+                <a:lumMod val="75000"/>
+                <a:lumOff val="25000"/>
+              </a:schemeClr>
+            </a:solidFill>
           </a:ln>
         </p:spPr>
-        <p:style>
-          <a:lnRef idx="2">
-            <a:schemeClr val="accent1">
-              <a:shade val="50000"/>
-            </a:schemeClr>
-          </a:lnRef>
-          <a:fillRef idx="1">
-            <a:schemeClr val="accent1"/>
-          </a:fillRef>
-          <a:effectRef idx="0">
-            <a:schemeClr val="accent1"/>
-          </a:effectRef>
-          <a:fontRef idx="minor">
-            <a:schemeClr val="lt1"/>
-          </a:fontRef>
-        </p:style>
-        <p:txBody>
-          <a:bodyPr rtlCol="0" anchor="ctr"/>
-          <a:lstStyle/>
-          <a:p>
-            <a:pPr algn="ctr"/>
-            <a:endParaRPr lang="en-US"/>
+        <p:txBody>
+          <a:bodyPr vert="horz" lIns="91440" tIns="45720" rIns="91440" bIns="45720" rtlCol="0" anchor="ctr">
+            <a:normAutofit/>
+          </a:bodyPr>
+          <a:lstStyle/>
+          <a:p>
+            <a:pPr algn="ctr">
+              <a:lnSpc>
+                <a:spcPct val="90000"/>
+              </a:lnSpc>
+              <a:spcBef>
+                <a:spcPct val="0"/>
+              </a:spcBef>
+              <a:spcAft>
+                <a:spcPts val="600"/>
+              </a:spcAft>
+            </a:pPr>
+            <a:r>
+              <a:rPr lang="en-US" sz="3200" kern="1200" dirty="0">
+                <a:solidFill>
+                  <a:schemeClr val="tx1"/>
+                </a:solidFill>
+                <a:latin typeface="+mj-lt"/>
+                <a:ea typeface="+mj-ea"/>
+                <a:cs typeface="+mj-cs"/>
+              </a:rPr>
+              <a:t>Genre Model Comparison</a:t>
+            </a:r>
           </a:p>
         </p:txBody>
       </p:sp>
@@ -8604,7 +8693,7 @@
           <p:cNvPr id="4" name="Picture 3">
             <a:extLst>
               <a:ext uri="{FF2B5EF4-FFF2-40B4-BE49-F238E27FC236}">
-                <a16:creationId xmlns:a16="http://schemas.microsoft.com/office/drawing/2014/main" id="{71933D94-9E80-4589-AA88-3E0AC79C6826}"/>
+                <a16:creationId xmlns:a16="http://schemas.microsoft.com/office/drawing/2014/main" id="{08A1BEA9-F296-4F4E-9089-281C3A058AEF}"/>
               </a:ext>
             </a:extLst>
           </p:cNvPr>
@@ -8627,189 +8716,18 @@
         </p:blipFill>
         <p:spPr>
           <a:xfrm>
-            <a:off x="6421035" y="1274491"/>
-            <a:ext cx="5129784" cy="4309017"/>
+            <a:off x="814066" y="1729939"/>
+            <a:ext cx="10519207" cy="1559171"/>
           </a:xfrm>
           <a:prstGeom prst="rect">
             <a:avLst/>
           </a:prstGeom>
         </p:spPr>
       </p:pic>
-      <p:sp>
-        <p:nvSpPr>
-          <p:cNvPr id="23" name="Rectangle 18">
-            <a:extLst>
-              <a:ext uri="{FF2B5EF4-FFF2-40B4-BE49-F238E27FC236}">
-                <a16:creationId xmlns:a16="http://schemas.microsoft.com/office/drawing/2014/main" id="{9EFF17D4-9A8C-4CE5-B096-D8CCD4400437}"/>
-              </a:ext>
-              <a:ext uri="{C183D7F6-B498-43B3-948B-1728B52AA6E4}">
-                <adec:decorative xmlns="" xmlns:adec="http://schemas.microsoft.com/office/drawing/2017/decorative" val="1"/>
-              </a:ext>
-            </a:extLst>
-          </p:cNvPr>
-          <p:cNvSpPr>
-            <a:spLocks noGrp="1" noRot="1" noChangeAspect="1" noMove="1" noResize="1" noEditPoints="1" noAdjustHandles="1" noChangeArrowheads="1" noChangeShapeType="1" noTextEdit="1"/>
-          </p:cNvSpPr>
-          <p:nvPr>
-            <p:extLst>
-              <p:ext uri="{386F3935-93C4-4BCD-93E2-E3B085C9AB24}">
-                <p16:designElem xmlns:p16="http://schemas.microsoft.com/office/powerpoint/2015/main" val="1"/>
-              </p:ext>
-            </p:extLst>
-          </p:nvPr>
-        </p:nvSpPr>
-        <p:spPr>
-          <a:xfrm>
-            <a:off x="477012" y="480060"/>
-            <a:ext cx="5458121" cy="5897880"/>
-          </a:xfrm>
-          <a:prstGeom prst="rect">
-            <a:avLst/>
-          </a:prstGeom>
-          <a:solidFill>
-            <a:srgbClr val="FFFFFF"/>
-          </a:solidFill>
-          <a:ln>
-            <a:noFill/>
-          </a:ln>
-        </p:spPr>
-        <p:style>
-          <a:lnRef idx="2">
-            <a:schemeClr val="accent1">
-              <a:shade val="50000"/>
-            </a:schemeClr>
-          </a:lnRef>
-          <a:fillRef idx="1">
-            <a:schemeClr val="accent1"/>
-          </a:fillRef>
-          <a:effectRef idx="0">
-            <a:schemeClr val="accent1"/>
-          </a:effectRef>
-          <a:fontRef idx="minor">
-            <a:schemeClr val="lt1"/>
-          </a:fontRef>
-        </p:style>
-        <p:txBody>
-          <a:bodyPr rtlCol="0" anchor="ctr"/>
-          <a:lstStyle/>
-          <a:p>
-            <a:pPr algn="ctr"/>
-            <a:endParaRPr lang="en-US"/>
-          </a:p>
-        </p:txBody>
-      </p:sp>
-      <p:pic>
-        <p:nvPicPr>
-          <p:cNvPr id="7" name="Picture 6">
-            <a:extLst>
-              <a:ext uri="{FF2B5EF4-FFF2-40B4-BE49-F238E27FC236}">
-                <a16:creationId xmlns:a16="http://schemas.microsoft.com/office/drawing/2014/main" id="{D077D200-B65F-4018-986E-355297A88A74}"/>
-              </a:ext>
-            </a:extLst>
-          </p:cNvPr>
-          <p:cNvPicPr>
-            <a:picLocks noChangeAspect="1"/>
-          </p:cNvPicPr>
-          <p:nvPr/>
-        </p:nvPicPr>
-        <p:blipFill>
-          <a:blip r:embed="rId4">
-            <a:extLst>
-              <a:ext uri="{28A0092B-C50C-407E-A947-70E740481C1C}">
-                <a14:useLocalDpi xmlns:a14="http://schemas.microsoft.com/office/drawing/2010/main" val="0"/>
-              </a:ext>
-            </a:extLst>
-          </a:blip>
-          <a:stretch>
-            <a:fillRect/>
-          </a:stretch>
-        </p:blipFill>
-        <p:spPr>
-          <a:xfrm>
-            <a:off x="641180" y="1274491"/>
-            <a:ext cx="5129784" cy="4309017"/>
-          </a:xfrm>
-          <a:prstGeom prst="rect">
-            <a:avLst/>
-          </a:prstGeom>
-        </p:spPr>
-      </p:pic>
-      <p:sp>
-        <p:nvSpPr>
-          <p:cNvPr id="16" name="TextBox 15">
-            <a:extLst>
-              <a:ext uri="{FF2B5EF4-FFF2-40B4-BE49-F238E27FC236}">
-                <a16:creationId xmlns:a16="http://schemas.microsoft.com/office/drawing/2014/main" id="{035F69F4-4DCB-4A05-AE9C-EF586C1537EF}"/>
-              </a:ext>
-            </a:extLst>
-          </p:cNvPr>
-          <p:cNvSpPr txBox="1"/>
-          <p:nvPr/>
-        </p:nvSpPr>
-        <p:spPr>
-          <a:xfrm>
-            <a:off x="477012" y="480059"/>
-            <a:ext cx="5458121" cy="523220"/>
-          </a:xfrm>
-          <a:prstGeom prst="rect">
-            <a:avLst/>
-          </a:prstGeom>
-          <a:noFill/>
-        </p:spPr>
-        <p:txBody>
-          <a:bodyPr vert="horz" wrap="square" rtlCol="0">
-            <a:spAutoFit/>
-          </a:bodyPr>
-          <a:lstStyle/>
-          <a:p>
-            <a:pPr algn="ctr"/>
-            <a:r>
-              <a:rPr lang="en-US" sz="2800" dirty="0"/>
-              <a:t>Decision Tree</a:t>
-            </a:r>
-          </a:p>
-        </p:txBody>
-      </p:sp>
-      <p:sp>
-        <p:nvSpPr>
-          <p:cNvPr id="18" name="TextBox 17">
-            <a:extLst>
-              <a:ext uri="{FF2B5EF4-FFF2-40B4-BE49-F238E27FC236}">
-                <a16:creationId xmlns:a16="http://schemas.microsoft.com/office/drawing/2014/main" id="{8B8F7086-B8C6-4CEC-832B-07F9E3CF815E}"/>
-              </a:ext>
-            </a:extLst>
-          </p:cNvPr>
-          <p:cNvSpPr txBox="1"/>
-          <p:nvPr/>
-        </p:nvSpPr>
-        <p:spPr>
-          <a:xfrm>
-            <a:off x="6256866" y="480059"/>
-            <a:ext cx="5458121" cy="523220"/>
-          </a:xfrm>
-          <a:prstGeom prst="rect">
-            <a:avLst/>
-          </a:prstGeom>
-          <a:noFill/>
-        </p:spPr>
-        <p:txBody>
-          <a:bodyPr vert="horz" wrap="square" rtlCol="0">
-            <a:spAutoFit/>
-          </a:bodyPr>
-          <a:lstStyle/>
-          <a:p>
-            <a:pPr algn="ctr"/>
-            <a:r>
-              <a:rPr lang="en-US" sz="2800" dirty="0"/>
-              <a:t>Random Forest</a:t>
-            </a:r>
-          </a:p>
-        </p:txBody>
-      </p:sp>
     </p:spTree>
     <p:extLst>
       <p:ext uri="{BB962C8B-B14F-4D97-AF65-F5344CB8AC3E}">
-        <p14:creationId xmlns:p14="http://schemas.microsoft.com/office/powerpoint/2010/main" val="3160989603"/>
+        <p14:creationId xmlns:p14="http://schemas.microsoft.com/office/powerpoint/2010/main" val="2620087179"/>
       </p:ext>
     </p:extLst>
   </p:cSld>
@@ -8852,7 +8770,7 @@
                 <a16:creationId xmlns:a16="http://schemas.microsoft.com/office/drawing/2014/main" id="{72257994-BD97-4691-8B89-198A6D2BABDC}"/>
               </a:ext>
               <a:ext uri="{C183D7F6-B498-43B3-948B-1728B52AA6E4}">
-                <adec:decorative xmlns="" xmlns:adec="http://schemas.microsoft.com/office/drawing/2017/decorative" val="1"/>
+                <adec:decorative xmlns:adec="http://schemas.microsoft.com/office/drawing/2017/decorative" xmlns="" val="1"/>
               </a:ext>
             </a:extLst>
           </p:cNvPr>
@@ -9102,7 +9020,7 @@
                 <a16:creationId xmlns:a16="http://schemas.microsoft.com/office/drawing/2014/main" id="{AB45A142-4255-493C-8284-5D566C121B10}"/>
               </a:ext>
               <a:ext uri="{C183D7F6-B498-43B3-948B-1728B52AA6E4}">
-                <adec:decorative xmlns="" xmlns:adec="http://schemas.microsoft.com/office/drawing/2017/decorative" val="1"/>
+                <adec:decorative xmlns:adec="http://schemas.microsoft.com/office/drawing/2017/decorative" xmlns="" val="1"/>
               </a:ext>
             </a:extLst>
           </p:cNvPr>
@@ -9242,7 +9160,7 @@
                 <a16:creationId xmlns:a16="http://schemas.microsoft.com/office/drawing/2014/main" id="{38FB9660-F42F-4313-BBC4-47C007FE484C}"/>
               </a:ext>
               <a:ext uri="{C183D7F6-B498-43B3-948B-1728B52AA6E4}">
-                <adec:decorative xmlns="" xmlns:adec="http://schemas.microsoft.com/office/drawing/2017/decorative" val="1"/>
+                <adec:decorative xmlns:adec="http://schemas.microsoft.com/office/drawing/2017/decorative" xmlns="" val="1"/>
               </a:ext>
             </a:extLst>
           </p:cNvPr>
@@ -9503,7 +9421,7 @@
                 <a16:creationId xmlns:a16="http://schemas.microsoft.com/office/drawing/2014/main" id="{AB45A142-4255-493C-8284-5D566C121B10}"/>
               </a:ext>
               <a:ext uri="{C183D7F6-B498-43B3-948B-1728B52AA6E4}">
-                <adec:decorative xmlns="" xmlns:adec="http://schemas.microsoft.com/office/drawing/2017/decorative" val="1"/>
+                <adec:decorative xmlns:adec="http://schemas.microsoft.com/office/drawing/2017/decorative" xmlns="" val="1"/>
               </a:ext>
             </a:extLst>
           </p:cNvPr>
@@ -9634,7 +9552,7 @@
                 <a16:creationId xmlns:a16="http://schemas.microsoft.com/office/drawing/2014/main" id="{38FB9660-F42F-4313-BBC4-47C007FE484C}"/>
               </a:ext>
               <a:ext uri="{C183D7F6-B498-43B3-948B-1728B52AA6E4}">
-                <adec:decorative xmlns="" xmlns:adec="http://schemas.microsoft.com/office/drawing/2017/decorative" val="1"/>
+                <adec:decorative xmlns:adec="http://schemas.microsoft.com/office/drawing/2017/decorative" xmlns="" val="1"/>
               </a:ext>
             </a:extLst>
           </p:cNvPr>
@@ -10654,7 +10572,7 @@
                 <a16:creationId xmlns:a16="http://schemas.microsoft.com/office/drawing/2014/main" id="{A74B3BB9-7320-4C7D-876F-931A7DC2C478}"/>
               </a:ext>
               <a:ext uri="{C183D7F6-B498-43B3-948B-1728B52AA6E4}">
-                <adec:decorative xmlns="" xmlns:adec="http://schemas.microsoft.com/office/drawing/2017/decorative" val="1"/>
+                <adec:decorative xmlns:adec="http://schemas.microsoft.com/office/drawing/2017/decorative" xmlns="" val="1"/>
               </a:ext>
             </a:extLst>
           </p:cNvPr>
@@ -10800,7 +10718,7 @@
                 <a16:creationId xmlns:a16="http://schemas.microsoft.com/office/drawing/2014/main" id="{6753252F-4873-4F63-801D-CC719279A7D5}"/>
               </a:ext>
               <a:ext uri="{C183D7F6-B498-43B3-948B-1728B52AA6E4}">
-                <adec:decorative xmlns:adec="http://schemas.microsoft.com/office/drawing/2017/decorative" xmlns="" val="1"/>
+                <adec:decorative xmlns="" xmlns:adec="http://schemas.microsoft.com/office/drawing/2017/decorative" val="1"/>
               </a:ext>
             </a:extLst>
           </p:cNvPr>
@@ -10863,7 +10781,7 @@
                 <a16:creationId xmlns:a16="http://schemas.microsoft.com/office/drawing/2014/main" id="{047C8CCB-F95D-4249-92DD-651249D3535A}"/>
               </a:ext>
               <a:ext uri="{C183D7F6-B498-43B3-948B-1728B52AA6E4}">
-                <adec:decorative xmlns:adec="http://schemas.microsoft.com/office/drawing/2017/decorative" xmlns="" val="1"/>
+                <adec:decorative xmlns="" xmlns:adec="http://schemas.microsoft.com/office/drawing/2017/decorative" val="1"/>
               </a:ext>
             </a:extLst>
           </p:cNvPr>
@@ -11066,7 +10984,7 @@
                 <a16:creationId xmlns:a16="http://schemas.microsoft.com/office/drawing/2014/main" id="{4038CB10-1F5C-4D54-9DF7-12586DE5B007}"/>
               </a:ext>
               <a:ext uri="{C183D7F6-B498-43B3-948B-1728B52AA6E4}">
-                <adec:decorative xmlns="" xmlns:adec="http://schemas.microsoft.com/office/drawing/2017/decorative" val="1"/>
+                <adec:decorative xmlns:adec="http://schemas.microsoft.com/office/drawing/2017/decorative" xmlns="" val="1"/>
               </a:ext>
             </a:extLst>
           </p:cNvPr>
@@ -11247,7 +11165,7 @@
                 <a16:creationId xmlns:a16="http://schemas.microsoft.com/office/drawing/2014/main" id="{73ED6512-6858-4552-B699-9A97FE9A4EA2}"/>
               </a:ext>
               <a:ext uri="{C183D7F6-B498-43B3-948B-1728B52AA6E4}">
-                <adec:decorative xmlns="" xmlns:adec="http://schemas.microsoft.com/office/drawing/2017/decorative" val="1"/>
+                <adec:decorative xmlns:adec="http://schemas.microsoft.com/office/drawing/2017/decorative" xmlns="" val="1"/>
               </a:ext>
             </a:extLst>
           </p:cNvPr>
@@ -11619,7 +11537,7 @@
                 <a16:creationId xmlns:a16="http://schemas.microsoft.com/office/drawing/2014/main" id="{081FF5F3-D973-4367-9851-C04740586B84}"/>
               </a:ext>
               <a:ext uri="{C183D7F6-B498-43B3-948B-1728B52AA6E4}">
-                <adec:decorative xmlns="" xmlns:adec="http://schemas.microsoft.com/office/drawing/2017/decorative" val="1"/>
+                <adec:decorative xmlns:adec="http://schemas.microsoft.com/office/drawing/2017/decorative" xmlns="" val="1"/>
               </a:ext>
             </a:extLst>
           </p:cNvPr>
@@ -11837,7 +11755,7 @@
                 <a16:creationId xmlns:a16="http://schemas.microsoft.com/office/drawing/2014/main" id="{799448F2-0E5B-42DA-B2D1-11A14E947BD4}"/>
               </a:ext>
               <a:ext uri="{C183D7F6-B498-43B3-948B-1728B52AA6E4}">
-                <adec:decorative xmlns="" xmlns:adec="http://schemas.microsoft.com/office/drawing/2017/decorative" val="1"/>
+                <adec:decorative xmlns:adec="http://schemas.microsoft.com/office/drawing/2017/decorative" xmlns="" val="1"/>
               </a:ext>
             </a:extLst>
           </p:cNvPr>
@@ -11903,7 +11821,7 @@
                 <a16:creationId xmlns:a16="http://schemas.microsoft.com/office/drawing/2014/main" id="{4E8A7552-20E1-4F34-ADAB-C1DB6634D47E}"/>
               </a:ext>
               <a:ext uri="{C183D7F6-B498-43B3-948B-1728B52AA6E4}">
-                <adec:decorative xmlns="" xmlns:adec="http://schemas.microsoft.com/office/drawing/2017/decorative" val="1"/>
+                <adec:decorative xmlns:adec="http://schemas.microsoft.com/office/drawing/2017/decorative" xmlns="" val="1"/>
               </a:ext>
             </a:extLst>
           </p:cNvPr>
@@ -12151,7 +12069,7 @@
                 <a16:creationId xmlns:a16="http://schemas.microsoft.com/office/drawing/2014/main" id="{B1ED02B1-1BC5-458F-9994-627281CFE7C4}"/>
               </a:ext>
               <a:ext uri="{C183D7F6-B498-43B3-948B-1728B52AA6E4}">
-                <adec:decorative xmlns:adec="http://schemas.microsoft.com/office/drawing/2017/decorative" xmlns="" val="1"/>
+                <adec:decorative xmlns="" xmlns:adec="http://schemas.microsoft.com/office/drawing/2017/decorative" val="1"/>
               </a:ext>
             </a:extLst>
           </p:cNvPr>
@@ -12675,7 +12593,7 @@
                 <a16:creationId xmlns:a16="http://schemas.microsoft.com/office/drawing/2014/main" id="{E0D60ECE-8986-45DC-B7FE-EC7699B466B8}"/>
               </a:ext>
               <a:ext uri="{C183D7F6-B498-43B3-948B-1728B52AA6E4}">
-                <adec:decorative xmlns="" xmlns:adec="http://schemas.microsoft.com/office/drawing/2017/decorative" val="1"/>
+                <adec:decorative xmlns:adec="http://schemas.microsoft.com/office/drawing/2017/decorative" xmlns="" val="1"/>
               </a:ext>
             </a:extLst>
           </p:cNvPr>
@@ -12844,7 +12762,7 @@
                 <a16:creationId xmlns:a16="http://schemas.microsoft.com/office/drawing/2014/main" id="{96964194-5878-40D2-8EC0-DDC58387FA56}"/>
               </a:ext>
               <a:ext uri="{C183D7F6-B498-43B3-948B-1728B52AA6E4}">
-                <adec:decorative xmlns="" xmlns:adec="http://schemas.microsoft.com/office/drawing/2017/decorative" val="1"/>
+                <adec:decorative xmlns:adec="http://schemas.microsoft.com/office/drawing/2017/decorative" xmlns="" val="1"/>
               </a:ext>
             </a:extLst>
           </p:cNvPr>
@@ -13121,6 +13039,22 @@
             </a:pPr>
             <a:r>
               <a:rPr lang="en-US" dirty="0"/>
+              <a:t>Determine who to hire based on roles analyzed</a:t>
+            </a:r>
+          </a:p>
+          <a:p>
+            <a:pPr indent="-228600">
+              <a:lnSpc>
+                <a:spcPct val="90000"/>
+              </a:lnSpc>
+              <a:spcAft>
+                <a:spcPts val="600"/>
+              </a:spcAft>
+              <a:buFont typeface="Arial" panose="020B0604020202020204" pitchFamily="34" charset="0"/>
+              <a:buChar char="•"/>
+            </a:pPr>
+            <a:r>
+              <a:rPr lang="en-US" dirty="0"/>
               <a:t>Dataset for movie budgets and earnings</a:t>
             </a:r>
           </a:p>
@@ -13196,249 +13130,6 @@
 </file>
 
 <file path=ppt/slides/slide25.xml><?xml version="1.0" encoding="utf-8"?>
-<p:sld xmlns:a="http://schemas.openxmlformats.org/drawingml/2006/main" xmlns:r="http://schemas.openxmlformats.org/officeDocument/2006/relationships" xmlns:p="http://schemas.openxmlformats.org/presentationml/2006/main" show="0">
-  <p:cSld>
-    <p:bg>
-      <p:bgPr>
-        <a:solidFill>
-          <a:schemeClr val="accent2">
-            <a:lumMod val="75000"/>
-          </a:schemeClr>
-        </a:solidFill>
-        <a:effectLst/>
-      </p:bgPr>
-    </p:bg>
-    <p:spTree>
-      <p:nvGrpSpPr>
-        <p:cNvPr id="1" name=""/>
-        <p:cNvGrpSpPr/>
-        <p:nvPr/>
-      </p:nvGrpSpPr>
-      <p:grpSpPr>
-        <a:xfrm>
-          <a:off x="0" y="0"/>
-          <a:ext cx="0" cy="0"/>
-          <a:chOff x="0" y="0"/>
-          <a:chExt cx="0" cy="0"/>
-        </a:xfrm>
-      </p:grpSpPr>
-      <p:sp>
-        <p:nvSpPr>
-          <p:cNvPr id="7" name="Down Arrow 7">
-            <a:extLst>
-              <a:ext uri="{FF2B5EF4-FFF2-40B4-BE49-F238E27FC236}">
-                <a16:creationId xmlns:a16="http://schemas.microsoft.com/office/drawing/2014/main" id="{B547373F-AF2E-4907-B442-9F902B387FD0}"/>
-              </a:ext>
-              <a:ext uri="{C183D7F6-B498-43B3-948B-1728B52AA6E4}">
-                <adec:decorative xmlns="" xmlns:adec="http://schemas.microsoft.com/office/drawing/2017/decorative" val="1"/>
-              </a:ext>
-            </a:extLst>
-          </p:cNvPr>
-          <p:cNvSpPr>
-            <a:spLocks noGrp="1" noRot="1" noChangeAspect="1" noMove="1" noResize="1" noEditPoints="1" noAdjustHandles="1" noChangeArrowheads="1" noChangeShapeType="1" noTextEdit="1"/>
-          </p:cNvSpPr>
-          <p:nvPr>
-            <p:extLst>
-              <p:ext uri="{386F3935-93C4-4BCD-93E2-E3B085C9AB24}">
-                <p16:designElem xmlns:p16="http://schemas.microsoft.com/office/powerpoint/2015/main" val="1"/>
-              </p:ext>
-            </p:extLst>
-          </p:nvPr>
-        </p:nvSpPr>
-        <p:spPr>
-          <a:xfrm>
-            <a:off x="800100" y="-4763"/>
-            <a:ext cx="3333749" cy="3338514"/>
-          </a:xfrm>
-          <a:prstGeom prst="downArrow">
-            <a:avLst>
-              <a:gd name="adj1" fmla="val 100000"/>
-              <a:gd name="adj2" fmla="val 26890"/>
-            </a:avLst>
-          </a:prstGeom>
-          <a:solidFill>
-            <a:schemeClr val="bg2">
-              <a:lumMod val="25000"/>
-            </a:schemeClr>
-          </a:solidFill>
-          <a:ln w="53975">
-            <a:noFill/>
-          </a:ln>
-        </p:spPr>
-        <p:style>
-          <a:lnRef idx="2">
-            <a:schemeClr val="accent1">
-              <a:shade val="50000"/>
-            </a:schemeClr>
-          </a:lnRef>
-          <a:fillRef idx="1">
-            <a:schemeClr val="accent1"/>
-          </a:fillRef>
-          <a:effectRef idx="0">
-            <a:schemeClr val="accent1"/>
-          </a:effectRef>
-          <a:fontRef idx="minor">
-            <a:schemeClr val="lt1"/>
-          </a:fontRef>
-        </p:style>
-        <p:txBody>
-          <a:bodyPr rtlCol="0" anchor="ctr"/>
-          <a:lstStyle/>
-          <a:p>
-            <a:pPr algn="ctr"/>
-            <a:endParaRPr lang="en-US"/>
-          </a:p>
-        </p:txBody>
-      </p:sp>
-      <p:sp>
-        <p:nvSpPr>
-          <p:cNvPr id="2" name="TextBox 1">
-            <a:extLst>
-              <a:ext uri="{FF2B5EF4-FFF2-40B4-BE49-F238E27FC236}">
-                <a16:creationId xmlns:a16="http://schemas.microsoft.com/office/drawing/2014/main" id="{9A5B267B-DC99-48D5-AAE4-0080DA632EE8}"/>
-              </a:ext>
-            </a:extLst>
-          </p:cNvPr>
-          <p:cNvSpPr txBox="1"/>
-          <p:nvPr/>
-        </p:nvSpPr>
-        <p:spPr>
-          <a:xfrm>
-            <a:off x="1028700" y="190501"/>
-            <a:ext cx="2886075" cy="2486024"/>
-          </a:xfrm>
-          <a:prstGeom prst="rect">
-            <a:avLst/>
-          </a:prstGeom>
-          <a:noFill/>
-        </p:spPr>
-        <p:txBody>
-          <a:bodyPr vert="horz" lIns="91440" tIns="45720" rIns="91440" bIns="45720" rtlCol="0" anchor="ctr">
-            <a:normAutofit/>
-          </a:bodyPr>
-          <a:lstStyle/>
-          <a:p>
-            <a:pPr algn="ctr">
-              <a:lnSpc>
-                <a:spcPct val="90000"/>
-              </a:lnSpc>
-              <a:spcBef>
-                <a:spcPct val="0"/>
-              </a:spcBef>
-              <a:spcAft>
-                <a:spcPts val="600"/>
-              </a:spcAft>
-            </a:pPr>
-            <a:r>
-              <a:rPr lang="en-US" sz="4400" b="1" dirty="0">
-                <a:solidFill>
-                  <a:schemeClr val="bg1"/>
-                </a:solidFill>
-                <a:latin typeface="+mj-lt"/>
-                <a:ea typeface="+mj-ea"/>
-                <a:cs typeface="+mj-cs"/>
-              </a:rPr>
-              <a:t>Lessons Learned</a:t>
-            </a:r>
-          </a:p>
-        </p:txBody>
-      </p:sp>
-      <p:sp>
-        <p:nvSpPr>
-          <p:cNvPr id="3" name="TextBox 2">
-            <a:extLst>
-              <a:ext uri="{FF2B5EF4-FFF2-40B4-BE49-F238E27FC236}">
-                <a16:creationId xmlns:a16="http://schemas.microsoft.com/office/drawing/2014/main" id="{27B290C3-C997-49FB-9632-BCC9F7CC38CA}"/>
-              </a:ext>
-            </a:extLst>
-          </p:cNvPr>
-          <p:cNvSpPr txBox="1"/>
-          <p:nvPr/>
-        </p:nvSpPr>
-        <p:spPr>
-          <a:xfrm>
-            <a:off x="5176755" y="2676525"/>
-            <a:ext cx="7253207" cy="3139321"/>
-          </a:xfrm>
-          <a:prstGeom prst="rect">
-            <a:avLst/>
-          </a:prstGeom>
-          <a:noFill/>
-        </p:spPr>
-        <p:txBody>
-          <a:bodyPr wrap="square" rtlCol="0">
-            <a:spAutoFit/>
-          </a:bodyPr>
-          <a:lstStyle/>
-          <a:p>
-            <a:r>
-              <a:rPr lang="en-US" sz="3600" dirty="0">
-                <a:solidFill>
-                  <a:schemeClr val="bg1"/>
-                </a:solidFill>
-              </a:rPr>
-              <a:t>Final Conclusions from Capstone</a:t>
-            </a:r>
-          </a:p>
-          <a:p>
-            <a:r>
-              <a:rPr lang="en-US" sz="3600" dirty="0">
-                <a:solidFill>
-                  <a:schemeClr val="bg1"/>
-                </a:solidFill>
-              </a:rPr>
-              <a:t>BLAH BLAH BLAH BLAH</a:t>
-            </a:r>
-          </a:p>
-          <a:p>
-            <a:r>
-              <a:rPr lang="en-US" sz="3600" dirty="0">
-                <a:solidFill>
-                  <a:schemeClr val="bg1"/>
-                </a:solidFill>
-              </a:rPr>
-              <a:t>BLAH BLAH BLAH BLAH</a:t>
-            </a:r>
-          </a:p>
-          <a:p>
-            <a:r>
-              <a:rPr lang="en-US" sz="3600" dirty="0">
-                <a:solidFill>
-                  <a:schemeClr val="bg1"/>
-                </a:solidFill>
-              </a:rPr>
-              <a:t>BLAH BLAH</a:t>
-            </a:r>
-          </a:p>
-          <a:p>
-            <a:endParaRPr lang="en-US" sz="3600" dirty="0">
-              <a:solidFill>
-                <a:schemeClr val="bg1"/>
-              </a:solidFill>
-            </a:endParaRPr>
-          </a:p>
-          <a:p>
-            <a:pPr marL="342900" indent="-342900">
-              <a:buAutoNum type="arabicPeriod"/>
-            </a:pPr>
-            <a:endParaRPr lang="en-US" dirty="0"/>
-          </a:p>
-        </p:txBody>
-      </p:sp>
-    </p:spTree>
-    <p:extLst>
-      <p:ext uri="{BB962C8B-B14F-4D97-AF65-F5344CB8AC3E}">
-        <p14:creationId xmlns:p14="http://schemas.microsoft.com/office/powerpoint/2010/main" val="2979858008"/>
-      </p:ext>
-    </p:extLst>
-  </p:cSld>
-  <p:clrMapOvr>
-    <a:masterClrMapping/>
-  </p:clrMapOvr>
-</p:sld>
-</file>
-
-<file path=ppt/slides/slide26.xml><?xml version="1.0" encoding="utf-8"?>
 <p:sld xmlns:a="http://schemas.openxmlformats.org/drawingml/2006/main" xmlns:r="http://schemas.openxmlformats.org/officeDocument/2006/relationships" xmlns:p="http://schemas.openxmlformats.org/presentationml/2006/main">
   <p:cSld>
     <p:spTree>
@@ -13504,7 +13195,7 @@
 </p:sld>
 </file>
 
-<file path=ppt/slides/slide27.xml><?xml version="1.0" encoding="utf-8"?>
+<file path=ppt/slides/slide26.xml><?xml version="1.0" encoding="utf-8"?>
 <p:sld xmlns:a="http://schemas.openxmlformats.org/drawingml/2006/main" xmlns:r="http://schemas.openxmlformats.org/officeDocument/2006/relationships" xmlns:p="http://schemas.openxmlformats.org/presentationml/2006/main">
   <p:cSld>
     <p:bg>
@@ -13537,7 +13228,7 @@
                 <a16:creationId xmlns:a16="http://schemas.microsoft.com/office/drawing/2014/main" id="{6753252F-4873-4F63-801D-CC719279A7D5}"/>
               </a:ext>
               <a:ext uri="{C183D7F6-B498-43B3-948B-1728B52AA6E4}">
-                <adec:decorative xmlns:adec="http://schemas.microsoft.com/office/drawing/2017/decorative" xmlns="" val="1"/>
+                <adec:decorative xmlns="" xmlns:adec="http://schemas.microsoft.com/office/drawing/2017/decorative" val="1"/>
               </a:ext>
             </a:extLst>
           </p:cNvPr>
@@ -13600,7 +13291,7 @@
                 <a16:creationId xmlns:a16="http://schemas.microsoft.com/office/drawing/2014/main" id="{047C8CCB-F95D-4249-92DD-651249D3535A}"/>
               </a:ext>
               <a:ext uri="{C183D7F6-B498-43B3-948B-1728B52AA6E4}">
-                <adec:decorative xmlns:adec="http://schemas.microsoft.com/office/drawing/2017/decorative" xmlns="" val="1"/>
+                <adec:decorative xmlns="" xmlns:adec="http://schemas.microsoft.com/office/drawing/2017/decorative" val="1"/>
               </a:ext>
             </a:extLst>
           </p:cNvPr>
@@ -13770,7 +13461,7 @@
 </p:sld>
 </file>
 
-<file path=ppt/slides/slide28.xml><?xml version="1.0" encoding="utf-8"?>
+<file path=ppt/slides/slide27.xml><?xml version="1.0" encoding="utf-8"?>
 <p:sld xmlns:a="http://schemas.openxmlformats.org/drawingml/2006/main" xmlns:r="http://schemas.openxmlformats.org/officeDocument/2006/relationships" xmlns:p="http://schemas.openxmlformats.org/presentationml/2006/main" show="0">
   <p:cSld>
     <p:spTree>
@@ -14024,7 +13715,7 @@
                 <a16:creationId xmlns:a16="http://schemas.microsoft.com/office/drawing/2014/main" id="{B547373F-AF2E-4907-B442-9F902B387FD0}"/>
               </a:ext>
               <a:ext uri="{C183D7F6-B498-43B3-948B-1728B52AA6E4}">
-                <adec:decorative xmlns="" xmlns:adec="http://schemas.microsoft.com/office/drawing/2017/decorative" val="1"/>
+                <adec:decorative xmlns:adec="http://schemas.microsoft.com/office/drawing/2017/decorative" xmlns="" val="1"/>
               </a:ext>
             </a:extLst>
           </p:cNvPr>
@@ -14483,7 +14174,7 @@
                 <a16:creationId xmlns:a16="http://schemas.microsoft.com/office/drawing/2014/main" id="{CF62D2A7-8207-488C-9F46-316BA81A16C8}"/>
               </a:ext>
               <a:ext uri="{C183D7F6-B498-43B3-948B-1728B52AA6E4}">
-                <adec:decorative xmlns="" xmlns:adec="http://schemas.microsoft.com/office/drawing/2017/decorative" val="1"/>
+                <adec:decorative xmlns:adec="http://schemas.microsoft.com/office/drawing/2017/decorative" xmlns="" val="1"/>
               </a:ext>
             </a:extLst>
           </p:cNvPr>
@@ -14650,7 +14341,7 @@
                 <a16:creationId xmlns:a16="http://schemas.microsoft.com/office/drawing/2014/main" id="{52AC6D7F-F068-4E11-BB06-F601D89BB980}"/>
               </a:ext>
               <a:ext uri="{C183D7F6-B498-43B3-948B-1728B52AA6E4}">
-                <adec:decorative xmlns="" xmlns:adec="http://schemas.microsoft.com/office/drawing/2017/decorative" val="1"/>
+                <adec:decorative xmlns:adec="http://schemas.microsoft.com/office/drawing/2017/decorative" xmlns="" val="1"/>
               </a:ext>
             </a:extLst>
           </p:cNvPr>
@@ -14944,7 +14635,7 @@
                 <a16:creationId xmlns:a16="http://schemas.microsoft.com/office/drawing/2014/main" id="{E0D60ECE-8986-45DC-B7FE-EC7699B466B8}"/>
               </a:ext>
               <a:ext uri="{C183D7F6-B498-43B3-948B-1728B52AA6E4}">
-                <adec:decorative xmlns="" xmlns:adec="http://schemas.microsoft.com/office/drawing/2017/decorative" val="1"/>
+                <adec:decorative xmlns:adec="http://schemas.microsoft.com/office/drawing/2017/decorative" xmlns="" val="1"/>
               </a:ext>
             </a:extLst>
           </p:cNvPr>
@@ -15113,7 +14804,7 @@
                 <a16:creationId xmlns:a16="http://schemas.microsoft.com/office/drawing/2014/main" id="{96964194-5878-40D2-8EC0-DDC58387FA56}"/>
               </a:ext>
               <a:ext uri="{C183D7F6-B498-43B3-948B-1728B52AA6E4}">
-                <adec:decorative xmlns="" xmlns:adec="http://schemas.microsoft.com/office/drawing/2017/decorative" val="1"/>
+                <adec:decorative xmlns:adec="http://schemas.microsoft.com/office/drawing/2017/decorative" xmlns="" val="1"/>
               </a:ext>
             </a:extLst>
           </p:cNvPr>
@@ -15569,7 +15260,7 @@
                 <a16:creationId xmlns:a16="http://schemas.microsoft.com/office/drawing/2014/main" id="{6753252F-4873-4F63-801D-CC719279A7D5}"/>
               </a:ext>
               <a:ext uri="{C183D7F6-B498-43B3-948B-1728B52AA6E4}">
-                <adec:decorative xmlns:adec="http://schemas.microsoft.com/office/drawing/2017/decorative" xmlns="" val="1"/>
+                <adec:decorative xmlns="" xmlns:adec="http://schemas.microsoft.com/office/drawing/2017/decorative" val="1"/>
               </a:ext>
             </a:extLst>
           </p:cNvPr>
@@ -15632,7 +15323,7 @@
                 <a16:creationId xmlns:a16="http://schemas.microsoft.com/office/drawing/2014/main" id="{047C8CCB-F95D-4249-92DD-651249D3535A}"/>
               </a:ext>
               <a:ext uri="{C183D7F6-B498-43B3-948B-1728B52AA6E4}">
-                <adec:decorative xmlns:adec="http://schemas.microsoft.com/office/drawing/2017/decorative" xmlns="" val="1"/>
+                <adec:decorative xmlns="" xmlns:adec="http://schemas.microsoft.com/office/drawing/2017/decorative" val="1"/>
               </a:ext>
             </a:extLst>
           </p:cNvPr>
@@ -15836,7 +15527,7 @@
                 <a16:creationId xmlns:a16="http://schemas.microsoft.com/office/drawing/2014/main" id="{6753252F-4873-4F63-801D-CC719279A7D5}"/>
               </a:ext>
               <a:ext uri="{C183D7F6-B498-43B3-948B-1728B52AA6E4}">
-                <adec:decorative xmlns:adec="http://schemas.microsoft.com/office/drawing/2017/decorative" xmlns="" val="1"/>
+                <adec:decorative xmlns="" xmlns:adec="http://schemas.microsoft.com/office/drawing/2017/decorative" val="1"/>
               </a:ext>
             </a:extLst>
           </p:cNvPr>
@@ -15899,7 +15590,7 @@
                 <a16:creationId xmlns:a16="http://schemas.microsoft.com/office/drawing/2014/main" id="{047C8CCB-F95D-4249-92DD-651249D3535A}"/>
               </a:ext>
               <a:ext uri="{C183D7F6-B498-43B3-948B-1728B52AA6E4}">
-                <adec:decorative xmlns:adec="http://schemas.microsoft.com/office/drawing/2017/decorative" xmlns="" val="1"/>
+                <adec:decorative xmlns="" xmlns:adec="http://schemas.microsoft.com/office/drawing/2017/decorative" val="1"/>
               </a:ext>
             </a:extLst>
           </p:cNvPr>
@@ -16102,7 +15793,7 @@
                 <a16:creationId xmlns:a16="http://schemas.microsoft.com/office/drawing/2014/main" id="{823AC064-BC96-4F32-8AE1-B2FD38754823}"/>
               </a:ext>
               <a:ext uri="{C183D7F6-B498-43B3-948B-1728B52AA6E4}">
-                <adec:decorative xmlns:adec="http://schemas.microsoft.com/office/drawing/2017/decorative" xmlns="" val="1"/>
+                <adec:decorative xmlns="" xmlns:adec="http://schemas.microsoft.com/office/drawing/2017/decorative" val="1"/>
               </a:ext>
             </a:extLst>
           </p:cNvPr>
@@ -16219,7 +15910,7 @@
                 <a16:creationId xmlns:a16="http://schemas.microsoft.com/office/drawing/2014/main" id="{7E7C77BC-7138-40B1-A15B-20F57A494629}"/>
               </a:ext>
               <a:ext uri="{C183D7F6-B498-43B3-948B-1728B52AA6E4}">
-                <adec:decorative xmlns:adec="http://schemas.microsoft.com/office/drawing/2017/decorative" xmlns="" val="1"/>
+                <adec:decorative xmlns="" xmlns:adec="http://schemas.microsoft.com/office/drawing/2017/decorative" val="1"/>
               </a:ext>
             </a:extLst>
           </p:cNvPr>
@@ -16307,7 +15998,7 @@
                 <a16:creationId xmlns:a16="http://schemas.microsoft.com/office/drawing/2014/main" id="{DB146403-F3D6-484B-B2ED-97F9565D0370}"/>
               </a:ext>
               <a:ext uri="{C183D7F6-B498-43B3-948B-1728B52AA6E4}">
-                <adec:decorative xmlns:adec="http://schemas.microsoft.com/office/drawing/2017/decorative" xmlns="" val="1"/>
+                <adec:decorative xmlns="" xmlns:adec="http://schemas.microsoft.com/office/drawing/2017/decorative" val="1"/>
               </a:ext>
             </a:extLst>
           </p:cNvPr>
@@ -16433,7 +16124,7 @@
                 <a16:creationId xmlns:a16="http://schemas.microsoft.com/office/drawing/2014/main" id="{DB146403-F3D6-484B-B2ED-97F9565D0370}"/>
               </a:ext>
               <a:ext uri="{C183D7F6-B498-43B3-948B-1728B52AA6E4}">
-                <adec:decorative xmlns="" xmlns:adec="http://schemas.microsoft.com/office/drawing/2017/decorative" val="1"/>
+                <adec:decorative xmlns:adec="http://schemas.microsoft.com/office/drawing/2017/decorative" xmlns="" val="1"/>
               </a:ext>
             </a:extLst>
           </p:cNvPr>
@@ -16485,7 +16176,7 @@
                 <a16:creationId xmlns:a16="http://schemas.microsoft.com/office/drawing/2014/main" id="{823AC064-BC96-4F32-8AE1-B2FD38754823}"/>
               </a:ext>
               <a:ext uri="{C183D7F6-B498-43B3-948B-1728B52AA6E4}">
-                <adec:decorative xmlns="" xmlns:adec="http://schemas.microsoft.com/office/drawing/2017/decorative" val="1"/>
+                <adec:decorative xmlns:adec="http://schemas.microsoft.com/office/drawing/2017/decorative" xmlns="" val="1"/>
               </a:ext>
             </a:extLst>
           </p:cNvPr>
@@ -16674,7 +16365,7 @@
                 <a16:creationId xmlns:a16="http://schemas.microsoft.com/office/drawing/2014/main" id="{7E7C77BC-7138-40B1-A15B-20F57A494629}"/>
               </a:ext>
               <a:ext uri="{C183D7F6-B498-43B3-948B-1728B52AA6E4}">
-                <adec:decorative xmlns="" xmlns:adec="http://schemas.microsoft.com/office/drawing/2017/decorative" val="1"/>
+                <adec:decorative xmlns:adec="http://schemas.microsoft.com/office/drawing/2017/decorative" xmlns="" val="1"/>
               </a:ext>
             </a:extLst>
           </p:cNvPr>

</xml_diff>

<commit_message>
Updated PPT Notes; Added HTML version of Notebooks
</commit_message>
<xml_diff>
--- a/Presentation/ScrumLords_Capstone.pptx
+++ b/Presentation/ScrumLords_Capstone.pptx
@@ -227,7 +227,7 @@
           <a:p>
             <a:fld id="{0AD31C94-D579-422E-8298-49FD8293048C}" type="datetimeFigureOut">
               <a:rPr lang="en-US" smtClean="0"/>
-              <a:t>8/15/2018</a:t>
+              <a:t>8/16/2018</a:t>
             </a:fld>
             <a:endParaRPr lang="en-US"/>
           </a:p>
@@ -2223,7 +2223,58 @@
           <a:p>
             <a:r>
               <a:rPr lang="en-US" dirty="0"/>
-              <a:t>Looking at a visual of the models they appear to be very similar </a:t>
+              <a:t>Used Supervised Learning (uses training dataset to make </a:t>
+            </a:r>
+            <a:r>
+              <a:rPr lang="en-US"/>
+              <a:t>predictions), </a:t>
+            </a:r>
+            <a:r>
+              <a:rPr lang="en-US" dirty="0"/>
+              <a:t>in </a:t>
+            </a:r>
+            <a:r>
+              <a:rPr lang="en-US"/>
+              <a:t>particular Regression. </a:t>
+            </a:r>
+            <a:r>
+              <a:rPr lang="en-US" dirty="0"/>
+              <a:t>Uses dataset to build a model that can make predictions of the response values for a new dataset).</a:t>
+            </a:r>
+          </a:p>
+          <a:p>
+            <a:endParaRPr lang="en-US" dirty="0"/>
+          </a:p>
+          <a:p>
+            <a:r>
+              <a:rPr lang="en-US" dirty="0"/>
+              <a:t>Looking at a visual of the models they appear to be very similar.</a:t>
+            </a:r>
+          </a:p>
+          <a:p>
+            <a:r>
+              <a:rPr lang="en-US" dirty="0"/>
+              <a:t>Linear: linear relationship between 2 continuous variables; Estimates the relationship between the Target (dependent variable) and Predictor (</a:t>
+            </a:r>
+            <a:r>
+              <a:rPr lang="en-US" dirty="0" err="1"/>
+              <a:t>ind</a:t>
+            </a:r>
+            <a:r>
+              <a:rPr lang="en-US" dirty="0"/>
+              <a:t> variable); Speed over Accuracy</a:t>
+            </a:r>
+          </a:p>
+          <a:p>
+            <a:r>
+              <a:rPr lang="en-US" dirty="0"/>
+              <a:t>Decision Tree: Speed over Accuracy</a:t>
+            </a:r>
+          </a:p>
+          <a:p>
+            <a:r>
+              <a:rPr lang="en-US" dirty="0"/>
+              <a:t>Random Forest: Accuracy</a:t>
             </a:r>
           </a:p>
         </p:txBody>
@@ -3773,7 +3824,7 @@
           <a:p>
             <a:fld id="{38A050F6-C4A4-4D93-BB5B-76D71472723B}" type="datetimeFigureOut">
               <a:rPr lang="en-US" smtClean="0"/>
-              <a:t>8/15/2018</a:t>
+              <a:t>8/16/2018</a:t>
             </a:fld>
             <a:endParaRPr lang="en-US"/>
           </a:p>
@@ -3971,7 +4022,7 @@
           <a:p>
             <a:fld id="{38A050F6-C4A4-4D93-BB5B-76D71472723B}" type="datetimeFigureOut">
               <a:rPr lang="en-US" smtClean="0"/>
-              <a:t>8/15/2018</a:t>
+              <a:t>8/16/2018</a:t>
             </a:fld>
             <a:endParaRPr lang="en-US"/>
           </a:p>
@@ -4179,7 +4230,7 @@
           <a:p>
             <a:fld id="{38A050F6-C4A4-4D93-BB5B-76D71472723B}" type="datetimeFigureOut">
               <a:rPr lang="en-US" smtClean="0"/>
-              <a:t>8/15/2018</a:t>
+              <a:t>8/16/2018</a:t>
             </a:fld>
             <a:endParaRPr lang="en-US"/>
           </a:p>
@@ -4377,7 +4428,7 @@
           <a:p>
             <a:fld id="{38A050F6-C4A4-4D93-BB5B-76D71472723B}" type="datetimeFigureOut">
               <a:rPr lang="en-US" smtClean="0"/>
-              <a:t>8/15/2018</a:t>
+              <a:t>8/16/2018</a:t>
             </a:fld>
             <a:endParaRPr lang="en-US"/>
           </a:p>
@@ -4652,7 +4703,7 @@
           <a:p>
             <a:fld id="{38A050F6-C4A4-4D93-BB5B-76D71472723B}" type="datetimeFigureOut">
               <a:rPr lang="en-US" smtClean="0"/>
-              <a:t>8/15/2018</a:t>
+              <a:t>8/16/2018</a:t>
             </a:fld>
             <a:endParaRPr lang="en-US"/>
           </a:p>
@@ -4917,7 +4968,7 @@
           <a:p>
             <a:fld id="{38A050F6-C4A4-4D93-BB5B-76D71472723B}" type="datetimeFigureOut">
               <a:rPr lang="en-US" smtClean="0"/>
-              <a:t>8/15/2018</a:t>
+              <a:t>8/16/2018</a:t>
             </a:fld>
             <a:endParaRPr lang="en-US"/>
           </a:p>
@@ -5329,7 +5380,7 @@
           <a:p>
             <a:fld id="{38A050F6-C4A4-4D93-BB5B-76D71472723B}" type="datetimeFigureOut">
               <a:rPr lang="en-US" smtClean="0"/>
-              <a:t>8/15/2018</a:t>
+              <a:t>8/16/2018</a:t>
             </a:fld>
             <a:endParaRPr lang="en-US"/>
           </a:p>
@@ -5470,7 +5521,7 @@
           <a:p>
             <a:fld id="{38A050F6-C4A4-4D93-BB5B-76D71472723B}" type="datetimeFigureOut">
               <a:rPr lang="en-US" smtClean="0"/>
-              <a:t>8/15/2018</a:t>
+              <a:t>8/16/2018</a:t>
             </a:fld>
             <a:endParaRPr lang="en-US"/>
           </a:p>
@@ -5583,7 +5634,7 @@
           <a:p>
             <a:fld id="{38A050F6-C4A4-4D93-BB5B-76D71472723B}" type="datetimeFigureOut">
               <a:rPr lang="en-US" smtClean="0"/>
-              <a:t>8/15/2018</a:t>
+              <a:t>8/16/2018</a:t>
             </a:fld>
             <a:endParaRPr lang="en-US"/>
           </a:p>
@@ -5894,7 +5945,7 @@
           <a:p>
             <a:fld id="{38A050F6-C4A4-4D93-BB5B-76D71472723B}" type="datetimeFigureOut">
               <a:rPr lang="en-US" smtClean="0"/>
-              <a:t>8/15/2018</a:t>
+              <a:t>8/16/2018</a:t>
             </a:fld>
             <a:endParaRPr lang="en-US"/>
           </a:p>
@@ -6182,7 +6233,7 @@
           <a:p>
             <a:fld id="{38A050F6-C4A4-4D93-BB5B-76D71472723B}" type="datetimeFigureOut">
               <a:rPr lang="en-US" smtClean="0"/>
-              <a:t>8/15/2018</a:t>
+              <a:t>8/16/2018</a:t>
             </a:fld>
             <a:endParaRPr lang="en-US"/>
           </a:p>
@@ -6423,7 +6474,7 @@
           <a:p>
             <a:fld id="{38A050F6-C4A4-4D93-BB5B-76D71472723B}" type="datetimeFigureOut">
               <a:rPr lang="en-US" smtClean="0"/>
-              <a:t>8/15/2018</a:t>
+              <a:t>8/16/2018</a:t>
             </a:fld>
             <a:endParaRPr lang="en-US"/>
           </a:p>
@@ -6859,7 +6910,7 @@
                 <a16:creationId xmlns:a16="http://schemas.microsoft.com/office/drawing/2014/main" id="{482BD70C-C4A0-46C4-9518-A731098B419A}"/>
               </a:ext>
               <a:ext uri="{C183D7F6-B498-43B3-948B-1728B52AA6E4}">
-                <adec:decorative xmlns="" xmlns:adec="http://schemas.microsoft.com/office/drawing/2017/decorative" val="1"/>
+                <adec:decorative xmlns:adec="http://schemas.microsoft.com/office/drawing/2017/decorative" xmlns="" val="1"/>
               </a:ext>
             </a:extLst>
           </p:cNvPr>
@@ -7092,7 +7143,7 @@
                 <a16:creationId xmlns:a16="http://schemas.microsoft.com/office/drawing/2014/main" id="{39B74A45-BDDD-4892-B8C0-B290C0944FCB}"/>
               </a:ext>
               <a:ext uri="{C183D7F6-B498-43B3-948B-1728B52AA6E4}">
-                <adec:decorative xmlns="" xmlns:adec="http://schemas.microsoft.com/office/drawing/2017/decorative" val="1"/>
+                <adec:decorative xmlns:adec="http://schemas.microsoft.com/office/drawing/2017/decorative" xmlns="" val="1"/>
               </a:ext>
             </a:extLst>
           </p:cNvPr>
@@ -7287,7 +7338,7 @@
                 <a16:creationId xmlns:a16="http://schemas.microsoft.com/office/drawing/2014/main" id="{C516C73E-9465-4C9E-9B86-9E58FB326B6B}"/>
               </a:ext>
               <a:ext uri="{C183D7F6-B498-43B3-948B-1728B52AA6E4}">
-                <adec:decorative xmlns="" xmlns:adec="http://schemas.microsoft.com/office/drawing/2017/decorative" val="1"/>
+                <adec:decorative xmlns:adec="http://schemas.microsoft.com/office/drawing/2017/decorative" xmlns="" val="1"/>
               </a:ext>
             </a:extLst>
           </p:cNvPr>
@@ -7555,7 +7606,7 @@
                 <a16:creationId xmlns:a16="http://schemas.microsoft.com/office/drawing/2014/main" id="{6753252F-4873-4F63-801D-CC719279A7D5}"/>
               </a:ext>
               <a:ext uri="{C183D7F6-B498-43B3-948B-1728B52AA6E4}">
-                <adec:decorative xmlns:adec="http://schemas.microsoft.com/office/drawing/2017/decorative" xmlns="" val="1"/>
+                <adec:decorative xmlns="" xmlns:adec="http://schemas.microsoft.com/office/drawing/2017/decorative" val="1"/>
               </a:ext>
             </a:extLst>
           </p:cNvPr>
@@ -7618,7 +7669,7 @@
                 <a16:creationId xmlns:a16="http://schemas.microsoft.com/office/drawing/2014/main" id="{047C8CCB-F95D-4249-92DD-651249D3535A}"/>
               </a:ext>
               <a:ext uri="{C183D7F6-B498-43B3-948B-1728B52AA6E4}">
-                <adec:decorative xmlns:adec="http://schemas.microsoft.com/office/drawing/2017/decorative" xmlns="" val="1"/>
+                <adec:decorative xmlns="" xmlns:adec="http://schemas.microsoft.com/office/drawing/2017/decorative" val="1"/>
               </a:ext>
             </a:extLst>
           </p:cNvPr>
@@ -8015,7 +8066,7 @@
                 <a16:creationId xmlns:a16="http://schemas.microsoft.com/office/drawing/2014/main" id="{081FF5F3-D973-4367-9851-C04740586B84}"/>
               </a:ext>
               <a:ext uri="{C183D7F6-B498-43B3-948B-1728B52AA6E4}">
-                <adec:decorative xmlns:adec="http://schemas.microsoft.com/office/drawing/2017/decorative" xmlns="" val="1"/>
+                <adec:decorative xmlns="" xmlns:adec="http://schemas.microsoft.com/office/drawing/2017/decorative" val="1"/>
               </a:ext>
             </a:extLst>
           </p:cNvPr>
@@ -8197,7 +8248,7 @@
                 <a16:creationId xmlns:a16="http://schemas.microsoft.com/office/drawing/2014/main" id="{5F9CFCE6-877F-4858-B8BD-2C52CA8AFBC4}"/>
               </a:ext>
               <a:ext uri="{C183D7F6-B498-43B3-948B-1728B52AA6E4}">
-                <adec:decorative xmlns:adec="http://schemas.microsoft.com/office/drawing/2017/decorative" xmlns="" val="1"/>
+                <adec:decorative xmlns="" xmlns:adec="http://schemas.microsoft.com/office/drawing/2017/decorative" val="1"/>
               </a:ext>
             </a:extLst>
           </p:cNvPr>
@@ -8260,7 +8311,7 @@
                 <a16:creationId xmlns:a16="http://schemas.microsoft.com/office/drawing/2014/main" id="{8213F8A0-12AE-4514-8372-0DD766EC28EE}"/>
               </a:ext>
               <a:ext uri="{C183D7F6-B498-43B3-948B-1728B52AA6E4}">
-                <adec:decorative xmlns:adec="http://schemas.microsoft.com/office/drawing/2017/decorative" xmlns="" val="1"/>
+                <adec:decorative xmlns="" xmlns:adec="http://schemas.microsoft.com/office/drawing/2017/decorative" val="1"/>
               </a:ext>
             </a:extLst>
           </p:cNvPr>
@@ -8359,7 +8410,7 @@
                 <a16:creationId xmlns:a16="http://schemas.microsoft.com/office/drawing/2014/main" id="{9EFF17D4-9A8C-4CE5-B096-D8CCD4400437}"/>
               </a:ext>
               <a:ext uri="{C183D7F6-B498-43B3-948B-1728B52AA6E4}">
-                <adec:decorative xmlns:adec="http://schemas.microsoft.com/office/drawing/2017/decorative" xmlns="" val="1"/>
+                <adec:decorative xmlns="" xmlns:adec="http://schemas.microsoft.com/office/drawing/2017/decorative" val="1"/>
               </a:ext>
             </a:extLst>
           </p:cNvPr>
@@ -8568,7 +8619,7 @@
                 <a16:creationId xmlns:a16="http://schemas.microsoft.com/office/drawing/2014/main" id="{B1ED02B1-1BC5-458F-9994-627281CFE7C4}"/>
               </a:ext>
               <a:ext uri="{C183D7F6-B498-43B3-948B-1728B52AA6E4}">
-                <adec:decorative xmlns="" xmlns:adec="http://schemas.microsoft.com/office/drawing/2017/decorative" val="1"/>
+                <adec:decorative xmlns:adec="http://schemas.microsoft.com/office/drawing/2017/decorative" xmlns="" val="1"/>
               </a:ext>
             </a:extLst>
           </p:cNvPr>
@@ -8770,7 +8821,7 @@
                 <a16:creationId xmlns:a16="http://schemas.microsoft.com/office/drawing/2014/main" id="{72257994-BD97-4691-8B89-198A6D2BABDC}"/>
               </a:ext>
               <a:ext uri="{C183D7F6-B498-43B3-948B-1728B52AA6E4}">
-                <adec:decorative xmlns:adec="http://schemas.microsoft.com/office/drawing/2017/decorative" xmlns="" val="1"/>
+                <adec:decorative xmlns="" xmlns:adec="http://schemas.microsoft.com/office/drawing/2017/decorative" val="1"/>
               </a:ext>
             </a:extLst>
           </p:cNvPr>
@@ -9020,7 +9071,7 @@
                 <a16:creationId xmlns:a16="http://schemas.microsoft.com/office/drawing/2014/main" id="{AB45A142-4255-493C-8284-5D566C121B10}"/>
               </a:ext>
               <a:ext uri="{C183D7F6-B498-43B3-948B-1728B52AA6E4}">
-                <adec:decorative xmlns:adec="http://schemas.microsoft.com/office/drawing/2017/decorative" xmlns="" val="1"/>
+                <adec:decorative xmlns="" xmlns:adec="http://schemas.microsoft.com/office/drawing/2017/decorative" val="1"/>
               </a:ext>
             </a:extLst>
           </p:cNvPr>
@@ -9160,7 +9211,7 @@
                 <a16:creationId xmlns:a16="http://schemas.microsoft.com/office/drawing/2014/main" id="{38FB9660-F42F-4313-BBC4-47C007FE484C}"/>
               </a:ext>
               <a:ext uri="{C183D7F6-B498-43B3-948B-1728B52AA6E4}">
-                <adec:decorative xmlns:adec="http://schemas.microsoft.com/office/drawing/2017/decorative" xmlns="" val="1"/>
+                <adec:decorative xmlns="" xmlns:adec="http://schemas.microsoft.com/office/drawing/2017/decorative" val="1"/>
               </a:ext>
             </a:extLst>
           </p:cNvPr>
@@ -9421,7 +9472,7 @@
                 <a16:creationId xmlns:a16="http://schemas.microsoft.com/office/drawing/2014/main" id="{AB45A142-4255-493C-8284-5D566C121B10}"/>
               </a:ext>
               <a:ext uri="{C183D7F6-B498-43B3-948B-1728B52AA6E4}">
-                <adec:decorative xmlns:adec="http://schemas.microsoft.com/office/drawing/2017/decorative" xmlns="" val="1"/>
+                <adec:decorative xmlns="" xmlns:adec="http://schemas.microsoft.com/office/drawing/2017/decorative" val="1"/>
               </a:ext>
             </a:extLst>
           </p:cNvPr>
@@ -9552,7 +9603,7 @@
                 <a16:creationId xmlns:a16="http://schemas.microsoft.com/office/drawing/2014/main" id="{38FB9660-F42F-4313-BBC4-47C007FE484C}"/>
               </a:ext>
               <a:ext uri="{C183D7F6-B498-43B3-948B-1728B52AA6E4}">
-                <adec:decorative xmlns:adec="http://schemas.microsoft.com/office/drawing/2017/decorative" xmlns="" val="1"/>
+                <adec:decorative xmlns="" xmlns:adec="http://schemas.microsoft.com/office/drawing/2017/decorative" val="1"/>
               </a:ext>
             </a:extLst>
           </p:cNvPr>
@@ -10572,7 +10623,7 @@
                 <a16:creationId xmlns:a16="http://schemas.microsoft.com/office/drawing/2014/main" id="{A74B3BB9-7320-4C7D-876F-931A7DC2C478}"/>
               </a:ext>
               <a:ext uri="{C183D7F6-B498-43B3-948B-1728B52AA6E4}">
-                <adec:decorative xmlns:adec="http://schemas.microsoft.com/office/drawing/2017/decorative" xmlns="" val="1"/>
+                <adec:decorative xmlns="" xmlns:adec="http://schemas.microsoft.com/office/drawing/2017/decorative" val="1"/>
               </a:ext>
             </a:extLst>
           </p:cNvPr>
@@ -10718,7 +10769,7 @@
                 <a16:creationId xmlns:a16="http://schemas.microsoft.com/office/drawing/2014/main" id="{6753252F-4873-4F63-801D-CC719279A7D5}"/>
               </a:ext>
               <a:ext uri="{C183D7F6-B498-43B3-948B-1728B52AA6E4}">
-                <adec:decorative xmlns="" xmlns:adec="http://schemas.microsoft.com/office/drawing/2017/decorative" val="1"/>
+                <adec:decorative xmlns:adec="http://schemas.microsoft.com/office/drawing/2017/decorative" xmlns="" val="1"/>
               </a:ext>
             </a:extLst>
           </p:cNvPr>
@@ -10781,7 +10832,7 @@
                 <a16:creationId xmlns:a16="http://schemas.microsoft.com/office/drawing/2014/main" id="{047C8CCB-F95D-4249-92DD-651249D3535A}"/>
               </a:ext>
               <a:ext uri="{C183D7F6-B498-43B3-948B-1728B52AA6E4}">
-                <adec:decorative xmlns="" xmlns:adec="http://schemas.microsoft.com/office/drawing/2017/decorative" val="1"/>
+                <adec:decorative xmlns:adec="http://schemas.microsoft.com/office/drawing/2017/decorative" xmlns="" val="1"/>
               </a:ext>
             </a:extLst>
           </p:cNvPr>
@@ -10984,7 +11035,7 @@
                 <a16:creationId xmlns:a16="http://schemas.microsoft.com/office/drawing/2014/main" id="{4038CB10-1F5C-4D54-9DF7-12586DE5B007}"/>
               </a:ext>
               <a:ext uri="{C183D7F6-B498-43B3-948B-1728B52AA6E4}">
-                <adec:decorative xmlns:adec="http://schemas.microsoft.com/office/drawing/2017/decorative" xmlns="" val="1"/>
+                <adec:decorative xmlns="" xmlns:adec="http://schemas.microsoft.com/office/drawing/2017/decorative" val="1"/>
               </a:ext>
             </a:extLst>
           </p:cNvPr>
@@ -11165,7 +11216,7 @@
                 <a16:creationId xmlns:a16="http://schemas.microsoft.com/office/drawing/2014/main" id="{73ED6512-6858-4552-B699-9A97FE9A4EA2}"/>
               </a:ext>
               <a:ext uri="{C183D7F6-B498-43B3-948B-1728B52AA6E4}">
-                <adec:decorative xmlns:adec="http://schemas.microsoft.com/office/drawing/2017/decorative" xmlns="" val="1"/>
+                <adec:decorative xmlns="" xmlns:adec="http://schemas.microsoft.com/office/drawing/2017/decorative" val="1"/>
               </a:ext>
             </a:extLst>
           </p:cNvPr>
@@ -11537,7 +11588,7 @@
                 <a16:creationId xmlns:a16="http://schemas.microsoft.com/office/drawing/2014/main" id="{081FF5F3-D973-4367-9851-C04740586B84}"/>
               </a:ext>
               <a:ext uri="{C183D7F6-B498-43B3-948B-1728B52AA6E4}">
-                <adec:decorative xmlns:adec="http://schemas.microsoft.com/office/drawing/2017/decorative" xmlns="" val="1"/>
+                <adec:decorative xmlns="" xmlns:adec="http://schemas.microsoft.com/office/drawing/2017/decorative" val="1"/>
               </a:ext>
             </a:extLst>
           </p:cNvPr>
@@ -11755,7 +11806,7 @@
                 <a16:creationId xmlns:a16="http://schemas.microsoft.com/office/drawing/2014/main" id="{799448F2-0E5B-42DA-B2D1-11A14E947BD4}"/>
               </a:ext>
               <a:ext uri="{C183D7F6-B498-43B3-948B-1728B52AA6E4}">
-                <adec:decorative xmlns:adec="http://schemas.microsoft.com/office/drawing/2017/decorative" xmlns="" val="1"/>
+                <adec:decorative xmlns="" xmlns:adec="http://schemas.microsoft.com/office/drawing/2017/decorative" val="1"/>
               </a:ext>
             </a:extLst>
           </p:cNvPr>
@@ -11821,7 +11872,7 @@
                 <a16:creationId xmlns:a16="http://schemas.microsoft.com/office/drawing/2014/main" id="{4E8A7552-20E1-4F34-ADAB-C1DB6634D47E}"/>
               </a:ext>
               <a:ext uri="{C183D7F6-B498-43B3-948B-1728B52AA6E4}">
-                <adec:decorative xmlns:adec="http://schemas.microsoft.com/office/drawing/2017/decorative" xmlns="" val="1"/>
+                <adec:decorative xmlns="" xmlns:adec="http://schemas.microsoft.com/office/drawing/2017/decorative" val="1"/>
               </a:ext>
             </a:extLst>
           </p:cNvPr>
@@ -12069,7 +12120,7 @@
                 <a16:creationId xmlns:a16="http://schemas.microsoft.com/office/drawing/2014/main" id="{B1ED02B1-1BC5-458F-9994-627281CFE7C4}"/>
               </a:ext>
               <a:ext uri="{C183D7F6-B498-43B3-948B-1728B52AA6E4}">
-                <adec:decorative xmlns="" xmlns:adec="http://schemas.microsoft.com/office/drawing/2017/decorative" val="1"/>
+                <adec:decorative xmlns:adec="http://schemas.microsoft.com/office/drawing/2017/decorative" xmlns="" val="1"/>
               </a:ext>
             </a:extLst>
           </p:cNvPr>
@@ -12593,7 +12644,7 @@
                 <a16:creationId xmlns:a16="http://schemas.microsoft.com/office/drawing/2014/main" id="{E0D60ECE-8986-45DC-B7FE-EC7699B466B8}"/>
               </a:ext>
               <a:ext uri="{C183D7F6-B498-43B3-948B-1728B52AA6E4}">
-                <adec:decorative xmlns:adec="http://schemas.microsoft.com/office/drawing/2017/decorative" xmlns="" val="1"/>
+                <adec:decorative xmlns="" xmlns:adec="http://schemas.microsoft.com/office/drawing/2017/decorative" val="1"/>
               </a:ext>
             </a:extLst>
           </p:cNvPr>
@@ -12762,7 +12813,7 @@
                 <a16:creationId xmlns:a16="http://schemas.microsoft.com/office/drawing/2014/main" id="{96964194-5878-40D2-8EC0-DDC58387FA56}"/>
               </a:ext>
               <a:ext uri="{C183D7F6-B498-43B3-948B-1728B52AA6E4}">
-                <adec:decorative xmlns:adec="http://schemas.microsoft.com/office/drawing/2017/decorative" xmlns="" val="1"/>
+                <adec:decorative xmlns="" xmlns:adec="http://schemas.microsoft.com/office/drawing/2017/decorative" val="1"/>
               </a:ext>
             </a:extLst>
           </p:cNvPr>
@@ -13228,7 +13279,7 @@
                 <a16:creationId xmlns:a16="http://schemas.microsoft.com/office/drawing/2014/main" id="{6753252F-4873-4F63-801D-CC719279A7D5}"/>
               </a:ext>
               <a:ext uri="{C183D7F6-B498-43B3-948B-1728B52AA6E4}">
-                <adec:decorative xmlns="" xmlns:adec="http://schemas.microsoft.com/office/drawing/2017/decorative" val="1"/>
+                <adec:decorative xmlns:adec="http://schemas.microsoft.com/office/drawing/2017/decorative" xmlns="" val="1"/>
               </a:ext>
             </a:extLst>
           </p:cNvPr>
@@ -13291,7 +13342,7 @@
                 <a16:creationId xmlns:a16="http://schemas.microsoft.com/office/drawing/2014/main" id="{047C8CCB-F95D-4249-92DD-651249D3535A}"/>
               </a:ext>
               <a:ext uri="{C183D7F6-B498-43B3-948B-1728B52AA6E4}">
-                <adec:decorative xmlns="" xmlns:adec="http://schemas.microsoft.com/office/drawing/2017/decorative" val="1"/>
+                <adec:decorative xmlns:adec="http://schemas.microsoft.com/office/drawing/2017/decorative" xmlns="" val="1"/>
               </a:ext>
             </a:extLst>
           </p:cNvPr>
@@ -13715,7 +13766,7 @@
                 <a16:creationId xmlns:a16="http://schemas.microsoft.com/office/drawing/2014/main" id="{B547373F-AF2E-4907-B442-9F902B387FD0}"/>
               </a:ext>
               <a:ext uri="{C183D7F6-B498-43B3-948B-1728B52AA6E4}">
-                <adec:decorative xmlns:adec="http://schemas.microsoft.com/office/drawing/2017/decorative" xmlns="" val="1"/>
+                <adec:decorative xmlns="" xmlns:adec="http://schemas.microsoft.com/office/drawing/2017/decorative" val="1"/>
               </a:ext>
             </a:extLst>
           </p:cNvPr>
@@ -14174,7 +14225,7 @@
                 <a16:creationId xmlns:a16="http://schemas.microsoft.com/office/drawing/2014/main" id="{CF62D2A7-8207-488C-9F46-316BA81A16C8}"/>
               </a:ext>
               <a:ext uri="{C183D7F6-B498-43B3-948B-1728B52AA6E4}">
-                <adec:decorative xmlns:adec="http://schemas.microsoft.com/office/drawing/2017/decorative" xmlns="" val="1"/>
+                <adec:decorative xmlns="" xmlns:adec="http://schemas.microsoft.com/office/drawing/2017/decorative" val="1"/>
               </a:ext>
             </a:extLst>
           </p:cNvPr>
@@ -14341,7 +14392,7 @@
                 <a16:creationId xmlns:a16="http://schemas.microsoft.com/office/drawing/2014/main" id="{52AC6D7F-F068-4E11-BB06-F601D89BB980}"/>
               </a:ext>
               <a:ext uri="{C183D7F6-B498-43B3-948B-1728B52AA6E4}">
-                <adec:decorative xmlns:adec="http://schemas.microsoft.com/office/drawing/2017/decorative" xmlns="" val="1"/>
+                <adec:decorative xmlns="" xmlns:adec="http://schemas.microsoft.com/office/drawing/2017/decorative" val="1"/>
               </a:ext>
             </a:extLst>
           </p:cNvPr>
@@ -14635,7 +14686,7 @@
                 <a16:creationId xmlns:a16="http://schemas.microsoft.com/office/drawing/2014/main" id="{E0D60ECE-8986-45DC-B7FE-EC7699B466B8}"/>
               </a:ext>
               <a:ext uri="{C183D7F6-B498-43B3-948B-1728B52AA6E4}">
-                <adec:decorative xmlns:adec="http://schemas.microsoft.com/office/drawing/2017/decorative" xmlns="" val="1"/>
+                <adec:decorative xmlns="" xmlns:adec="http://schemas.microsoft.com/office/drawing/2017/decorative" val="1"/>
               </a:ext>
             </a:extLst>
           </p:cNvPr>
@@ -14804,7 +14855,7 @@
                 <a16:creationId xmlns:a16="http://schemas.microsoft.com/office/drawing/2014/main" id="{96964194-5878-40D2-8EC0-DDC58387FA56}"/>
               </a:ext>
               <a:ext uri="{C183D7F6-B498-43B3-948B-1728B52AA6E4}">
-                <adec:decorative xmlns:adec="http://schemas.microsoft.com/office/drawing/2017/decorative" xmlns="" val="1"/>
+                <adec:decorative xmlns="" xmlns:adec="http://schemas.microsoft.com/office/drawing/2017/decorative" val="1"/>
               </a:ext>
             </a:extLst>
           </p:cNvPr>
@@ -15260,7 +15311,7 @@
                 <a16:creationId xmlns:a16="http://schemas.microsoft.com/office/drawing/2014/main" id="{6753252F-4873-4F63-801D-CC719279A7D5}"/>
               </a:ext>
               <a:ext uri="{C183D7F6-B498-43B3-948B-1728B52AA6E4}">
-                <adec:decorative xmlns="" xmlns:adec="http://schemas.microsoft.com/office/drawing/2017/decorative" val="1"/>
+                <adec:decorative xmlns:adec="http://schemas.microsoft.com/office/drawing/2017/decorative" xmlns="" val="1"/>
               </a:ext>
             </a:extLst>
           </p:cNvPr>
@@ -15323,7 +15374,7 @@
                 <a16:creationId xmlns:a16="http://schemas.microsoft.com/office/drawing/2014/main" id="{047C8CCB-F95D-4249-92DD-651249D3535A}"/>
               </a:ext>
               <a:ext uri="{C183D7F6-B498-43B3-948B-1728B52AA6E4}">
-                <adec:decorative xmlns="" xmlns:adec="http://schemas.microsoft.com/office/drawing/2017/decorative" val="1"/>
+                <adec:decorative xmlns:adec="http://schemas.microsoft.com/office/drawing/2017/decorative" xmlns="" val="1"/>
               </a:ext>
             </a:extLst>
           </p:cNvPr>
@@ -15527,7 +15578,7 @@
                 <a16:creationId xmlns:a16="http://schemas.microsoft.com/office/drawing/2014/main" id="{6753252F-4873-4F63-801D-CC719279A7D5}"/>
               </a:ext>
               <a:ext uri="{C183D7F6-B498-43B3-948B-1728B52AA6E4}">
-                <adec:decorative xmlns="" xmlns:adec="http://schemas.microsoft.com/office/drawing/2017/decorative" val="1"/>
+                <adec:decorative xmlns:adec="http://schemas.microsoft.com/office/drawing/2017/decorative" xmlns="" val="1"/>
               </a:ext>
             </a:extLst>
           </p:cNvPr>
@@ -15590,7 +15641,7 @@
                 <a16:creationId xmlns:a16="http://schemas.microsoft.com/office/drawing/2014/main" id="{047C8CCB-F95D-4249-92DD-651249D3535A}"/>
               </a:ext>
               <a:ext uri="{C183D7F6-B498-43B3-948B-1728B52AA6E4}">
-                <adec:decorative xmlns="" xmlns:adec="http://schemas.microsoft.com/office/drawing/2017/decorative" val="1"/>
+                <adec:decorative xmlns:adec="http://schemas.microsoft.com/office/drawing/2017/decorative" xmlns="" val="1"/>
               </a:ext>
             </a:extLst>
           </p:cNvPr>
@@ -15793,7 +15844,7 @@
                 <a16:creationId xmlns:a16="http://schemas.microsoft.com/office/drawing/2014/main" id="{823AC064-BC96-4F32-8AE1-B2FD38754823}"/>
               </a:ext>
               <a:ext uri="{C183D7F6-B498-43B3-948B-1728B52AA6E4}">
-                <adec:decorative xmlns="" xmlns:adec="http://schemas.microsoft.com/office/drawing/2017/decorative" val="1"/>
+                <adec:decorative xmlns:adec="http://schemas.microsoft.com/office/drawing/2017/decorative" xmlns="" val="1"/>
               </a:ext>
             </a:extLst>
           </p:cNvPr>
@@ -15910,7 +15961,7 @@
                 <a16:creationId xmlns:a16="http://schemas.microsoft.com/office/drawing/2014/main" id="{7E7C77BC-7138-40B1-A15B-20F57A494629}"/>
               </a:ext>
               <a:ext uri="{C183D7F6-B498-43B3-948B-1728B52AA6E4}">
-                <adec:decorative xmlns="" xmlns:adec="http://schemas.microsoft.com/office/drawing/2017/decorative" val="1"/>
+                <adec:decorative xmlns:adec="http://schemas.microsoft.com/office/drawing/2017/decorative" xmlns="" val="1"/>
               </a:ext>
             </a:extLst>
           </p:cNvPr>
@@ -15998,7 +16049,7 @@
                 <a16:creationId xmlns:a16="http://schemas.microsoft.com/office/drawing/2014/main" id="{DB146403-F3D6-484B-B2ED-97F9565D0370}"/>
               </a:ext>
               <a:ext uri="{C183D7F6-B498-43B3-948B-1728B52AA6E4}">
-                <adec:decorative xmlns="" xmlns:adec="http://schemas.microsoft.com/office/drawing/2017/decorative" val="1"/>
+                <adec:decorative xmlns:adec="http://schemas.microsoft.com/office/drawing/2017/decorative" xmlns="" val="1"/>
               </a:ext>
             </a:extLst>
           </p:cNvPr>
@@ -16124,7 +16175,7 @@
                 <a16:creationId xmlns:a16="http://schemas.microsoft.com/office/drawing/2014/main" id="{DB146403-F3D6-484B-B2ED-97F9565D0370}"/>
               </a:ext>
               <a:ext uri="{C183D7F6-B498-43B3-948B-1728B52AA6E4}">
-                <adec:decorative xmlns:adec="http://schemas.microsoft.com/office/drawing/2017/decorative" xmlns="" val="1"/>
+                <adec:decorative xmlns="" xmlns:adec="http://schemas.microsoft.com/office/drawing/2017/decorative" val="1"/>
               </a:ext>
             </a:extLst>
           </p:cNvPr>
@@ -16176,7 +16227,7 @@
                 <a16:creationId xmlns:a16="http://schemas.microsoft.com/office/drawing/2014/main" id="{823AC064-BC96-4F32-8AE1-B2FD38754823}"/>
               </a:ext>
               <a:ext uri="{C183D7F6-B498-43B3-948B-1728B52AA6E4}">
-                <adec:decorative xmlns:adec="http://schemas.microsoft.com/office/drawing/2017/decorative" xmlns="" val="1"/>
+                <adec:decorative xmlns="" xmlns:adec="http://schemas.microsoft.com/office/drawing/2017/decorative" val="1"/>
               </a:ext>
             </a:extLst>
           </p:cNvPr>
@@ -16365,7 +16416,7 @@
                 <a16:creationId xmlns:a16="http://schemas.microsoft.com/office/drawing/2014/main" id="{7E7C77BC-7138-40B1-A15B-20F57A494629}"/>
               </a:ext>
               <a:ext uri="{C183D7F6-B498-43B3-948B-1728B52AA6E4}">
-                <adec:decorative xmlns:adec="http://schemas.microsoft.com/office/drawing/2017/decorative" xmlns="" val="1"/>
+                <adec:decorative xmlns="" xmlns:adec="http://schemas.microsoft.com/office/drawing/2017/decorative" val="1"/>
               </a:ext>
             </a:extLst>
           </p:cNvPr>

</xml_diff>